<commit_message>
Renombraron las carpetas de los juegos. Diapositivas con descripción de cada juego.
</commit_message>
<xml_diff>
--- a/ppt/Diapositivas.pptx
+++ b/ppt/Diapositivas.pptx
@@ -5,7 +5,7 @@
     <p:sldMasterId id="2147483684" r:id="rId1"/>
   </p:sldMasterIdLst>
   <p:notesMasterIdLst>
-    <p:notesMasterId r:id="rId16"/>
+    <p:notesMasterId r:id="rId25"/>
   </p:notesMasterIdLst>
   <p:sldIdLst>
     <p:sldId id="256" r:id="rId2"/>
@@ -13,15 +13,24 @@
     <p:sldId id="461" r:id="rId4"/>
     <p:sldId id="448" r:id="rId5"/>
     <p:sldId id="449" r:id="rId6"/>
-    <p:sldId id="463" r:id="rId7"/>
-    <p:sldId id="459" r:id="rId8"/>
-    <p:sldId id="462" r:id="rId9"/>
-    <p:sldId id="450" r:id="rId10"/>
-    <p:sldId id="447" r:id="rId11"/>
-    <p:sldId id="456" r:id="rId12"/>
-    <p:sldId id="453" r:id="rId13"/>
-    <p:sldId id="455" r:id="rId14"/>
-    <p:sldId id="457" r:id="rId15"/>
+    <p:sldId id="464" r:id="rId7"/>
+    <p:sldId id="463" r:id="rId8"/>
+    <p:sldId id="459" r:id="rId9"/>
+    <p:sldId id="462" r:id="rId10"/>
+    <p:sldId id="450" r:id="rId11"/>
+    <p:sldId id="447" r:id="rId12"/>
+    <p:sldId id="456" r:id="rId13"/>
+    <p:sldId id="469" r:id="rId14"/>
+    <p:sldId id="453" r:id="rId15"/>
+    <p:sldId id="466" r:id="rId16"/>
+    <p:sldId id="465" r:id="rId17"/>
+    <p:sldId id="470" r:id="rId18"/>
+    <p:sldId id="455" r:id="rId19"/>
+    <p:sldId id="457" r:id="rId20"/>
+    <p:sldId id="467" r:id="rId21"/>
+    <p:sldId id="468" r:id="rId22"/>
+    <p:sldId id="471" r:id="rId23"/>
+    <p:sldId id="472" r:id="rId24"/>
   </p:sldIdLst>
   <p:sldSz cx="9144000" cy="6858000" type="screen4x3"/>
   <p:notesSz cx="6858000" cy="9144000"/>
@@ -205,7 +214,7 @@
           <a:p>
             <a:fld id="{63D5FC4C-9EE1-4746-A368-724F618FC790}" type="datetimeFigureOut">
               <a:rPr lang="es-PE" smtClean="0"/>
-              <a:t>09/09/2011</a:t>
+              <a:t>29/09/2011</a:t>
             </a:fld>
             <a:endParaRPr lang="es-PE"/>
           </a:p>
@@ -715,7 +724,7 @@
     </p:spTree>
     <p:extLst>
       <p:ext uri="{BB962C8B-B14F-4D97-AF65-F5344CB8AC3E}">
-        <p14:creationId xmlns:p14="http://schemas.microsoft.com/office/powerpoint/2010/main" val="1461112982"/>
+        <p14:creationId xmlns:p14="http://schemas.microsoft.com/office/powerpoint/2010/main" val="3614550747"/>
       </p:ext>
     </p:extLst>
   </p:cSld>
@@ -769,113 +778,6 @@
           <a:bodyPr/>
           <a:lstStyle/>
           <a:p>
-            <a:pPr algn="l"/>
-            <a:r>
-              <a:rPr lang="es-PE" sz="1200" i="1" dirty="0" smtClean="0"/>
-              <a:t>Existe un gran catálogo de </a:t>
-            </a:r>
-            <a:r>
-              <a:rPr lang="es-PE" sz="1200" i="1" dirty="0" err="1" smtClean="0"/>
-              <a:t>refactorings</a:t>
-            </a:r>
-            <a:r>
-              <a:rPr lang="es-PE" sz="1200" i="1" baseline="0" dirty="0" smtClean="0"/>
-              <a:t> y la meta es tratar de practicar la mayor cantidad </a:t>
-            </a:r>
-            <a:endParaRPr lang="es-PE" sz="1200" i="1" dirty="0" smtClean="0"/>
-          </a:p>
-          <a:p>
-            <a:pPr algn="l"/>
-            <a:r>
-              <a:rPr lang="es-PE" sz="1200" i="1" dirty="0" smtClean="0"/>
-              <a:t>(</a:t>
-            </a:r>
-            <a:r>
-              <a:rPr lang="es-PE" sz="1200" i="1" dirty="0" err="1" smtClean="0"/>
-              <a:t>Move</a:t>
-            </a:r>
-            <a:r>
-              <a:rPr lang="es-PE" sz="1200" i="1" dirty="0" smtClean="0"/>
-              <a:t> </a:t>
-            </a:r>
-            <a:r>
-              <a:rPr lang="es-PE" sz="1200" i="1" dirty="0" err="1" smtClean="0"/>
-              <a:t>Method</a:t>
-            </a:r>
-            <a:r>
-              <a:rPr lang="es-PE" sz="1200" i="1" dirty="0" smtClean="0"/>
-              <a:t>, </a:t>
-            </a:r>
-            <a:r>
-              <a:rPr lang="es-PE" sz="1200" i="1" dirty="0" err="1" smtClean="0"/>
-              <a:t>Inline</a:t>
-            </a:r>
-            <a:r>
-              <a:rPr lang="es-PE" sz="1200" i="1" dirty="0" smtClean="0"/>
-              <a:t> </a:t>
-            </a:r>
-            <a:r>
-              <a:rPr lang="es-PE" sz="1200" i="1" dirty="0" err="1" smtClean="0"/>
-              <a:t>Method</a:t>
-            </a:r>
-            <a:r>
-              <a:rPr lang="es-PE" sz="1200" i="1" dirty="0" smtClean="0"/>
-              <a:t>, </a:t>
-            </a:r>
-            <a:r>
-              <a:rPr lang="es-PE" sz="1200" i="1" dirty="0" err="1" smtClean="0"/>
-              <a:t>Extract</a:t>
-            </a:r>
-            <a:r>
-              <a:rPr lang="es-PE" sz="1200" i="1" dirty="0" smtClean="0"/>
-              <a:t> Interface, </a:t>
-            </a:r>
-          </a:p>
-          <a:p>
-            <a:pPr algn="l"/>
-            <a:r>
-              <a:rPr lang="es-PE" sz="1200" i="1" dirty="0" err="1" smtClean="0"/>
-              <a:t>Replace</a:t>
-            </a:r>
-            <a:r>
-              <a:rPr lang="es-PE" sz="1200" i="1" dirty="0" smtClean="0"/>
-              <a:t> </a:t>
-            </a:r>
-            <a:r>
-              <a:rPr lang="es-PE" sz="1200" i="1" dirty="0" err="1" smtClean="0"/>
-              <a:t>Conditional</a:t>
-            </a:r>
-            <a:r>
-              <a:rPr lang="es-PE" sz="1200" i="1" dirty="0" smtClean="0"/>
-              <a:t> </a:t>
-            </a:r>
-            <a:r>
-              <a:rPr lang="es-PE" sz="1200" i="1" dirty="0" err="1" smtClean="0"/>
-              <a:t>with</a:t>
-            </a:r>
-            <a:r>
-              <a:rPr lang="es-PE" sz="1200" i="1" dirty="0" smtClean="0"/>
-              <a:t> </a:t>
-            </a:r>
-            <a:r>
-              <a:rPr lang="es-PE" sz="1200" i="1" dirty="0" err="1" smtClean="0"/>
-              <a:t>Polymorphism</a:t>
-            </a:r>
-            <a:r>
-              <a:rPr lang="es-PE" sz="1200" i="1" dirty="0" smtClean="0"/>
-              <a:t>, </a:t>
-            </a:r>
-            <a:r>
-              <a:rPr lang="es-PE" sz="1200" i="1" dirty="0" err="1" smtClean="0"/>
-              <a:t>etc</a:t>
-            </a:r>
-            <a:r>
-              <a:rPr lang="es-PE" sz="1200" i="1" dirty="0" smtClean="0"/>
-              <a:t>)</a:t>
-            </a:r>
-          </a:p>
-          <a:p>
-            <a:pPr algn="l"/>
             <a:endParaRPr lang="es-PE" dirty="0"/>
           </a:p>
         </p:txBody>
@@ -906,7 +808,7 @@
     </p:spTree>
     <p:extLst>
       <p:ext uri="{BB962C8B-B14F-4D97-AF65-F5344CB8AC3E}">
-        <p14:creationId xmlns:p14="http://schemas.microsoft.com/office/powerpoint/2010/main" val="3614550747"/>
+        <p14:creationId xmlns:p14="http://schemas.microsoft.com/office/powerpoint/2010/main" val="1461112982"/>
       </p:ext>
     </p:extLst>
   </p:cSld>
@@ -1046,10 +948,112 @@
           <a:p>
             <a:pPr algn="l"/>
             <a:r>
-              <a:rPr lang="en-US" noProof="0" dirty="0" smtClean="0"/>
-              <a:t>Strategies for larger design changes.</a:t>
-            </a:r>
-            <a:endParaRPr lang="en-US" noProof="0" dirty="0"/>
+              <a:rPr lang="es-PE" sz="1200" i="1" dirty="0" smtClean="0"/>
+              <a:t>Existe un gran catálogo de </a:t>
+            </a:r>
+            <a:r>
+              <a:rPr lang="es-PE" sz="1200" i="1" dirty="0" err="1" smtClean="0"/>
+              <a:t>refactorings</a:t>
+            </a:r>
+            <a:r>
+              <a:rPr lang="es-PE" sz="1200" i="1" baseline="0" dirty="0" smtClean="0"/>
+              <a:t> y la meta es tratar de practicar la mayor cantidad </a:t>
+            </a:r>
+            <a:endParaRPr lang="es-PE" sz="1200" i="1" dirty="0" smtClean="0"/>
+          </a:p>
+          <a:p>
+            <a:pPr algn="l"/>
+            <a:r>
+              <a:rPr lang="es-PE" sz="1200" i="1" dirty="0" smtClean="0"/>
+              <a:t>(</a:t>
+            </a:r>
+            <a:r>
+              <a:rPr lang="es-PE" sz="1200" i="1" dirty="0" err="1" smtClean="0"/>
+              <a:t>Move</a:t>
+            </a:r>
+            <a:r>
+              <a:rPr lang="es-PE" sz="1200" i="1" dirty="0" smtClean="0"/>
+              <a:t> </a:t>
+            </a:r>
+            <a:r>
+              <a:rPr lang="es-PE" sz="1200" i="1" dirty="0" err="1" smtClean="0"/>
+              <a:t>Method</a:t>
+            </a:r>
+            <a:r>
+              <a:rPr lang="es-PE" sz="1200" i="1" dirty="0" smtClean="0"/>
+              <a:t>, </a:t>
+            </a:r>
+            <a:r>
+              <a:rPr lang="es-PE" sz="1200" i="1" dirty="0" err="1" smtClean="0"/>
+              <a:t>Inline</a:t>
+            </a:r>
+            <a:r>
+              <a:rPr lang="es-PE" sz="1200" i="1" dirty="0" smtClean="0"/>
+              <a:t> </a:t>
+            </a:r>
+            <a:r>
+              <a:rPr lang="es-PE" sz="1200" i="1" dirty="0" err="1" smtClean="0"/>
+              <a:t>Method</a:t>
+            </a:r>
+            <a:r>
+              <a:rPr lang="es-PE" sz="1200" i="1" dirty="0" smtClean="0"/>
+              <a:t>, </a:t>
+            </a:r>
+            <a:r>
+              <a:rPr lang="es-PE" sz="1200" i="1" dirty="0" err="1" smtClean="0"/>
+              <a:t>Extract</a:t>
+            </a:r>
+            <a:r>
+              <a:rPr lang="es-PE" sz="1200" i="1" dirty="0" smtClean="0"/>
+              <a:t> Interface, </a:t>
+            </a:r>
+          </a:p>
+          <a:p>
+            <a:pPr algn="l"/>
+            <a:r>
+              <a:rPr lang="es-PE" sz="1200" i="1" dirty="0" err="1" smtClean="0"/>
+              <a:t>Replace</a:t>
+            </a:r>
+            <a:r>
+              <a:rPr lang="es-PE" sz="1200" i="1" dirty="0" smtClean="0"/>
+              <a:t> </a:t>
+            </a:r>
+            <a:r>
+              <a:rPr lang="es-PE" sz="1200" i="1" dirty="0" err="1" smtClean="0"/>
+              <a:t>Conditional</a:t>
+            </a:r>
+            <a:r>
+              <a:rPr lang="es-PE" sz="1200" i="1" dirty="0" smtClean="0"/>
+              <a:t> </a:t>
+            </a:r>
+            <a:r>
+              <a:rPr lang="es-PE" sz="1200" i="1" dirty="0" err="1" smtClean="0"/>
+              <a:t>with</a:t>
+            </a:r>
+            <a:r>
+              <a:rPr lang="es-PE" sz="1200" i="1" dirty="0" smtClean="0"/>
+              <a:t> </a:t>
+            </a:r>
+            <a:r>
+              <a:rPr lang="es-PE" sz="1200" i="1" dirty="0" err="1" smtClean="0"/>
+              <a:t>Polymorphism</a:t>
+            </a:r>
+            <a:r>
+              <a:rPr lang="es-PE" sz="1200" i="1" dirty="0" smtClean="0"/>
+              <a:t>, </a:t>
+            </a:r>
+            <a:r>
+              <a:rPr lang="es-PE" sz="1200" i="1" dirty="0" err="1" smtClean="0"/>
+              <a:t>etc</a:t>
+            </a:r>
+            <a:r>
+              <a:rPr lang="es-PE" sz="1200" i="1" dirty="0" smtClean="0"/>
+              <a:t>)</a:t>
+            </a:r>
+          </a:p>
+          <a:p>
+            <a:pPr algn="l"/>
+            <a:endParaRPr lang="es-PE" dirty="0"/>
           </a:p>
         </p:txBody>
       </p:sp>
@@ -1071,6 +1075,540 @@
             <a:fld id="{96DE5A63-0F1F-4DC0-ADE0-CC17EBA6F230}" type="slidenum">
               <a:rPr lang="es-PE" smtClean="0"/>
               <a:t>14</a:t>
+            </a:fld>
+            <a:endParaRPr lang="es-PE"/>
+          </a:p>
+        </p:txBody>
+      </p:sp>
+    </p:spTree>
+    <p:extLst>
+      <p:ext uri="{BB962C8B-B14F-4D97-AF65-F5344CB8AC3E}">
+        <p14:creationId xmlns:p14="http://schemas.microsoft.com/office/powerpoint/2010/main" val="3614550747"/>
+      </p:ext>
+    </p:extLst>
+  </p:cSld>
+  <p:clrMapOvr>
+    <a:masterClrMapping/>
+  </p:clrMapOvr>
+</p:notes>
+</file>
+
+<file path=ppt/notesSlides/notesSlide15.xml><?xml version="1.0" encoding="utf-8"?>
+<p:notes xmlns:a="http://schemas.openxmlformats.org/drawingml/2006/main" xmlns:r="http://schemas.openxmlformats.org/officeDocument/2006/relationships" xmlns:p="http://schemas.openxmlformats.org/presentationml/2006/main">
+  <p:cSld>
+    <p:spTree>
+      <p:nvGrpSpPr>
+        <p:cNvPr id="1" name=""/>
+        <p:cNvGrpSpPr/>
+        <p:nvPr/>
+      </p:nvGrpSpPr>
+      <p:grpSpPr>
+        <a:xfrm>
+          <a:off x="0" y="0"/>
+          <a:ext cx="0" cy="0"/>
+          <a:chOff x="0" y="0"/>
+          <a:chExt cx="0" cy="0"/>
+        </a:xfrm>
+      </p:grpSpPr>
+      <p:sp>
+        <p:nvSpPr>
+          <p:cNvPr id="2" name="1 Marcador de imagen de diapositiva"/>
+          <p:cNvSpPr>
+            <a:spLocks noGrp="1" noRot="1" noChangeAspect="1"/>
+          </p:cNvSpPr>
+          <p:nvPr>
+            <p:ph type="sldImg"/>
+          </p:nvPr>
+        </p:nvSpPr>
+        <p:spPr/>
+      </p:sp>
+      <p:sp>
+        <p:nvSpPr>
+          <p:cNvPr id="3" name="2 Marcador de notas"/>
+          <p:cNvSpPr>
+            <a:spLocks noGrp="1"/>
+          </p:cNvSpPr>
+          <p:nvPr>
+            <p:ph type="body" idx="1"/>
+          </p:nvPr>
+        </p:nvSpPr>
+        <p:spPr/>
+        <p:txBody>
+          <a:bodyPr/>
+          <a:lstStyle/>
+          <a:p>
+            <a:pPr algn="l"/>
+            <a:r>
+              <a:rPr lang="es-PE" sz="1200" i="1" dirty="0" smtClean="0"/>
+              <a:t>Existe un gran catálogo de </a:t>
+            </a:r>
+            <a:r>
+              <a:rPr lang="es-PE" sz="1200" i="1" dirty="0" err="1" smtClean="0"/>
+              <a:t>refactorings</a:t>
+            </a:r>
+            <a:r>
+              <a:rPr lang="es-PE" sz="1200" i="1" baseline="0" dirty="0" smtClean="0"/>
+              <a:t> y la meta es tratar de practicar la mayor cantidad </a:t>
+            </a:r>
+            <a:endParaRPr lang="es-PE" sz="1200" i="1" dirty="0" smtClean="0"/>
+          </a:p>
+          <a:p>
+            <a:pPr algn="l"/>
+            <a:r>
+              <a:rPr lang="es-PE" sz="1200" i="1" dirty="0" smtClean="0"/>
+              <a:t>(</a:t>
+            </a:r>
+            <a:r>
+              <a:rPr lang="es-PE" sz="1200" i="1" dirty="0" err="1" smtClean="0"/>
+              <a:t>Move</a:t>
+            </a:r>
+            <a:r>
+              <a:rPr lang="es-PE" sz="1200" i="1" dirty="0" smtClean="0"/>
+              <a:t> </a:t>
+            </a:r>
+            <a:r>
+              <a:rPr lang="es-PE" sz="1200" i="1" dirty="0" err="1" smtClean="0"/>
+              <a:t>Method</a:t>
+            </a:r>
+            <a:r>
+              <a:rPr lang="es-PE" sz="1200" i="1" dirty="0" smtClean="0"/>
+              <a:t>, </a:t>
+            </a:r>
+            <a:r>
+              <a:rPr lang="es-PE" sz="1200" i="1" dirty="0" err="1" smtClean="0"/>
+              <a:t>Inline</a:t>
+            </a:r>
+            <a:r>
+              <a:rPr lang="es-PE" sz="1200" i="1" dirty="0" smtClean="0"/>
+              <a:t> </a:t>
+            </a:r>
+            <a:r>
+              <a:rPr lang="es-PE" sz="1200" i="1" dirty="0" err="1" smtClean="0"/>
+              <a:t>Method</a:t>
+            </a:r>
+            <a:r>
+              <a:rPr lang="es-PE" sz="1200" i="1" dirty="0" smtClean="0"/>
+              <a:t>, </a:t>
+            </a:r>
+            <a:r>
+              <a:rPr lang="es-PE" sz="1200" i="1" dirty="0" err="1" smtClean="0"/>
+              <a:t>Extract</a:t>
+            </a:r>
+            <a:r>
+              <a:rPr lang="es-PE" sz="1200" i="1" dirty="0" smtClean="0"/>
+              <a:t> Interface, </a:t>
+            </a:r>
+          </a:p>
+          <a:p>
+            <a:pPr algn="l"/>
+            <a:r>
+              <a:rPr lang="es-PE" sz="1200" i="1" dirty="0" err="1" smtClean="0"/>
+              <a:t>Replace</a:t>
+            </a:r>
+            <a:r>
+              <a:rPr lang="es-PE" sz="1200" i="1" dirty="0" smtClean="0"/>
+              <a:t> </a:t>
+            </a:r>
+            <a:r>
+              <a:rPr lang="es-PE" sz="1200" i="1" dirty="0" err="1" smtClean="0"/>
+              <a:t>Conditional</a:t>
+            </a:r>
+            <a:r>
+              <a:rPr lang="es-PE" sz="1200" i="1" dirty="0" smtClean="0"/>
+              <a:t> </a:t>
+            </a:r>
+            <a:r>
+              <a:rPr lang="es-PE" sz="1200" i="1" dirty="0" err="1" smtClean="0"/>
+              <a:t>with</a:t>
+            </a:r>
+            <a:r>
+              <a:rPr lang="es-PE" sz="1200" i="1" dirty="0" smtClean="0"/>
+              <a:t> </a:t>
+            </a:r>
+            <a:r>
+              <a:rPr lang="es-PE" sz="1200" i="1" dirty="0" err="1" smtClean="0"/>
+              <a:t>Polymorphism</a:t>
+            </a:r>
+            <a:r>
+              <a:rPr lang="es-PE" sz="1200" i="1" dirty="0" smtClean="0"/>
+              <a:t>, </a:t>
+            </a:r>
+            <a:r>
+              <a:rPr lang="es-PE" sz="1200" i="1" dirty="0" err="1" smtClean="0"/>
+              <a:t>etc</a:t>
+            </a:r>
+            <a:r>
+              <a:rPr lang="es-PE" sz="1200" i="1" dirty="0" smtClean="0"/>
+              <a:t>)</a:t>
+            </a:r>
+          </a:p>
+          <a:p>
+            <a:pPr algn="l"/>
+            <a:endParaRPr lang="es-PE" dirty="0"/>
+          </a:p>
+        </p:txBody>
+      </p:sp>
+      <p:sp>
+        <p:nvSpPr>
+          <p:cNvPr id="4" name="3 Marcador de número de diapositiva"/>
+          <p:cNvSpPr>
+            <a:spLocks noGrp="1"/>
+          </p:cNvSpPr>
+          <p:nvPr>
+            <p:ph type="sldNum" sz="quarter" idx="10"/>
+          </p:nvPr>
+        </p:nvSpPr>
+        <p:spPr/>
+        <p:txBody>
+          <a:bodyPr/>
+          <a:lstStyle/>
+          <a:p>
+            <a:fld id="{96DE5A63-0F1F-4DC0-ADE0-CC17EBA6F230}" type="slidenum">
+              <a:rPr lang="es-PE" smtClean="0"/>
+              <a:t>15</a:t>
+            </a:fld>
+            <a:endParaRPr lang="es-PE"/>
+          </a:p>
+        </p:txBody>
+      </p:sp>
+    </p:spTree>
+    <p:extLst>
+      <p:ext uri="{BB962C8B-B14F-4D97-AF65-F5344CB8AC3E}">
+        <p14:creationId xmlns:p14="http://schemas.microsoft.com/office/powerpoint/2010/main" val="3614550747"/>
+      </p:ext>
+    </p:extLst>
+  </p:cSld>
+  <p:clrMapOvr>
+    <a:masterClrMapping/>
+  </p:clrMapOvr>
+</p:notes>
+</file>
+
+<file path=ppt/notesSlides/notesSlide16.xml><?xml version="1.0" encoding="utf-8"?>
+<p:notes xmlns:a="http://schemas.openxmlformats.org/drawingml/2006/main" xmlns:r="http://schemas.openxmlformats.org/officeDocument/2006/relationships" xmlns:p="http://schemas.openxmlformats.org/presentationml/2006/main">
+  <p:cSld>
+    <p:spTree>
+      <p:nvGrpSpPr>
+        <p:cNvPr id="1" name=""/>
+        <p:cNvGrpSpPr/>
+        <p:nvPr/>
+      </p:nvGrpSpPr>
+      <p:grpSpPr>
+        <a:xfrm>
+          <a:off x="0" y="0"/>
+          <a:ext cx="0" cy="0"/>
+          <a:chOff x="0" y="0"/>
+          <a:chExt cx="0" cy="0"/>
+        </a:xfrm>
+      </p:grpSpPr>
+      <p:sp>
+        <p:nvSpPr>
+          <p:cNvPr id="2" name="1 Marcador de imagen de diapositiva"/>
+          <p:cNvSpPr>
+            <a:spLocks noGrp="1" noRot="1" noChangeAspect="1"/>
+          </p:cNvSpPr>
+          <p:nvPr>
+            <p:ph type="sldImg"/>
+          </p:nvPr>
+        </p:nvSpPr>
+        <p:spPr/>
+      </p:sp>
+      <p:sp>
+        <p:nvSpPr>
+          <p:cNvPr id="3" name="2 Marcador de notas"/>
+          <p:cNvSpPr>
+            <a:spLocks noGrp="1"/>
+          </p:cNvSpPr>
+          <p:nvPr>
+            <p:ph type="body" idx="1"/>
+          </p:nvPr>
+        </p:nvSpPr>
+        <p:spPr/>
+        <p:txBody>
+          <a:bodyPr/>
+          <a:lstStyle/>
+          <a:p>
+            <a:pPr algn="l"/>
+            <a:endParaRPr lang="es-PE" dirty="0"/>
+          </a:p>
+        </p:txBody>
+      </p:sp>
+      <p:sp>
+        <p:nvSpPr>
+          <p:cNvPr id="4" name="3 Marcador de número de diapositiva"/>
+          <p:cNvSpPr>
+            <a:spLocks noGrp="1"/>
+          </p:cNvSpPr>
+          <p:nvPr>
+            <p:ph type="sldNum" sz="quarter" idx="10"/>
+          </p:nvPr>
+        </p:nvSpPr>
+        <p:spPr/>
+        <p:txBody>
+          <a:bodyPr/>
+          <a:lstStyle/>
+          <a:p>
+            <a:fld id="{96DE5A63-0F1F-4DC0-ADE0-CC17EBA6F230}" type="slidenum">
+              <a:rPr lang="es-PE" smtClean="0"/>
+              <a:t>16</a:t>
+            </a:fld>
+            <a:endParaRPr lang="es-PE"/>
+          </a:p>
+        </p:txBody>
+      </p:sp>
+    </p:spTree>
+    <p:extLst>
+      <p:ext uri="{BB962C8B-B14F-4D97-AF65-F5344CB8AC3E}">
+        <p14:creationId xmlns:p14="http://schemas.microsoft.com/office/powerpoint/2010/main" val="3614550747"/>
+      </p:ext>
+    </p:extLst>
+  </p:cSld>
+  <p:clrMapOvr>
+    <a:masterClrMapping/>
+  </p:clrMapOvr>
+</p:notes>
+</file>
+
+<file path=ppt/notesSlides/notesSlide17.xml><?xml version="1.0" encoding="utf-8"?>
+<p:notes xmlns:a="http://schemas.openxmlformats.org/drawingml/2006/main" xmlns:r="http://schemas.openxmlformats.org/officeDocument/2006/relationships" xmlns:p="http://schemas.openxmlformats.org/presentationml/2006/main">
+  <p:cSld>
+    <p:spTree>
+      <p:nvGrpSpPr>
+        <p:cNvPr id="1" name=""/>
+        <p:cNvGrpSpPr/>
+        <p:nvPr/>
+      </p:nvGrpSpPr>
+      <p:grpSpPr>
+        <a:xfrm>
+          <a:off x="0" y="0"/>
+          <a:ext cx="0" cy="0"/>
+          <a:chOff x="0" y="0"/>
+          <a:chExt cx="0" cy="0"/>
+        </a:xfrm>
+      </p:grpSpPr>
+      <p:sp>
+        <p:nvSpPr>
+          <p:cNvPr id="2" name="1 Marcador de imagen de diapositiva"/>
+          <p:cNvSpPr>
+            <a:spLocks noGrp="1" noRot="1" noChangeAspect="1"/>
+          </p:cNvSpPr>
+          <p:nvPr>
+            <p:ph type="sldImg"/>
+          </p:nvPr>
+        </p:nvSpPr>
+        <p:spPr/>
+      </p:sp>
+      <p:sp>
+        <p:nvSpPr>
+          <p:cNvPr id="3" name="2 Marcador de notas"/>
+          <p:cNvSpPr>
+            <a:spLocks noGrp="1"/>
+          </p:cNvSpPr>
+          <p:nvPr>
+            <p:ph type="body" idx="1"/>
+          </p:nvPr>
+        </p:nvSpPr>
+        <p:spPr/>
+        <p:txBody>
+          <a:bodyPr/>
+          <a:lstStyle/>
+          <a:p>
+            <a:pPr algn="l"/>
+            <a:endParaRPr lang="es-PE" dirty="0"/>
+          </a:p>
+        </p:txBody>
+      </p:sp>
+      <p:sp>
+        <p:nvSpPr>
+          <p:cNvPr id="4" name="3 Marcador de número de diapositiva"/>
+          <p:cNvSpPr>
+            <a:spLocks noGrp="1"/>
+          </p:cNvSpPr>
+          <p:nvPr>
+            <p:ph type="sldNum" sz="quarter" idx="10"/>
+          </p:nvPr>
+        </p:nvSpPr>
+        <p:spPr/>
+        <p:txBody>
+          <a:bodyPr/>
+          <a:lstStyle/>
+          <a:p>
+            <a:fld id="{96DE5A63-0F1F-4DC0-ADE0-CC17EBA6F230}" type="slidenum">
+              <a:rPr lang="es-PE" smtClean="0"/>
+              <a:t>17</a:t>
+            </a:fld>
+            <a:endParaRPr lang="es-PE"/>
+          </a:p>
+        </p:txBody>
+      </p:sp>
+    </p:spTree>
+    <p:extLst>
+      <p:ext uri="{BB962C8B-B14F-4D97-AF65-F5344CB8AC3E}">
+        <p14:creationId xmlns:p14="http://schemas.microsoft.com/office/powerpoint/2010/main" val="3614550747"/>
+      </p:ext>
+    </p:extLst>
+  </p:cSld>
+  <p:clrMapOvr>
+    <a:masterClrMapping/>
+  </p:clrMapOvr>
+</p:notes>
+</file>
+
+<file path=ppt/notesSlides/notesSlide18.xml><?xml version="1.0" encoding="utf-8"?>
+<p:notes xmlns:a="http://schemas.openxmlformats.org/drawingml/2006/main" xmlns:r="http://schemas.openxmlformats.org/officeDocument/2006/relationships" xmlns:p="http://schemas.openxmlformats.org/presentationml/2006/main">
+  <p:cSld>
+    <p:spTree>
+      <p:nvGrpSpPr>
+        <p:cNvPr id="1" name=""/>
+        <p:cNvGrpSpPr/>
+        <p:nvPr/>
+      </p:nvGrpSpPr>
+      <p:grpSpPr>
+        <a:xfrm>
+          <a:off x="0" y="0"/>
+          <a:ext cx="0" cy="0"/>
+          <a:chOff x="0" y="0"/>
+          <a:chExt cx="0" cy="0"/>
+        </a:xfrm>
+      </p:grpSpPr>
+      <p:sp>
+        <p:nvSpPr>
+          <p:cNvPr id="2" name="1 Marcador de imagen de diapositiva"/>
+          <p:cNvSpPr>
+            <a:spLocks noGrp="1" noRot="1" noChangeAspect="1"/>
+          </p:cNvSpPr>
+          <p:nvPr>
+            <p:ph type="sldImg"/>
+          </p:nvPr>
+        </p:nvSpPr>
+        <p:spPr/>
+      </p:sp>
+      <p:sp>
+        <p:nvSpPr>
+          <p:cNvPr id="3" name="2 Marcador de notas"/>
+          <p:cNvSpPr>
+            <a:spLocks noGrp="1"/>
+          </p:cNvSpPr>
+          <p:nvPr>
+            <p:ph type="body" idx="1"/>
+          </p:nvPr>
+        </p:nvSpPr>
+        <p:spPr/>
+        <p:txBody>
+          <a:bodyPr/>
+          <a:lstStyle/>
+          <a:p>
+            <a:endParaRPr lang="es-PE" dirty="0"/>
+          </a:p>
+        </p:txBody>
+      </p:sp>
+      <p:sp>
+        <p:nvSpPr>
+          <p:cNvPr id="4" name="3 Marcador de número de diapositiva"/>
+          <p:cNvSpPr>
+            <a:spLocks noGrp="1"/>
+          </p:cNvSpPr>
+          <p:nvPr>
+            <p:ph type="sldNum" sz="quarter" idx="10"/>
+          </p:nvPr>
+        </p:nvSpPr>
+        <p:spPr/>
+        <p:txBody>
+          <a:bodyPr/>
+          <a:lstStyle/>
+          <a:p>
+            <a:fld id="{96DE5A63-0F1F-4DC0-ADE0-CC17EBA6F230}" type="slidenum">
+              <a:rPr lang="es-PE" smtClean="0"/>
+              <a:t>18</a:t>
+            </a:fld>
+            <a:endParaRPr lang="es-PE"/>
+          </a:p>
+        </p:txBody>
+      </p:sp>
+    </p:spTree>
+    <p:extLst>
+      <p:ext uri="{BB962C8B-B14F-4D97-AF65-F5344CB8AC3E}">
+        <p14:creationId xmlns:p14="http://schemas.microsoft.com/office/powerpoint/2010/main" val="1461112982"/>
+      </p:ext>
+    </p:extLst>
+  </p:cSld>
+  <p:clrMapOvr>
+    <a:masterClrMapping/>
+  </p:clrMapOvr>
+</p:notes>
+</file>
+
+<file path=ppt/notesSlides/notesSlide19.xml><?xml version="1.0" encoding="utf-8"?>
+<p:notes xmlns:a="http://schemas.openxmlformats.org/drawingml/2006/main" xmlns:r="http://schemas.openxmlformats.org/officeDocument/2006/relationships" xmlns:p="http://schemas.openxmlformats.org/presentationml/2006/main">
+  <p:cSld>
+    <p:spTree>
+      <p:nvGrpSpPr>
+        <p:cNvPr id="1" name=""/>
+        <p:cNvGrpSpPr/>
+        <p:nvPr/>
+      </p:nvGrpSpPr>
+      <p:grpSpPr>
+        <a:xfrm>
+          <a:off x="0" y="0"/>
+          <a:ext cx="0" cy="0"/>
+          <a:chOff x="0" y="0"/>
+          <a:chExt cx="0" cy="0"/>
+        </a:xfrm>
+      </p:grpSpPr>
+      <p:sp>
+        <p:nvSpPr>
+          <p:cNvPr id="2" name="1 Marcador de imagen de diapositiva"/>
+          <p:cNvSpPr>
+            <a:spLocks noGrp="1" noRot="1" noChangeAspect="1"/>
+          </p:cNvSpPr>
+          <p:nvPr>
+            <p:ph type="sldImg"/>
+          </p:nvPr>
+        </p:nvSpPr>
+        <p:spPr/>
+      </p:sp>
+      <p:sp>
+        <p:nvSpPr>
+          <p:cNvPr id="3" name="2 Marcador de notas"/>
+          <p:cNvSpPr>
+            <a:spLocks noGrp="1"/>
+          </p:cNvSpPr>
+          <p:nvPr>
+            <p:ph type="body" idx="1"/>
+          </p:nvPr>
+        </p:nvSpPr>
+        <p:spPr/>
+        <p:txBody>
+          <a:bodyPr/>
+          <a:lstStyle/>
+          <a:p>
+            <a:pPr algn="l"/>
+            <a:r>
+              <a:rPr lang="en-US" noProof="0" dirty="0" smtClean="0"/>
+              <a:t>Strategies for larger design changes.</a:t>
+            </a:r>
+            <a:endParaRPr lang="en-US" noProof="0" dirty="0"/>
+          </a:p>
+        </p:txBody>
+      </p:sp>
+      <p:sp>
+        <p:nvSpPr>
+          <p:cNvPr id="4" name="3 Marcador de número de diapositiva"/>
+          <p:cNvSpPr>
+            <a:spLocks noGrp="1"/>
+          </p:cNvSpPr>
+          <p:nvPr>
+            <p:ph type="sldNum" sz="quarter" idx="10"/>
+          </p:nvPr>
+        </p:nvSpPr>
+        <p:spPr/>
+        <p:txBody>
+          <a:bodyPr/>
+          <a:lstStyle/>
+          <a:p>
+            <a:fld id="{96DE5A63-0F1F-4DC0-ADE0-CC17EBA6F230}" type="slidenum">
+              <a:rPr lang="es-PE" smtClean="0"/>
+              <a:t>19</a:t>
             </a:fld>
             <a:endParaRPr lang="es-PE"/>
           </a:p>
@@ -1173,6 +1711,346 @@
             <a:fld id="{96DE5A63-0F1F-4DC0-ADE0-CC17EBA6F230}" type="slidenum">
               <a:rPr lang="es-PE" smtClean="0"/>
               <a:t>2</a:t>
+            </a:fld>
+            <a:endParaRPr lang="es-PE"/>
+          </a:p>
+        </p:txBody>
+      </p:sp>
+    </p:spTree>
+    <p:extLst>
+      <p:ext uri="{BB962C8B-B14F-4D97-AF65-F5344CB8AC3E}">
+        <p14:creationId xmlns:p14="http://schemas.microsoft.com/office/powerpoint/2010/main" val="3614550747"/>
+      </p:ext>
+    </p:extLst>
+  </p:cSld>
+  <p:clrMapOvr>
+    <a:masterClrMapping/>
+  </p:clrMapOvr>
+</p:notes>
+</file>
+
+<file path=ppt/notesSlides/notesSlide20.xml><?xml version="1.0" encoding="utf-8"?>
+<p:notes xmlns:a="http://schemas.openxmlformats.org/drawingml/2006/main" xmlns:r="http://schemas.openxmlformats.org/officeDocument/2006/relationships" xmlns:p="http://schemas.openxmlformats.org/presentationml/2006/main">
+  <p:cSld>
+    <p:spTree>
+      <p:nvGrpSpPr>
+        <p:cNvPr id="1" name=""/>
+        <p:cNvGrpSpPr/>
+        <p:nvPr/>
+      </p:nvGrpSpPr>
+      <p:grpSpPr>
+        <a:xfrm>
+          <a:off x="0" y="0"/>
+          <a:ext cx="0" cy="0"/>
+          <a:chOff x="0" y="0"/>
+          <a:chExt cx="0" cy="0"/>
+        </a:xfrm>
+      </p:grpSpPr>
+      <p:sp>
+        <p:nvSpPr>
+          <p:cNvPr id="2" name="1 Marcador de imagen de diapositiva"/>
+          <p:cNvSpPr>
+            <a:spLocks noGrp="1" noRot="1" noChangeAspect="1"/>
+          </p:cNvSpPr>
+          <p:nvPr>
+            <p:ph type="sldImg"/>
+          </p:nvPr>
+        </p:nvSpPr>
+        <p:spPr/>
+      </p:sp>
+      <p:sp>
+        <p:nvSpPr>
+          <p:cNvPr id="3" name="2 Marcador de notas"/>
+          <p:cNvSpPr>
+            <a:spLocks noGrp="1"/>
+          </p:cNvSpPr>
+          <p:nvPr>
+            <p:ph type="body" idx="1"/>
+          </p:nvPr>
+        </p:nvSpPr>
+        <p:spPr/>
+        <p:txBody>
+          <a:bodyPr/>
+          <a:lstStyle/>
+          <a:p>
+            <a:pPr algn="l"/>
+            <a:endParaRPr lang="es-PE" dirty="0"/>
+          </a:p>
+        </p:txBody>
+      </p:sp>
+      <p:sp>
+        <p:nvSpPr>
+          <p:cNvPr id="4" name="3 Marcador de número de diapositiva"/>
+          <p:cNvSpPr>
+            <a:spLocks noGrp="1"/>
+          </p:cNvSpPr>
+          <p:nvPr>
+            <p:ph type="sldNum" sz="quarter" idx="10"/>
+          </p:nvPr>
+        </p:nvSpPr>
+        <p:spPr/>
+        <p:txBody>
+          <a:bodyPr/>
+          <a:lstStyle/>
+          <a:p>
+            <a:fld id="{96DE5A63-0F1F-4DC0-ADE0-CC17EBA6F230}" type="slidenum">
+              <a:rPr lang="es-PE" smtClean="0"/>
+              <a:t>20</a:t>
+            </a:fld>
+            <a:endParaRPr lang="es-PE"/>
+          </a:p>
+        </p:txBody>
+      </p:sp>
+    </p:spTree>
+    <p:extLst>
+      <p:ext uri="{BB962C8B-B14F-4D97-AF65-F5344CB8AC3E}">
+        <p14:creationId xmlns:p14="http://schemas.microsoft.com/office/powerpoint/2010/main" val="3614550747"/>
+      </p:ext>
+    </p:extLst>
+  </p:cSld>
+  <p:clrMapOvr>
+    <a:masterClrMapping/>
+  </p:clrMapOvr>
+</p:notes>
+</file>
+
+<file path=ppt/notesSlides/notesSlide21.xml><?xml version="1.0" encoding="utf-8"?>
+<p:notes xmlns:a="http://schemas.openxmlformats.org/drawingml/2006/main" xmlns:r="http://schemas.openxmlformats.org/officeDocument/2006/relationships" xmlns:p="http://schemas.openxmlformats.org/presentationml/2006/main">
+  <p:cSld>
+    <p:spTree>
+      <p:nvGrpSpPr>
+        <p:cNvPr id="1" name=""/>
+        <p:cNvGrpSpPr/>
+        <p:nvPr/>
+      </p:nvGrpSpPr>
+      <p:grpSpPr>
+        <a:xfrm>
+          <a:off x="0" y="0"/>
+          <a:ext cx="0" cy="0"/>
+          <a:chOff x="0" y="0"/>
+          <a:chExt cx="0" cy="0"/>
+        </a:xfrm>
+      </p:grpSpPr>
+      <p:sp>
+        <p:nvSpPr>
+          <p:cNvPr id="2" name="1 Marcador de imagen de diapositiva"/>
+          <p:cNvSpPr>
+            <a:spLocks noGrp="1" noRot="1" noChangeAspect="1"/>
+          </p:cNvSpPr>
+          <p:nvPr>
+            <p:ph type="sldImg"/>
+          </p:nvPr>
+        </p:nvSpPr>
+        <p:spPr/>
+      </p:sp>
+      <p:sp>
+        <p:nvSpPr>
+          <p:cNvPr id="3" name="2 Marcador de notas"/>
+          <p:cNvSpPr>
+            <a:spLocks noGrp="1"/>
+          </p:cNvSpPr>
+          <p:nvPr>
+            <p:ph type="body" idx="1"/>
+          </p:nvPr>
+        </p:nvSpPr>
+        <p:spPr/>
+        <p:txBody>
+          <a:bodyPr/>
+          <a:lstStyle/>
+          <a:p>
+            <a:pPr algn="l"/>
+            <a:endParaRPr lang="es-PE" dirty="0"/>
+          </a:p>
+        </p:txBody>
+      </p:sp>
+      <p:sp>
+        <p:nvSpPr>
+          <p:cNvPr id="4" name="3 Marcador de número de diapositiva"/>
+          <p:cNvSpPr>
+            <a:spLocks noGrp="1"/>
+          </p:cNvSpPr>
+          <p:nvPr>
+            <p:ph type="sldNum" sz="quarter" idx="10"/>
+          </p:nvPr>
+        </p:nvSpPr>
+        <p:spPr/>
+        <p:txBody>
+          <a:bodyPr/>
+          <a:lstStyle/>
+          <a:p>
+            <a:fld id="{96DE5A63-0F1F-4DC0-ADE0-CC17EBA6F230}" type="slidenum">
+              <a:rPr lang="es-PE" smtClean="0"/>
+              <a:t>21</a:t>
+            </a:fld>
+            <a:endParaRPr lang="es-PE"/>
+          </a:p>
+        </p:txBody>
+      </p:sp>
+    </p:spTree>
+    <p:extLst>
+      <p:ext uri="{BB962C8B-B14F-4D97-AF65-F5344CB8AC3E}">
+        <p14:creationId xmlns:p14="http://schemas.microsoft.com/office/powerpoint/2010/main" val="3614550747"/>
+      </p:ext>
+    </p:extLst>
+  </p:cSld>
+  <p:clrMapOvr>
+    <a:masterClrMapping/>
+  </p:clrMapOvr>
+</p:notes>
+</file>
+
+<file path=ppt/notesSlides/notesSlide22.xml><?xml version="1.0" encoding="utf-8"?>
+<p:notes xmlns:a="http://schemas.openxmlformats.org/drawingml/2006/main" xmlns:r="http://schemas.openxmlformats.org/officeDocument/2006/relationships" xmlns:p="http://schemas.openxmlformats.org/presentationml/2006/main">
+  <p:cSld>
+    <p:spTree>
+      <p:nvGrpSpPr>
+        <p:cNvPr id="1" name=""/>
+        <p:cNvGrpSpPr/>
+        <p:nvPr/>
+      </p:nvGrpSpPr>
+      <p:grpSpPr>
+        <a:xfrm>
+          <a:off x="0" y="0"/>
+          <a:ext cx="0" cy="0"/>
+          <a:chOff x="0" y="0"/>
+          <a:chExt cx="0" cy="0"/>
+        </a:xfrm>
+      </p:grpSpPr>
+      <p:sp>
+        <p:nvSpPr>
+          <p:cNvPr id="2" name="1 Marcador de imagen de diapositiva"/>
+          <p:cNvSpPr>
+            <a:spLocks noGrp="1" noRot="1" noChangeAspect="1"/>
+          </p:cNvSpPr>
+          <p:nvPr>
+            <p:ph type="sldImg"/>
+          </p:nvPr>
+        </p:nvSpPr>
+        <p:spPr/>
+      </p:sp>
+      <p:sp>
+        <p:nvSpPr>
+          <p:cNvPr id="3" name="2 Marcador de notas"/>
+          <p:cNvSpPr>
+            <a:spLocks noGrp="1"/>
+          </p:cNvSpPr>
+          <p:nvPr>
+            <p:ph type="body" idx="1"/>
+          </p:nvPr>
+        </p:nvSpPr>
+        <p:spPr/>
+        <p:txBody>
+          <a:bodyPr/>
+          <a:lstStyle/>
+          <a:p>
+            <a:pPr algn="l"/>
+            <a:endParaRPr lang="es-PE" dirty="0"/>
+          </a:p>
+        </p:txBody>
+      </p:sp>
+      <p:sp>
+        <p:nvSpPr>
+          <p:cNvPr id="4" name="3 Marcador de número de diapositiva"/>
+          <p:cNvSpPr>
+            <a:spLocks noGrp="1"/>
+          </p:cNvSpPr>
+          <p:nvPr>
+            <p:ph type="sldNum" sz="quarter" idx="10"/>
+          </p:nvPr>
+        </p:nvSpPr>
+        <p:spPr/>
+        <p:txBody>
+          <a:bodyPr/>
+          <a:lstStyle/>
+          <a:p>
+            <a:fld id="{96DE5A63-0F1F-4DC0-ADE0-CC17EBA6F230}" type="slidenum">
+              <a:rPr lang="es-PE" smtClean="0"/>
+              <a:t>22</a:t>
+            </a:fld>
+            <a:endParaRPr lang="es-PE"/>
+          </a:p>
+        </p:txBody>
+      </p:sp>
+    </p:spTree>
+    <p:extLst>
+      <p:ext uri="{BB962C8B-B14F-4D97-AF65-F5344CB8AC3E}">
+        <p14:creationId xmlns:p14="http://schemas.microsoft.com/office/powerpoint/2010/main" val="3614550747"/>
+      </p:ext>
+    </p:extLst>
+  </p:cSld>
+  <p:clrMapOvr>
+    <a:masterClrMapping/>
+  </p:clrMapOvr>
+</p:notes>
+</file>
+
+<file path=ppt/notesSlides/notesSlide23.xml><?xml version="1.0" encoding="utf-8"?>
+<p:notes xmlns:a="http://schemas.openxmlformats.org/drawingml/2006/main" xmlns:r="http://schemas.openxmlformats.org/officeDocument/2006/relationships" xmlns:p="http://schemas.openxmlformats.org/presentationml/2006/main">
+  <p:cSld>
+    <p:spTree>
+      <p:nvGrpSpPr>
+        <p:cNvPr id="1" name=""/>
+        <p:cNvGrpSpPr/>
+        <p:nvPr/>
+      </p:nvGrpSpPr>
+      <p:grpSpPr>
+        <a:xfrm>
+          <a:off x="0" y="0"/>
+          <a:ext cx="0" cy="0"/>
+          <a:chOff x="0" y="0"/>
+          <a:chExt cx="0" cy="0"/>
+        </a:xfrm>
+      </p:grpSpPr>
+      <p:sp>
+        <p:nvSpPr>
+          <p:cNvPr id="2" name="1 Marcador de imagen de diapositiva"/>
+          <p:cNvSpPr>
+            <a:spLocks noGrp="1" noRot="1" noChangeAspect="1"/>
+          </p:cNvSpPr>
+          <p:nvPr>
+            <p:ph type="sldImg"/>
+          </p:nvPr>
+        </p:nvSpPr>
+        <p:spPr/>
+      </p:sp>
+      <p:sp>
+        <p:nvSpPr>
+          <p:cNvPr id="3" name="2 Marcador de notas"/>
+          <p:cNvSpPr>
+            <a:spLocks noGrp="1"/>
+          </p:cNvSpPr>
+          <p:nvPr>
+            <p:ph type="body" idx="1"/>
+          </p:nvPr>
+        </p:nvSpPr>
+        <p:spPr/>
+        <p:txBody>
+          <a:bodyPr/>
+          <a:lstStyle/>
+          <a:p>
+            <a:pPr algn="l"/>
+            <a:endParaRPr lang="es-PE" dirty="0"/>
+          </a:p>
+        </p:txBody>
+      </p:sp>
+      <p:sp>
+        <p:nvSpPr>
+          <p:cNvPr id="4" name="3 Marcador de número de diapositiva"/>
+          <p:cNvSpPr>
+            <a:spLocks noGrp="1"/>
+          </p:cNvSpPr>
+          <p:nvPr>
+            <p:ph type="sldNum" sz="quarter" idx="10"/>
+          </p:nvPr>
+        </p:nvSpPr>
+        <p:spPr/>
+        <p:txBody>
+          <a:bodyPr/>
+          <a:lstStyle/>
+          <a:p>
+            <a:fld id="{96DE5A63-0F1F-4DC0-ADE0-CC17EBA6F230}" type="slidenum">
+              <a:rPr lang="es-PE" smtClean="0"/>
+              <a:t>23</a:t>
             </a:fld>
             <a:endParaRPr lang="es-PE"/>
           </a:p>
@@ -2040,7 +2918,7 @@
             <a:fld id="{807CB568-C05F-482F-9F26-AA302B8892DF}" type="datetimeFigureOut">
               <a:rPr lang="es-ES" smtClean="0"/>
               <a:pPr/>
-              <a:t>09/09/2011</a:t>
+              <a:t>29/09/2011</a:t>
             </a:fld>
             <a:endParaRPr lang="es-ES"/>
           </a:p>
@@ -2219,7 +3097,7 @@
             <a:fld id="{807CB568-C05F-482F-9F26-AA302B8892DF}" type="datetimeFigureOut">
               <a:rPr lang="es-ES" smtClean="0"/>
               <a:pPr/>
-              <a:t>09/09/2011</a:t>
+              <a:t>29/09/2011</a:t>
             </a:fld>
             <a:endParaRPr lang="es-ES"/>
           </a:p>
@@ -2408,7 +3286,7 @@
             <a:fld id="{807CB568-C05F-482F-9F26-AA302B8892DF}" type="datetimeFigureOut">
               <a:rPr lang="es-ES" smtClean="0"/>
               <a:pPr/>
-              <a:t>09/09/2011</a:t>
+              <a:t>29/09/2011</a:t>
             </a:fld>
             <a:endParaRPr lang="es-ES"/>
           </a:p>
@@ -2587,7 +3465,7 @@
             <a:fld id="{807CB568-C05F-482F-9F26-AA302B8892DF}" type="datetimeFigureOut">
               <a:rPr lang="es-ES" smtClean="0"/>
               <a:pPr/>
-              <a:t>09/09/2011</a:t>
+              <a:t>29/09/2011</a:t>
             </a:fld>
             <a:endParaRPr lang="es-ES"/>
           </a:p>
@@ -2842,7 +3720,7 @@
             <a:fld id="{807CB568-C05F-482F-9F26-AA302B8892DF}" type="datetimeFigureOut">
               <a:rPr lang="es-ES" smtClean="0"/>
               <a:pPr/>
-              <a:t>09/09/2011</a:t>
+              <a:t>29/09/2011</a:t>
             </a:fld>
             <a:endParaRPr lang="es-ES"/>
           </a:p>
@@ -3139,7 +4017,7 @@
             <a:fld id="{807CB568-C05F-482F-9F26-AA302B8892DF}" type="datetimeFigureOut">
               <a:rPr lang="es-ES" smtClean="0"/>
               <a:pPr/>
-              <a:t>09/09/2011</a:t>
+              <a:t>29/09/2011</a:t>
             </a:fld>
             <a:endParaRPr lang="es-ES"/>
           </a:p>
@@ -3570,7 +4448,7 @@
             <a:fld id="{807CB568-C05F-482F-9F26-AA302B8892DF}" type="datetimeFigureOut">
               <a:rPr lang="es-ES" smtClean="0"/>
               <a:pPr/>
-              <a:t>09/09/2011</a:t>
+              <a:t>29/09/2011</a:t>
             </a:fld>
             <a:endParaRPr lang="es-ES"/>
           </a:p>
@@ -3697,7 +4575,7 @@
             <a:fld id="{807CB568-C05F-482F-9F26-AA302B8892DF}" type="datetimeFigureOut">
               <a:rPr lang="es-ES" smtClean="0"/>
               <a:pPr/>
-              <a:t>09/09/2011</a:t>
+              <a:t>29/09/2011</a:t>
             </a:fld>
             <a:endParaRPr lang="es-ES"/>
           </a:p>
@@ -3801,7 +4679,7 @@
             <a:fld id="{807CB568-C05F-482F-9F26-AA302B8892DF}" type="datetimeFigureOut">
               <a:rPr lang="es-ES" smtClean="0"/>
               <a:pPr/>
-              <a:t>09/09/2011</a:t>
+              <a:t>29/09/2011</a:t>
             </a:fld>
             <a:endParaRPr lang="es-ES"/>
           </a:p>
@@ -4087,7 +4965,7 @@
             <a:fld id="{807CB568-C05F-482F-9F26-AA302B8892DF}" type="datetimeFigureOut">
               <a:rPr lang="es-ES" smtClean="0"/>
               <a:pPr/>
-              <a:t>09/09/2011</a:t>
+              <a:t>29/09/2011</a:t>
             </a:fld>
             <a:endParaRPr lang="es-ES"/>
           </a:p>
@@ -4356,7 +5234,7 @@
             <a:fld id="{807CB568-C05F-482F-9F26-AA302B8892DF}" type="datetimeFigureOut">
               <a:rPr lang="es-ES" smtClean="0"/>
               <a:pPr/>
-              <a:t>09/09/2011</a:t>
+              <a:t>29/09/2011</a:t>
             </a:fld>
             <a:endParaRPr lang="es-ES"/>
           </a:p>
@@ -4607,7 +5485,7 @@
             <a:fld id="{807CB568-C05F-482F-9F26-AA302B8892DF}" type="datetimeFigureOut">
               <a:rPr lang="es-ES" smtClean="0"/>
               <a:pPr/>
-              <a:t>09/09/2011</a:t>
+              <a:t>29/09/2011</a:t>
             </a:fld>
             <a:endParaRPr lang="es-ES"/>
           </a:p>
@@ -5462,6 +6340,180 @@
                   <a:srgbClr val="FF0000"/>
                 </a:solidFill>
               </a:rPr>
+              <a:t>Premios</a:t>
+            </a:r>
+            <a:endParaRPr lang="es-PE" dirty="0">
+              <a:solidFill>
+                <a:srgbClr val="FF0000"/>
+              </a:solidFill>
+            </a:endParaRPr>
+          </a:p>
+        </p:txBody>
+      </p:sp>
+      <p:sp>
+        <p:nvSpPr>
+          <p:cNvPr id="2" name="1 CuadroTexto"/>
+          <p:cNvSpPr txBox="1"/>
+          <p:nvPr/>
+        </p:nvSpPr>
+        <p:spPr>
+          <a:xfrm>
+            <a:off x="3547427" y="1700808"/>
+            <a:ext cx="5256584" cy="3539430"/>
+          </a:xfrm>
+          <a:prstGeom prst="rect">
+            <a:avLst/>
+          </a:prstGeom>
+          <a:noFill/>
+        </p:spPr>
+        <p:txBody>
+          <a:bodyPr wrap="square" rtlCol="0">
+            <a:spAutoFit/>
+          </a:bodyPr>
+          <a:lstStyle/>
+          <a:p>
+            <a:pPr algn="ctr"/>
+            <a:r>
+              <a:rPr lang="es-PE" sz="3200" dirty="0" smtClean="0"/>
+              <a:t>El equipo ganador de cada juego se llevará 2 licencias de </a:t>
+            </a:r>
+            <a:r>
+              <a:rPr lang="es-PE" sz="3200" i="1" dirty="0" err="1" smtClean="0"/>
+              <a:t>JetBrains</a:t>
+            </a:r>
+            <a:r>
+              <a:rPr lang="es-PE" sz="3200" i="1" dirty="0" smtClean="0"/>
+              <a:t>.</a:t>
+            </a:r>
+          </a:p>
+          <a:p>
+            <a:pPr algn="ctr"/>
+            <a:endParaRPr lang="es-PE" sz="3200" dirty="0"/>
+          </a:p>
+          <a:p>
+            <a:pPr algn="ctr"/>
+            <a:r>
+              <a:rPr lang="es-PE" sz="3200" dirty="0" smtClean="0"/>
+              <a:t>Cada licencia será válida para </a:t>
+            </a:r>
+            <a:r>
+              <a:rPr lang="es-PE" sz="3200" i="1" dirty="0" err="1" smtClean="0"/>
+              <a:t>Resharper</a:t>
+            </a:r>
+            <a:r>
+              <a:rPr lang="es-PE" sz="3200" dirty="0" smtClean="0"/>
+              <a:t> o </a:t>
+            </a:r>
+            <a:r>
+              <a:rPr lang="es-PE" sz="3200" i="1" dirty="0" err="1" smtClean="0"/>
+              <a:t>IntelliJ</a:t>
+            </a:r>
+            <a:r>
+              <a:rPr lang="es-PE" sz="3200" dirty="0" smtClean="0"/>
+              <a:t> según elección.</a:t>
+            </a:r>
+            <a:endParaRPr lang="es-PE" sz="2800" dirty="0"/>
+          </a:p>
+        </p:txBody>
+      </p:sp>
+      <p:pic>
+        <p:nvPicPr>
+          <p:cNvPr id="3" name="2 Imagen"/>
+          <p:cNvPicPr>
+            <a:picLocks noChangeAspect="1"/>
+          </p:cNvPicPr>
+          <p:nvPr/>
+        </p:nvPicPr>
+        <p:blipFill rotWithShape="1">
+          <a:blip r:embed="rId3" cstate="print">
+            <a:extLst>
+              <a:ext uri="{28A0092B-C50C-407E-A947-70E740481C1C}">
+                <a14:useLocalDpi xmlns:a14="http://schemas.microsoft.com/office/drawing/2010/main" val="0"/>
+              </a:ext>
+            </a:extLst>
+          </a:blip>
+          <a:srcRect l="31564" t="5322" r="29719" b="6045"/>
+          <a:stretch/>
+        </p:blipFill>
+        <p:spPr>
+          <a:xfrm>
+            <a:off x="467544" y="836712"/>
+            <a:ext cx="2952328" cy="5748447"/>
+          </a:xfrm>
+          <a:prstGeom prst="rect">
+            <a:avLst/>
+          </a:prstGeom>
+          <a:ln>
+            <a:noFill/>
+          </a:ln>
+          <a:effectLst>
+            <a:softEdge rad="112500"/>
+          </a:effectLst>
+        </p:spPr>
+      </p:pic>
+    </p:spTree>
+    <p:extLst>
+      <p:ext uri="{BB962C8B-B14F-4D97-AF65-F5344CB8AC3E}">
+        <p14:creationId xmlns:p14="http://schemas.microsoft.com/office/powerpoint/2010/main" val="1123983067"/>
+      </p:ext>
+    </p:extLst>
+  </p:cSld>
+  <p:clrMapOvr>
+    <a:masterClrMapping/>
+  </p:clrMapOvr>
+  <p:timing>
+    <p:tnLst>
+      <p:par>
+        <p:cTn id="1" dur="indefinite" restart="never" nodeType="tmRoot"/>
+      </p:par>
+    </p:tnLst>
+  </p:timing>
+</p:sld>
+</file>
+
+<file path=ppt/slides/slide11.xml><?xml version="1.0" encoding="utf-8"?>
+<p:sld xmlns:a="http://schemas.openxmlformats.org/drawingml/2006/main" xmlns:r="http://schemas.openxmlformats.org/officeDocument/2006/relationships" xmlns:p="http://schemas.openxmlformats.org/presentationml/2006/main">
+  <p:cSld>
+    <p:spTree>
+      <p:nvGrpSpPr>
+        <p:cNvPr id="1" name=""/>
+        <p:cNvGrpSpPr/>
+        <p:nvPr/>
+      </p:nvGrpSpPr>
+      <p:grpSpPr>
+        <a:xfrm>
+          <a:off x="0" y="0"/>
+          <a:ext cx="0" cy="0"/>
+          <a:chOff x="0" y="0"/>
+          <a:chExt cx="0" cy="0"/>
+        </a:xfrm>
+      </p:grpSpPr>
+      <p:sp>
+        <p:nvSpPr>
+          <p:cNvPr id="18" name="1 Título"/>
+          <p:cNvSpPr>
+            <a:spLocks noGrp="1"/>
+          </p:cNvSpPr>
+          <p:nvPr>
+            <p:ph type="title"/>
+          </p:nvPr>
+        </p:nvSpPr>
+        <p:spPr>
+          <a:xfrm>
+            <a:off x="457200" y="160885"/>
+            <a:ext cx="8229600" cy="792088"/>
+          </a:xfrm>
+        </p:spPr>
+        <p:txBody>
+          <a:bodyPr/>
+          <a:lstStyle/>
+          <a:p>
+            <a:r>
+              <a:rPr lang="es-PE" dirty="0" smtClean="0">
+                <a:solidFill>
+                  <a:srgbClr val="FF0000"/>
+                </a:solidFill>
+              </a:rPr>
               <a:t>Etiqueta</a:t>
             </a:r>
             <a:endParaRPr lang="es-PE" dirty="0">
@@ -5559,7 +6611,102 @@
 </p:sld>
 </file>
 
-<file path=ppt/slides/slide11.xml><?xml version="1.0" encoding="utf-8"?>
+<file path=ppt/slides/slide12.xml><?xml version="1.0" encoding="utf-8"?>
+<p:sld xmlns:a="http://schemas.openxmlformats.org/drawingml/2006/main" xmlns:r="http://schemas.openxmlformats.org/officeDocument/2006/relationships" xmlns:p="http://schemas.openxmlformats.org/presentationml/2006/main">
+  <p:cSld>
+    <p:spTree>
+      <p:nvGrpSpPr>
+        <p:cNvPr id="1" name=""/>
+        <p:cNvGrpSpPr/>
+        <p:nvPr/>
+      </p:nvGrpSpPr>
+      <p:grpSpPr>
+        <a:xfrm>
+          <a:off x="0" y="0"/>
+          <a:ext cx="0" cy="0"/>
+          <a:chOff x="0" y="0"/>
+          <a:chExt cx="0" cy="0"/>
+        </a:xfrm>
+      </p:grpSpPr>
+      <p:pic>
+        <p:nvPicPr>
+          <p:cNvPr id="4" name="3 Imagen"/>
+          <p:cNvPicPr>
+            <a:picLocks noChangeAspect="1"/>
+          </p:cNvPicPr>
+          <p:nvPr/>
+        </p:nvPicPr>
+        <p:blipFill>
+          <a:blip r:embed="rId3" cstate="print">
+            <a:extLst>
+              <a:ext uri="{28A0092B-C50C-407E-A947-70E740481C1C}">
+                <a14:useLocalDpi xmlns:a14="http://schemas.microsoft.com/office/drawing/2010/main" val="0"/>
+              </a:ext>
+            </a:extLst>
+          </a:blip>
+          <a:stretch>
+            <a:fillRect/>
+          </a:stretch>
+        </p:blipFill>
+        <p:spPr>
+          <a:xfrm>
+            <a:off x="-381804" y="13016"/>
+            <a:ext cx="9913822" cy="7173416"/>
+          </a:xfrm>
+          <a:prstGeom prst="rect">
+            <a:avLst/>
+          </a:prstGeom>
+        </p:spPr>
+      </p:pic>
+      <p:sp>
+        <p:nvSpPr>
+          <p:cNvPr id="2" name="1 Título"/>
+          <p:cNvSpPr>
+            <a:spLocks noGrp="1"/>
+          </p:cNvSpPr>
+          <p:nvPr>
+            <p:ph type="ctrTitle"/>
+          </p:nvPr>
+        </p:nvSpPr>
+        <p:spPr>
+          <a:xfrm>
+            <a:off x="-20748" y="87136"/>
+            <a:ext cx="9144000" cy="1093136"/>
+          </a:xfrm>
+        </p:spPr>
+        <p:txBody>
+          <a:bodyPr/>
+          <a:lstStyle/>
+          <a:p>
+            <a:r>
+              <a:rPr lang="es-PE" sz="11500" b="1" spc="300" dirty="0" smtClean="0"/>
+              <a:t>DEMO</a:t>
+            </a:r>
+            <a:endParaRPr lang="es-ES" sz="9600" b="1" spc="300" dirty="0"/>
+          </a:p>
+        </p:txBody>
+      </p:sp>
+    </p:spTree>
+    <p:extLst>
+      <p:ext uri="{BB962C8B-B14F-4D97-AF65-F5344CB8AC3E}">
+        <p14:creationId xmlns:p14="http://schemas.microsoft.com/office/powerpoint/2010/main" val="3149365002"/>
+      </p:ext>
+    </p:extLst>
+  </p:cSld>
+  <p:clrMapOvr>
+    <a:masterClrMapping/>
+  </p:clrMapOvr>
+  <p:timing>
+    <p:tnLst>
+      <p:par>
+        <p:cTn id="1" dur="indefinite" restart="never" nodeType="tmRoot"/>
+      </p:par>
+    </p:tnLst>
+  </p:timing>
+</p:sld>
+</file>
+
+<file path=ppt/slides/slide13.xml><?xml version="1.0" encoding="utf-8"?>
 <p:sld xmlns:a="http://schemas.openxmlformats.org/drawingml/2006/main" xmlns:r="http://schemas.openxmlformats.org/officeDocument/2006/relationships" xmlns:p="http://schemas.openxmlformats.org/presentationml/2006/main">
   <p:cSld>
     <p:spTree>
@@ -5618,8 +6765,8 @@
         </p:nvSpPr>
         <p:spPr>
           <a:xfrm>
-            <a:off x="1333267" y="5517232"/>
-            <a:ext cx="6552728" cy="1093136"/>
+            <a:off x="704264" y="5517232"/>
+            <a:ext cx="7810734" cy="1093136"/>
           </a:xfrm>
         </p:spPr>
         <p:txBody>
@@ -5628,7 +6775,11 @@
           <a:p>
             <a:r>
               <a:rPr lang="es-PE" sz="11500" b="1" spc="300" dirty="0" smtClean="0"/>
-              <a:t>1st GAME</a:t>
+              <a:t>1st </a:t>
+            </a:r>
+            <a:r>
+              <a:rPr lang="es-PE" sz="11500" b="1" spc="300" dirty="0" smtClean="0"/>
+              <a:t>COURSE</a:t>
             </a:r>
             <a:endParaRPr lang="es-ES" sz="9600" b="1" spc="300" dirty="0"/>
           </a:p>
@@ -5637,7 +6788,7 @@
     </p:spTree>
     <p:extLst>
       <p:ext uri="{BB962C8B-B14F-4D97-AF65-F5344CB8AC3E}">
-        <p14:creationId xmlns:p14="http://schemas.microsoft.com/office/powerpoint/2010/main" val="3149365002"/>
+        <p14:creationId xmlns:p14="http://schemas.microsoft.com/office/powerpoint/2010/main" val="2661519987"/>
       </p:ext>
     </p:extLst>
   </p:cSld>
@@ -5654,7 +6805,7 @@
 </p:sld>
 </file>
 
-<file path=ppt/slides/slide12.xml><?xml version="1.0" encoding="utf-8"?>
+<file path=ppt/slides/slide14.xml><?xml version="1.0" encoding="utf-8"?>
 <p:sld xmlns:a="http://schemas.openxmlformats.org/drawingml/2006/main" xmlns:r="http://schemas.openxmlformats.org/officeDocument/2006/relationships" xmlns:p="http://schemas.openxmlformats.org/presentationml/2006/main">
   <p:cSld>
     <p:spTree>
@@ -5732,15 +6883,7 @@
             <a:pPr algn="ctr"/>
             <a:r>
               <a:rPr lang="es-PE" sz="4000" dirty="0" smtClean="0"/>
-              <a:t>Aprender y practicar diversos </a:t>
-            </a:r>
-            <a:r>
-              <a:rPr lang="es-PE" sz="4000" dirty="0" smtClean="0"/>
-              <a:t>refactorizaciones tanto </a:t>
-            </a:r>
-            <a:r>
-              <a:rPr lang="es-PE" sz="4000" dirty="0" smtClean="0"/>
-              <a:t>simples como complejos</a:t>
+              <a:t>Aprender y practicar diversos refactorizaciones tanto simples como complejos</a:t>
             </a:r>
             <a:endParaRPr lang="es-PE" sz="4000" dirty="0"/>
           </a:p>
@@ -5766,7 +6909,506 @@
 </p:sld>
 </file>
 
-<file path=ppt/slides/slide13.xml><?xml version="1.0" encoding="utf-8"?>
+<file path=ppt/slides/slide15.xml><?xml version="1.0" encoding="utf-8"?>
+<p:sld xmlns:a="http://schemas.openxmlformats.org/drawingml/2006/main" xmlns:r="http://schemas.openxmlformats.org/officeDocument/2006/relationships" xmlns:p="http://schemas.openxmlformats.org/presentationml/2006/main">
+  <p:cSld>
+    <p:spTree>
+      <p:nvGrpSpPr>
+        <p:cNvPr id="1" name=""/>
+        <p:cNvGrpSpPr/>
+        <p:nvPr/>
+      </p:nvGrpSpPr>
+      <p:grpSpPr>
+        <a:xfrm>
+          <a:off x="0" y="0"/>
+          <a:ext cx="0" cy="0"/>
+          <a:chOff x="0" y="0"/>
+          <a:chExt cx="0" cy="0"/>
+        </a:xfrm>
+      </p:grpSpPr>
+      <p:sp>
+        <p:nvSpPr>
+          <p:cNvPr id="18" name="1 Título"/>
+          <p:cNvSpPr>
+            <a:spLocks noGrp="1"/>
+          </p:cNvSpPr>
+          <p:nvPr>
+            <p:ph type="title"/>
+          </p:nvPr>
+        </p:nvSpPr>
+        <p:spPr>
+          <a:xfrm>
+            <a:off x="457200" y="1589389"/>
+            <a:ext cx="8229600" cy="792088"/>
+          </a:xfrm>
+        </p:spPr>
+        <p:txBody>
+          <a:bodyPr/>
+          <a:lstStyle/>
+          <a:p>
+            <a:r>
+              <a:rPr lang="es-PE" sz="4800" dirty="0" smtClean="0">
+                <a:solidFill>
+                  <a:srgbClr val="FF0000"/>
+                </a:solidFill>
+              </a:rPr>
+              <a:t>Descripción</a:t>
+            </a:r>
+            <a:endParaRPr lang="es-PE" sz="4800" dirty="0">
+              <a:solidFill>
+                <a:srgbClr val="FF0000"/>
+              </a:solidFill>
+            </a:endParaRPr>
+          </a:p>
+        </p:txBody>
+      </p:sp>
+      <p:sp>
+        <p:nvSpPr>
+          <p:cNvPr id="2" name="1 CuadroTexto"/>
+          <p:cNvSpPr txBox="1"/>
+          <p:nvPr/>
+        </p:nvSpPr>
+        <p:spPr>
+          <a:xfrm>
+            <a:off x="611560" y="2507644"/>
+            <a:ext cx="8064896" cy="1323439"/>
+          </a:xfrm>
+          <a:prstGeom prst="rect">
+            <a:avLst/>
+          </a:prstGeom>
+          <a:noFill/>
+        </p:spPr>
+        <p:txBody>
+          <a:bodyPr wrap="square" rtlCol="0">
+            <a:spAutoFit/>
+          </a:bodyPr>
+          <a:lstStyle/>
+          <a:p>
+            <a:pPr algn="ctr"/>
+            <a:r>
+              <a:rPr lang="es-PE" sz="4000" dirty="0"/>
+              <a:t>El código </a:t>
+            </a:r>
+            <a:r>
+              <a:rPr lang="es-PE" sz="4000" dirty="0" smtClean="0"/>
+              <a:t>representa el dominio de </a:t>
+            </a:r>
+            <a:r>
+              <a:rPr lang="es-PE" sz="4000" dirty="0"/>
+              <a:t>una tienda online de bicicletas.</a:t>
+            </a:r>
+            <a:endParaRPr lang="es-PE" sz="4000" dirty="0"/>
+          </a:p>
+        </p:txBody>
+      </p:sp>
+    </p:spTree>
+    <p:extLst>
+      <p:ext uri="{BB962C8B-B14F-4D97-AF65-F5344CB8AC3E}">
+        <p14:creationId xmlns:p14="http://schemas.microsoft.com/office/powerpoint/2010/main" val="2864752739"/>
+      </p:ext>
+    </p:extLst>
+  </p:cSld>
+  <p:clrMapOvr>
+    <a:masterClrMapping/>
+  </p:clrMapOvr>
+  <p:timing>
+    <p:tnLst>
+      <p:par>
+        <p:cTn id="1" dur="indefinite" restart="never" nodeType="tmRoot"/>
+      </p:par>
+    </p:tnLst>
+  </p:timing>
+</p:sld>
+</file>
+
+<file path=ppt/slides/slide16.xml><?xml version="1.0" encoding="utf-8"?>
+<p:sld xmlns:a="http://schemas.openxmlformats.org/drawingml/2006/main" xmlns:r="http://schemas.openxmlformats.org/officeDocument/2006/relationships" xmlns:p="http://schemas.openxmlformats.org/presentationml/2006/main">
+  <p:cSld>
+    <p:spTree>
+      <p:nvGrpSpPr>
+        <p:cNvPr id="1" name=""/>
+        <p:cNvGrpSpPr/>
+        <p:nvPr/>
+      </p:nvGrpSpPr>
+      <p:grpSpPr>
+        <a:xfrm>
+          <a:off x="0" y="0"/>
+          <a:ext cx="0" cy="0"/>
+          <a:chOff x="0" y="0"/>
+          <a:chExt cx="0" cy="0"/>
+        </a:xfrm>
+      </p:grpSpPr>
+      <p:sp>
+        <p:nvSpPr>
+          <p:cNvPr id="18" name="1 Título"/>
+          <p:cNvSpPr>
+            <a:spLocks noGrp="1"/>
+          </p:cNvSpPr>
+          <p:nvPr>
+            <p:ph type="title"/>
+          </p:nvPr>
+        </p:nvSpPr>
+        <p:spPr>
+          <a:xfrm>
+            <a:off x="457200" y="162000"/>
+            <a:ext cx="8229600" cy="792088"/>
+          </a:xfrm>
+        </p:spPr>
+        <p:txBody>
+          <a:bodyPr/>
+          <a:lstStyle/>
+          <a:p>
+            <a:r>
+              <a:rPr lang="es-PE" sz="4800" dirty="0" smtClean="0">
+                <a:solidFill>
+                  <a:srgbClr val="FF0000"/>
+                </a:solidFill>
+              </a:rPr>
+              <a:t>Reglas</a:t>
+            </a:r>
+            <a:endParaRPr lang="es-PE" sz="4800" dirty="0">
+              <a:solidFill>
+                <a:srgbClr val="FF0000"/>
+              </a:solidFill>
+            </a:endParaRPr>
+          </a:p>
+        </p:txBody>
+      </p:sp>
+      <p:sp>
+        <p:nvSpPr>
+          <p:cNvPr id="2" name="1 CuadroTexto"/>
+          <p:cNvSpPr txBox="1"/>
+          <p:nvPr/>
+        </p:nvSpPr>
+        <p:spPr>
+          <a:xfrm>
+            <a:off x="251520" y="908720"/>
+            <a:ext cx="8640960" cy="1569660"/>
+          </a:xfrm>
+          <a:prstGeom prst="rect">
+            <a:avLst/>
+          </a:prstGeom>
+          <a:noFill/>
+        </p:spPr>
+        <p:txBody>
+          <a:bodyPr wrap="square" rtlCol="0">
+            <a:spAutoFit/>
+          </a:bodyPr>
+          <a:lstStyle/>
+          <a:p>
+            <a:pPr algn="ctr"/>
+            <a:r>
+              <a:rPr lang="es-PE" sz="3200" dirty="0" smtClean="0"/>
+              <a:t>Es </a:t>
+            </a:r>
+            <a:r>
+              <a:rPr lang="es-PE" sz="3200" dirty="0" smtClean="0"/>
+              <a:t>un juego </a:t>
+            </a:r>
+            <a:r>
+              <a:rPr lang="es-PE" sz="3200" dirty="0" smtClean="0"/>
+              <a:t>de 4 hoyos, todos los equipos comenzarán en el </a:t>
+            </a:r>
+            <a:r>
+              <a:rPr lang="es-PE" sz="3200" dirty="0" err="1" smtClean="0"/>
+              <a:t>tee</a:t>
+            </a:r>
+            <a:r>
+              <a:rPr lang="es-PE" sz="3200" dirty="0" smtClean="0"/>
+              <a:t> y en los siguientes hoyos de manera simultanea.</a:t>
+            </a:r>
+          </a:p>
+        </p:txBody>
+      </p:sp>
+      <p:pic>
+        <p:nvPicPr>
+          <p:cNvPr id="1026" name="Picture 2"/>
+          <p:cNvPicPr>
+            <a:picLocks noChangeAspect="1" noChangeArrowheads="1"/>
+          </p:cNvPicPr>
+          <p:nvPr/>
+        </p:nvPicPr>
+        <p:blipFill>
+          <a:blip r:embed="rId3">
+            <a:extLst>
+              <a:ext uri="{28A0092B-C50C-407E-A947-70E740481C1C}">
+                <a14:useLocalDpi xmlns:a14="http://schemas.microsoft.com/office/drawing/2010/main" val="0"/>
+              </a:ext>
+            </a:extLst>
+          </a:blip>
+          <a:srcRect/>
+          <a:stretch>
+            <a:fillRect/>
+          </a:stretch>
+        </p:blipFill>
+        <p:spPr bwMode="auto">
+          <a:xfrm>
+            <a:off x="3085413" y="2564904"/>
+            <a:ext cx="3096344" cy="2750042"/>
+          </a:xfrm>
+          <a:prstGeom prst="rect">
+            <a:avLst/>
+          </a:prstGeom>
+          <a:ln>
+            <a:noFill/>
+          </a:ln>
+          <a:effectLst>
+            <a:softEdge rad="112500"/>
+          </a:effectLst>
+          <a:extLst>
+            <a:ext uri="{909E8E84-426E-40DD-AFC4-6F175D3DCCD1}">
+              <a14:hiddenFill xmlns:a14="http://schemas.microsoft.com/office/drawing/2010/main">
+                <a:solidFill>
+                  <a:schemeClr val="accent1"/>
+                </a:solidFill>
+              </a14:hiddenFill>
+            </a:ext>
+            <a:ext uri="{91240B29-F687-4F45-9708-019B960494DF}">
+              <a14:hiddenLine xmlns:a14="http://schemas.microsoft.com/office/drawing/2010/main" w="9525">
+                <a:solidFill>
+                  <a:schemeClr val="tx1"/>
+                </a:solidFill>
+                <a:miter lim="800000"/>
+                <a:headEnd/>
+                <a:tailEnd/>
+              </a14:hiddenLine>
+            </a:ext>
+            <a:ext uri="{AF507438-7753-43E0-B8FC-AC1667EBCBE1}">
+              <a14:hiddenEffects xmlns:a14="http://schemas.microsoft.com/office/drawing/2010/main">
+                <a:effectLst>
+                  <a:outerShdw dist="35921" dir="2700000" algn="ctr" rotWithShape="0">
+                    <a:schemeClr val="bg2"/>
+                  </a:outerShdw>
+                </a:effectLst>
+              </a14:hiddenEffects>
+            </a:ext>
+          </a:extLst>
+        </p:spPr>
+      </p:pic>
+      <p:sp>
+        <p:nvSpPr>
+          <p:cNvPr id="3" name="2 Rectángulo"/>
+          <p:cNvSpPr/>
+          <p:nvPr/>
+        </p:nvSpPr>
+        <p:spPr>
+          <a:xfrm>
+            <a:off x="251520" y="5373216"/>
+            <a:ext cx="8640960" cy="1077218"/>
+          </a:xfrm>
+          <a:prstGeom prst="rect">
+            <a:avLst/>
+          </a:prstGeom>
+        </p:spPr>
+        <p:txBody>
+          <a:bodyPr wrap="square">
+            <a:spAutoFit/>
+          </a:bodyPr>
+          <a:lstStyle/>
+          <a:p>
+            <a:pPr algn="ctr"/>
+            <a:r>
+              <a:rPr lang="es-PE" sz="3200" dirty="0" smtClean="0"/>
+              <a:t>El tiempo por hoyo es 10 minutos, al finalizar cada hoyo el mejor equipo mostrará sus resultados.</a:t>
+            </a:r>
+            <a:endParaRPr lang="es-PE" sz="3200" dirty="0"/>
+          </a:p>
+        </p:txBody>
+      </p:sp>
+    </p:spTree>
+    <p:extLst>
+      <p:ext uri="{BB962C8B-B14F-4D97-AF65-F5344CB8AC3E}">
+        <p14:creationId xmlns:p14="http://schemas.microsoft.com/office/powerpoint/2010/main" val="3539184923"/>
+      </p:ext>
+    </p:extLst>
+  </p:cSld>
+  <p:clrMapOvr>
+    <a:masterClrMapping/>
+  </p:clrMapOvr>
+  <p:timing>
+    <p:tnLst>
+      <p:par>
+        <p:cTn id="1" dur="indefinite" restart="never" nodeType="tmRoot"/>
+      </p:par>
+    </p:tnLst>
+  </p:timing>
+</p:sld>
+</file>
+
+<file path=ppt/slides/slide17.xml><?xml version="1.0" encoding="utf-8"?>
+<p:sld xmlns:a="http://schemas.openxmlformats.org/drawingml/2006/main" xmlns:r="http://schemas.openxmlformats.org/officeDocument/2006/relationships" xmlns:p="http://schemas.openxmlformats.org/presentationml/2006/main">
+  <p:cSld>
+    <p:spTree>
+      <p:nvGrpSpPr>
+        <p:cNvPr id="1" name=""/>
+        <p:cNvGrpSpPr/>
+        <p:nvPr/>
+      </p:nvGrpSpPr>
+      <p:grpSpPr>
+        <a:xfrm>
+          <a:off x="0" y="0"/>
+          <a:ext cx="0" cy="0"/>
+          <a:chOff x="0" y="0"/>
+          <a:chExt cx="0" cy="0"/>
+        </a:xfrm>
+      </p:grpSpPr>
+      <p:sp>
+        <p:nvSpPr>
+          <p:cNvPr id="18" name="1 Título"/>
+          <p:cNvSpPr>
+            <a:spLocks noGrp="1"/>
+          </p:cNvSpPr>
+          <p:nvPr>
+            <p:ph type="title"/>
+          </p:nvPr>
+        </p:nvSpPr>
+        <p:spPr>
+          <a:xfrm>
+            <a:off x="457200" y="162000"/>
+            <a:ext cx="8229600" cy="792088"/>
+          </a:xfrm>
+        </p:spPr>
+        <p:txBody>
+          <a:bodyPr/>
+          <a:lstStyle/>
+          <a:p>
+            <a:r>
+              <a:rPr lang="es-PE" sz="4800" dirty="0" smtClean="0">
+                <a:solidFill>
+                  <a:srgbClr val="FF0000"/>
+                </a:solidFill>
+              </a:rPr>
+              <a:t>Listos </a:t>
+            </a:r>
+            <a:r>
+              <a:rPr lang="es-PE" sz="4800" dirty="0">
+                <a:solidFill>
+                  <a:srgbClr val="FF0000"/>
+                </a:solidFill>
+              </a:rPr>
+              <a:t>P</a:t>
+            </a:r>
+            <a:r>
+              <a:rPr lang="es-PE" sz="4800" dirty="0" smtClean="0">
+                <a:solidFill>
+                  <a:srgbClr val="FF0000"/>
+                </a:solidFill>
+              </a:rPr>
+              <a:t>ara Comenzar</a:t>
+            </a:r>
+            <a:endParaRPr lang="es-PE" sz="4800" dirty="0">
+              <a:solidFill>
+                <a:srgbClr val="FF0000"/>
+              </a:solidFill>
+            </a:endParaRPr>
+          </a:p>
+        </p:txBody>
+      </p:sp>
+      <p:sp>
+        <p:nvSpPr>
+          <p:cNvPr id="2" name="1 CuadroTexto"/>
+          <p:cNvSpPr txBox="1"/>
+          <p:nvPr/>
+        </p:nvSpPr>
+        <p:spPr>
+          <a:xfrm>
+            <a:off x="251520" y="1208941"/>
+            <a:ext cx="8640960" cy="4524315"/>
+          </a:xfrm>
+          <a:prstGeom prst="rect">
+            <a:avLst/>
+          </a:prstGeom>
+          <a:noFill/>
+        </p:spPr>
+        <p:txBody>
+          <a:bodyPr wrap="square" rtlCol="0">
+            <a:spAutoFit/>
+          </a:bodyPr>
+          <a:lstStyle/>
+          <a:p>
+            <a:pPr marL="457200" indent="-457200">
+              <a:buFont typeface="Arial" pitchFamily="34" charset="0"/>
+              <a:buChar char="•"/>
+            </a:pPr>
+            <a:r>
+              <a:rPr lang="es-PE" sz="3200" dirty="0" smtClean="0"/>
+              <a:t>Abrir el código inicial en el IDE.</a:t>
+            </a:r>
+          </a:p>
+          <a:p>
+            <a:pPr marL="457200" indent="-457200">
+              <a:buFont typeface="Arial" pitchFamily="34" charset="0"/>
+              <a:buChar char="•"/>
+            </a:pPr>
+            <a:endParaRPr lang="es-PE" sz="3200" dirty="0"/>
+          </a:p>
+          <a:p>
+            <a:pPr marL="457200" indent="-457200">
+              <a:buFont typeface="Arial" pitchFamily="34" charset="0"/>
+              <a:buChar char="•"/>
+            </a:pPr>
+            <a:r>
+              <a:rPr lang="es-PE" sz="3200" dirty="0" smtClean="0"/>
+              <a:t>Asegurarse que compile y todos los test se pasen.</a:t>
+            </a:r>
+          </a:p>
+          <a:p>
+            <a:pPr marL="457200" indent="-457200">
+              <a:buFont typeface="Arial" pitchFamily="34" charset="0"/>
+              <a:buChar char="•"/>
+            </a:pPr>
+            <a:endParaRPr lang="es-PE" sz="3200" dirty="0"/>
+          </a:p>
+          <a:p>
+            <a:pPr marL="457200" indent="-457200">
+              <a:buFont typeface="Arial" pitchFamily="34" charset="0"/>
+              <a:buChar char="•"/>
+            </a:pPr>
+            <a:r>
+              <a:rPr lang="es-PE" sz="3200" dirty="0" smtClean="0"/>
+              <a:t>No se olviden las actividades de cada rol del equipo.</a:t>
+            </a:r>
+          </a:p>
+          <a:p>
+            <a:pPr marL="457200" indent="-457200">
+              <a:buFont typeface="Arial" pitchFamily="34" charset="0"/>
+              <a:buChar char="•"/>
+            </a:pPr>
+            <a:endParaRPr lang="es-PE" sz="3200" dirty="0"/>
+          </a:p>
+          <a:p>
+            <a:pPr marL="457200" indent="-457200">
+              <a:buFont typeface="Arial" pitchFamily="34" charset="0"/>
+              <a:buChar char="•"/>
+            </a:pPr>
+            <a:r>
+              <a:rPr lang="es-PE" sz="3200" dirty="0" smtClean="0"/>
+              <a:t>Tienen 10 minutos por hoyo.</a:t>
+            </a:r>
+          </a:p>
+        </p:txBody>
+      </p:sp>
+    </p:spTree>
+    <p:extLst>
+      <p:ext uri="{BB962C8B-B14F-4D97-AF65-F5344CB8AC3E}">
+        <p14:creationId xmlns:p14="http://schemas.microsoft.com/office/powerpoint/2010/main" val="2616784292"/>
+      </p:ext>
+    </p:extLst>
+  </p:cSld>
+  <p:clrMapOvr>
+    <a:masterClrMapping/>
+  </p:clrMapOvr>
+  <p:timing>
+    <p:tnLst>
+      <p:par>
+        <p:cTn id="1" dur="indefinite" restart="never" nodeType="tmRoot"/>
+      </p:par>
+    </p:tnLst>
+  </p:timing>
+</p:sld>
+</file>
+
+<file path=ppt/slides/slide18.xml><?xml version="1.0" encoding="utf-8"?>
 <p:sld xmlns:a="http://schemas.openxmlformats.org/drawingml/2006/main" xmlns:r="http://schemas.openxmlformats.org/officeDocument/2006/relationships" xmlns:p="http://schemas.openxmlformats.org/presentationml/2006/main">
   <p:cSld>
     <p:spTree>
@@ -5825,8 +7467,8 @@
         </p:nvSpPr>
         <p:spPr>
           <a:xfrm>
-            <a:off x="1093494" y="5445224"/>
-            <a:ext cx="6957012" cy="1093136"/>
+            <a:off x="359532" y="5445224"/>
+            <a:ext cx="8424936" cy="1093136"/>
           </a:xfrm>
         </p:spPr>
         <p:txBody>
@@ -5835,7 +7477,11 @@
           <a:p>
             <a:r>
               <a:rPr lang="es-PE" sz="11500" b="1" spc="300" dirty="0" smtClean="0"/>
-              <a:t>2nd GAME</a:t>
+              <a:t>2nd </a:t>
+            </a:r>
+            <a:r>
+              <a:rPr lang="es-PE" sz="11500" b="1" spc="300" dirty="0" smtClean="0"/>
+              <a:t>COURSE</a:t>
             </a:r>
             <a:endParaRPr lang="es-ES" sz="9600" b="1" spc="300" dirty="0"/>
           </a:p>
@@ -5861,7 +7507,7 @@
 </p:sld>
 </file>
 
-<file path=ppt/slides/slide14.xml><?xml version="1.0" encoding="utf-8"?>
+<file path=ppt/slides/slide19.xml><?xml version="1.0" encoding="utf-8"?>
 <p:sld xmlns:a="http://schemas.openxmlformats.org/drawingml/2006/main" xmlns:r="http://schemas.openxmlformats.org/officeDocument/2006/relationships" xmlns:p="http://schemas.openxmlformats.org/presentationml/2006/main">
   <p:cSld>
     <p:spTree>
@@ -6138,7 +7784,6 @@
               <a:rPr lang="es-PE" sz="3000" dirty="0"/>
               <a:t>mejores soluciones serán presentadas al resto de los asistentes.</a:t>
             </a:r>
-            <a:endParaRPr lang="es-PE" sz="3000" dirty="0"/>
           </a:p>
         </p:txBody>
       </p:sp>
@@ -6146,6 +7791,655 @@
     <p:extLst>
       <p:ext uri="{BB962C8B-B14F-4D97-AF65-F5344CB8AC3E}">
         <p14:creationId xmlns:p14="http://schemas.microsoft.com/office/powerpoint/2010/main" val="2961369227"/>
+      </p:ext>
+    </p:extLst>
+  </p:cSld>
+  <p:clrMapOvr>
+    <a:masterClrMapping/>
+  </p:clrMapOvr>
+  <p:timing>
+    <p:tnLst>
+      <p:par>
+        <p:cTn id="1" dur="indefinite" restart="never" nodeType="tmRoot"/>
+      </p:par>
+    </p:tnLst>
+  </p:timing>
+</p:sld>
+</file>
+
+<file path=ppt/slides/slide20.xml><?xml version="1.0" encoding="utf-8"?>
+<p:sld xmlns:a="http://schemas.openxmlformats.org/drawingml/2006/main" xmlns:r="http://schemas.openxmlformats.org/officeDocument/2006/relationships" xmlns:p="http://schemas.openxmlformats.org/presentationml/2006/main">
+  <p:cSld>
+    <p:spTree>
+      <p:nvGrpSpPr>
+        <p:cNvPr id="1" name=""/>
+        <p:cNvGrpSpPr/>
+        <p:nvPr/>
+      </p:nvGrpSpPr>
+      <p:grpSpPr>
+        <a:xfrm>
+          <a:off x="0" y="0"/>
+          <a:ext cx="0" cy="0"/>
+          <a:chOff x="0" y="0"/>
+          <a:chExt cx="0" cy="0"/>
+        </a:xfrm>
+      </p:grpSpPr>
+      <p:sp>
+        <p:nvSpPr>
+          <p:cNvPr id="18" name="1 Título"/>
+          <p:cNvSpPr>
+            <a:spLocks noGrp="1"/>
+          </p:cNvSpPr>
+          <p:nvPr>
+            <p:ph type="title"/>
+          </p:nvPr>
+        </p:nvSpPr>
+        <p:spPr>
+          <a:xfrm>
+            <a:off x="457200" y="1589389"/>
+            <a:ext cx="8229600" cy="792088"/>
+          </a:xfrm>
+        </p:spPr>
+        <p:txBody>
+          <a:bodyPr/>
+          <a:lstStyle/>
+          <a:p>
+            <a:r>
+              <a:rPr lang="es-PE" sz="4800" dirty="0" smtClean="0">
+                <a:solidFill>
+                  <a:srgbClr val="FF0000"/>
+                </a:solidFill>
+              </a:rPr>
+              <a:t>Descripción</a:t>
+            </a:r>
+            <a:endParaRPr lang="es-PE" sz="4800" dirty="0">
+              <a:solidFill>
+                <a:srgbClr val="FF0000"/>
+              </a:solidFill>
+            </a:endParaRPr>
+          </a:p>
+        </p:txBody>
+      </p:sp>
+      <p:sp>
+        <p:nvSpPr>
+          <p:cNvPr id="2" name="1 CuadroTexto"/>
+          <p:cNvSpPr txBox="1"/>
+          <p:nvPr/>
+        </p:nvSpPr>
+        <p:spPr>
+          <a:xfrm>
+            <a:off x="611560" y="2507644"/>
+            <a:ext cx="8064896" cy="1323439"/>
+          </a:xfrm>
+          <a:prstGeom prst="rect">
+            <a:avLst/>
+          </a:prstGeom>
+          <a:noFill/>
+        </p:spPr>
+        <p:txBody>
+          <a:bodyPr wrap="square" rtlCol="0">
+            <a:spAutoFit/>
+          </a:bodyPr>
+          <a:lstStyle/>
+          <a:p>
+            <a:pPr algn="ctr"/>
+            <a:r>
+              <a:rPr lang="es-PE" sz="4000" dirty="0"/>
+              <a:t>El código </a:t>
+            </a:r>
+            <a:r>
+              <a:rPr lang="es-PE" sz="4000" dirty="0" smtClean="0"/>
+              <a:t>es de una clase que representa a un </a:t>
+            </a:r>
+            <a:r>
+              <a:rPr lang="es-PE" sz="4000" dirty="0" err="1" smtClean="0"/>
+              <a:t>Stack</a:t>
+            </a:r>
+            <a:r>
+              <a:rPr lang="es-PE" sz="4000" dirty="0" smtClean="0"/>
+              <a:t> (Pila) </a:t>
+            </a:r>
+            <a:endParaRPr lang="es-PE" sz="4000" dirty="0"/>
+          </a:p>
+        </p:txBody>
+      </p:sp>
+    </p:spTree>
+    <p:extLst>
+      <p:ext uri="{BB962C8B-B14F-4D97-AF65-F5344CB8AC3E}">
+        <p14:creationId xmlns:p14="http://schemas.microsoft.com/office/powerpoint/2010/main" val="997755487"/>
+      </p:ext>
+    </p:extLst>
+  </p:cSld>
+  <p:clrMapOvr>
+    <a:masterClrMapping/>
+  </p:clrMapOvr>
+  <p:timing>
+    <p:tnLst>
+      <p:par>
+        <p:cTn id="1" dur="indefinite" restart="never" nodeType="tmRoot"/>
+      </p:par>
+    </p:tnLst>
+  </p:timing>
+</p:sld>
+</file>
+
+<file path=ppt/slides/slide21.xml><?xml version="1.0" encoding="utf-8"?>
+<p:sld xmlns:a="http://schemas.openxmlformats.org/drawingml/2006/main" xmlns:r="http://schemas.openxmlformats.org/officeDocument/2006/relationships" xmlns:p="http://schemas.openxmlformats.org/presentationml/2006/main">
+  <p:cSld>
+    <p:spTree>
+      <p:nvGrpSpPr>
+        <p:cNvPr id="1" name=""/>
+        <p:cNvGrpSpPr/>
+        <p:nvPr/>
+      </p:nvGrpSpPr>
+      <p:grpSpPr>
+        <a:xfrm>
+          <a:off x="0" y="0"/>
+          <a:ext cx="0" cy="0"/>
+          <a:chOff x="0" y="0"/>
+          <a:chExt cx="0" cy="0"/>
+        </a:xfrm>
+      </p:grpSpPr>
+      <p:sp>
+        <p:nvSpPr>
+          <p:cNvPr id="18" name="1 Título"/>
+          <p:cNvSpPr>
+            <a:spLocks noGrp="1"/>
+          </p:cNvSpPr>
+          <p:nvPr>
+            <p:ph type="title"/>
+          </p:nvPr>
+        </p:nvSpPr>
+        <p:spPr>
+          <a:xfrm>
+            <a:off x="457200" y="162000"/>
+            <a:ext cx="8229600" cy="792088"/>
+          </a:xfrm>
+        </p:spPr>
+        <p:txBody>
+          <a:bodyPr/>
+          <a:lstStyle/>
+          <a:p>
+            <a:r>
+              <a:rPr lang="es-PE" sz="4800" dirty="0" smtClean="0">
+                <a:solidFill>
+                  <a:srgbClr val="FF0000"/>
+                </a:solidFill>
+              </a:rPr>
+              <a:t>Reglas</a:t>
+            </a:r>
+            <a:endParaRPr lang="es-PE" sz="4800" dirty="0">
+              <a:solidFill>
+                <a:srgbClr val="FF0000"/>
+              </a:solidFill>
+            </a:endParaRPr>
+          </a:p>
+        </p:txBody>
+      </p:sp>
+      <p:sp>
+        <p:nvSpPr>
+          <p:cNvPr id="2" name="1 CuadroTexto"/>
+          <p:cNvSpPr txBox="1"/>
+          <p:nvPr/>
+        </p:nvSpPr>
+        <p:spPr>
+          <a:xfrm>
+            <a:off x="251520" y="908720"/>
+            <a:ext cx="8640960" cy="584775"/>
+          </a:xfrm>
+          <a:prstGeom prst="rect">
+            <a:avLst/>
+          </a:prstGeom>
+          <a:noFill/>
+        </p:spPr>
+        <p:txBody>
+          <a:bodyPr wrap="square" rtlCol="0">
+            <a:spAutoFit/>
+          </a:bodyPr>
+          <a:lstStyle/>
+          <a:p>
+            <a:pPr algn="ctr"/>
+            <a:r>
+              <a:rPr lang="es-PE" sz="3200" dirty="0" smtClean="0"/>
+              <a:t>Es </a:t>
+            </a:r>
+            <a:r>
+              <a:rPr lang="es-PE" sz="3200" dirty="0" smtClean="0"/>
+              <a:t>un recorrido de un único hoyo</a:t>
+            </a:r>
+            <a:endParaRPr lang="es-PE" sz="3200" dirty="0" smtClean="0"/>
+          </a:p>
+        </p:txBody>
+      </p:sp>
+      <p:sp>
+        <p:nvSpPr>
+          <p:cNvPr id="3" name="2 Rectángulo"/>
+          <p:cNvSpPr/>
+          <p:nvPr/>
+        </p:nvSpPr>
+        <p:spPr>
+          <a:xfrm>
+            <a:off x="251520" y="3515524"/>
+            <a:ext cx="8640960" cy="1569660"/>
+          </a:xfrm>
+          <a:prstGeom prst="rect">
+            <a:avLst/>
+          </a:prstGeom>
+        </p:spPr>
+        <p:txBody>
+          <a:bodyPr wrap="square">
+            <a:spAutoFit/>
+          </a:bodyPr>
+          <a:lstStyle/>
+          <a:p>
+            <a:pPr algn="ctr"/>
+            <a:r>
+              <a:rPr lang="es-PE" sz="3200" dirty="0" smtClean="0"/>
+              <a:t>El tiempo de todo el recorrido es de 15 minutos, al finalizar el tiempo el mejor equipo mostrará sus resultados.</a:t>
+            </a:r>
+            <a:endParaRPr lang="es-PE" sz="3200" dirty="0"/>
+          </a:p>
+        </p:txBody>
+      </p:sp>
+      <p:pic>
+        <p:nvPicPr>
+          <p:cNvPr id="2050" name="Picture 2"/>
+          <p:cNvPicPr>
+            <a:picLocks noChangeAspect="1" noChangeArrowheads="1"/>
+          </p:cNvPicPr>
+          <p:nvPr/>
+        </p:nvPicPr>
+        <p:blipFill>
+          <a:blip r:embed="rId3">
+            <a:extLst>
+              <a:ext uri="{28A0092B-C50C-407E-A947-70E740481C1C}">
+                <a14:useLocalDpi xmlns:a14="http://schemas.microsoft.com/office/drawing/2010/main" val="0"/>
+              </a:ext>
+            </a:extLst>
+          </a:blip>
+          <a:srcRect/>
+          <a:stretch>
+            <a:fillRect/>
+          </a:stretch>
+        </p:blipFill>
+        <p:spPr bwMode="auto">
+          <a:xfrm>
+            <a:off x="2703984" y="1628800"/>
+            <a:ext cx="3736031" cy="1800200"/>
+          </a:xfrm>
+          <a:prstGeom prst="rect">
+            <a:avLst/>
+          </a:prstGeom>
+          <a:ln>
+            <a:noFill/>
+          </a:ln>
+          <a:effectLst>
+            <a:softEdge rad="112500"/>
+          </a:effectLst>
+          <a:extLst>
+            <a:ext uri="{909E8E84-426E-40DD-AFC4-6F175D3DCCD1}">
+              <a14:hiddenFill xmlns:a14="http://schemas.microsoft.com/office/drawing/2010/main">
+                <a:solidFill>
+                  <a:schemeClr val="accent1"/>
+                </a:solidFill>
+              </a14:hiddenFill>
+            </a:ext>
+            <a:ext uri="{91240B29-F687-4F45-9708-019B960494DF}">
+              <a14:hiddenLine xmlns:a14="http://schemas.microsoft.com/office/drawing/2010/main" w="9525">
+                <a:solidFill>
+                  <a:schemeClr val="tx1"/>
+                </a:solidFill>
+                <a:miter lim="800000"/>
+                <a:headEnd/>
+                <a:tailEnd/>
+              </a14:hiddenLine>
+            </a:ext>
+            <a:ext uri="{AF507438-7753-43E0-B8FC-AC1667EBCBE1}">
+              <a14:hiddenEffects xmlns:a14="http://schemas.microsoft.com/office/drawing/2010/main">
+                <a:effectLst>
+                  <a:outerShdw dist="35921" dir="2700000" algn="ctr" rotWithShape="0">
+                    <a:schemeClr val="bg2"/>
+                  </a:outerShdw>
+                </a:effectLst>
+              </a14:hiddenEffects>
+            </a:ext>
+          </a:extLst>
+        </p:spPr>
+      </p:pic>
+    </p:spTree>
+    <p:extLst>
+      <p:ext uri="{BB962C8B-B14F-4D97-AF65-F5344CB8AC3E}">
+        <p14:creationId xmlns:p14="http://schemas.microsoft.com/office/powerpoint/2010/main" val="110595477"/>
+      </p:ext>
+    </p:extLst>
+  </p:cSld>
+  <p:clrMapOvr>
+    <a:masterClrMapping/>
+  </p:clrMapOvr>
+  <p:timing>
+    <p:tnLst>
+      <p:par>
+        <p:cTn id="1" dur="indefinite" restart="never" nodeType="tmRoot"/>
+      </p:par>
+    </p:tnLst>
+  </p:timing>
+</p:sld>
+</file>
+
+<file path=ppt/slides/slide22.xml><?xml version="1.0" encoding="utf-8"?>
+<p:sld xmlns:a="http://schemas.openxmlformats.org/drawingml/2006/main" xmlns:r="http://schemas.openxmlformats.org/officeDocument/2006/relationships" xmlns:p="http://schemas.openxmlformats.org/presentationml/2006/main">
+  <p:cSld>
+    <p:spTree>
+      <p:nvGrpSpPr>
+        <p:cNvPr id="1" name=""/>
+        <p:cNvGrpSpPr/>
+        <p:nvPr/>
+      </p:nvGrpSpPr>
+      <p:grpSpPr>
+        <a:xfrm>
+          <a:off x="0" y="0"/>
+          <a:ext cx="0" cy="0"/>
+          <a:chOff x="0" y="0"/>
+          <a:chExt cx="0" cy="0"/>
+        </a:xfrm>
+      </p:grpSpPr>
+      <p:sp>
+        <p:nvSpPr>
+          <p:cNvPr id="18" name="1 Título"/>
+          <p:cNvSpPr>
+            <a:spLocks noGrp="1"/>
+          </p:cNvSpPr>
+          <p:nvPr>
+            <p:ph type="title"/>
+          </p:nvPr>
+        </p:nvSpPr>
+        <p:spPr>
+          <a:xfrm>
+            <a:off x="457200" y="162000"/>
+            <a:ext cx="8229600" cy="792088"/>
+          </a:xfrm>
+        </p:spPr>
+        <p:txBody>
+          <a:bodyPr/>
+          <a:lstStyle/>
+          <a:p>
+            <a:r>
+              <a:rPr lang="es-PE" sz="4800" dirty="0" smtClean="0">
+                <a:solidFill>
+                  <a:srgbClr val="FF0000"/>
+                </a:solidFill>
+              </a:rPr>
+              <a:t>Listos </a:t>
+            </a:r>
+            <a:r>
+              <a:rPr lang="es-PE" sz="4800" dirty="0">
+                <a:solidFill>
+                  <a:srgbClr val="FF0000"/>
+                </a:solidFill>
+              </a:rPr>
+              <a:t>P</a:t>
+            </a:r>
+            <a:r>
+              <a:rPr lang="es-PE" sz="4800" dirty="0" smtClean="0">
+                <a:solidFill>
+                  <a:srgbClr val="FF0000"/>
+                </a:solidFill>
+              </a:rPr>
+              <a:t>ara Comenzar</a:t>
+            </a:r>
+            <a:endParaRPr lang="es-PE" sz="4800" dirty="0">
+              <a:solidFill>
+                <a:srgbClr val="FF0000"/>
+              </a:solidFill>
+            </a:endParaRPr>
+          </a:p>
+        </p:txBody>
+      </p:sp>
+      <p:sp>
+        <p:nvSpPr>
+          <p:cNvPr id="2" name="1 CuadroTexto"/>
+          <p:cNvSpPr txBox="1"/>
+          <p:nvPr/>
+        </p:nvSpPr>
+        <p:spPr>
+          <a:xfrm>
+            <a:off x="251520" y="1208941"/>
+            <a:ext cx="8640960" cy="4524315"/>
+          </a:xfrm>
+          <a:prstGeom prst="rect">
+            <a:avLst/>
+          </a:prstGeom>
+          <a:noFill/>
+        </p:spPr>
+        <p:txBody>
+          <a:bodyPr wrap="square" rtlCol="0">
+            <a:spAutoFit/>
+          </a:bodyPr>
+          <a:lstStyle/>
+          <a:p>
+            <a:pPr marL="457200" indent="-457200">
+              <a:buFont typeface="Arial" pitchFamily="34" charset="0"/>
+              <a:buChar char="•"/>
+            </a:pPr>
+            <a:r>
+              <a:rPr lang="es-PE" sz="3200" dirty="0" smtClean="0"/>
+              <a:t>Abrir el código inicial en el IDE.</a:t>
+            </a:r>
+          </a:p>
+          <a:p>
+            <a:pPr marL="457200" indent="-457200">
+              <a:buFont typeface="Arial" pitchFamily="34" charset="0"/>
+              <a:buChar char="•"/>
+            </a:pPr>
+            <a:endParaRPr lang="es-PE" sz="3200" dirty="0"/>
+          </a:p>
+          <a:p>
+            <a:pPr marL="457200" indent="-457200">
+              <a:buFont typeface="Arial" pitchFamily="34" charset="0"/>
+              <a:buChar char="•"/>
+            </a:pPr>
+            <a:r>
+              <a:rPr lang="es-PE" sz="3200" dirty="0" smtClean="0"/>
+              <a:t>Asegurarse que compile y todos los test se pasen.</a:t>
+            </a:r>
+          </a:p>
+          <a:p>
+            <a:pPr marL="457200" indent="-457200">
+              <a:buFont typeface="Arial" pitchFamily="34" charset="0"/>
+              <a:buChar char="•"/>
+            </a:pPr>
+            <a:endParaRPr lang="es-PE" sz="3200" dirty="0"/>
+          </a:p>
+          <a:p>
+            <a:pPr marL="457200" indent="-457200">
+              <a:buFont typeface="Arial" pitchFamily="34" charset="0"/>
+              <a:buChar char="•"/>
+            </a:pPr>
+            <a:r>
+              <a:rPr lang="es-PE" sz="3200" dirty="0" smtClean="0"/>
+              <a:t>No se olviden las actividades de cada rol del equipo.</a:t>
+            </a:r>
+          </a:p>
+          <a:p>
+            <a:pPr marL="457200" indent="-457200">
+              <a:buFont typeface="Arial" pitchFamily="34" charset="0"/>
+              <a:buChar char="•"/>
+            </a:pPr>
+            <a:endParaRPr lang="es-PE" sz="3200" dirty="0"/>
+          </a:p>
+          <a:p>
+            <a:pPr marL="457200" indent="-457200">
+              <a:buFont typeface="Arial" pitchFamily="34" charset="0"/>
+              <a:buChar char="•"/>
+            </a:pPr>
+            <a:r>
+              <a:rPr lang="es-PE" sz="3200" dirty="0" smtClean="0"/>
+              <a:t>Tienen 15 minutos para todo el recorrido.</a:t>
+            </a:r>
+          </a:p>
+        </p:txBody>
+      </p:sp>
+    </p:spTree>
+    <p:extLst>
+      <p:ext uri="{BB962C8B-B14F-4D97-AF65-F5344CB8AC3E}">
+        <p14:creationId xmlns:p14="http://schemas.microsoft.com/office/powerpoint/2010/main" val="1687246152"/>
+      </p:ext>
+    </p:extLst>
+  </p:cSld>
+  <p:clrMapOvr>
+    <a:masterClrMapping/>
+  </p:clrMapOvr>
+  <p:timing>
+    <p:tnLst>
+      <p:par>
+        <p:cTn id="1" dur="indefinite" restart="never" nodeType="tmRoot"/>
+      </p:par>
+    </p:tnLst>
+  </p:timing>
+</p:sld>
+</file>
+
+<file path=ppt/slides/slide23.xml><?xml version="1.0" encoding="utf-8"?>
+<p:sld xmlns:a="http://schemas.openxmlformats.org/drawingml/2006/main" xmlns:r="http://schemas.openxmlformats.org/officeDocument/2006/relationships" xmlns:p="http://schemas.openxmlformats.org/presentationml/2006/main">
+  <p:cSld>
+    <p:spTree>
+      <p:nvGrpSpPr>
+        <p:cNvPr id="1" name=""/>
+        <p:cNvGrpSpPr/>
+        <p:nvPr/>
+      </p:nvGrpSpPr>
+      <p:grpSpPr>
+        <a:xfrm>
+          <a:off x="0" y="0"/>
+          <a:ext cx="0" cy="0"/>
+          <a:chOff x="0" y="0"/>
+          <a:chExt cx="0" cy="0"/>
+        </a:xfrm>
+      </p:grpSpPr>
+      <p:sp>
+        <p:nvSpPr>
+          <p:cNvPr id="18" name="1 Título"/>
+          <p:cNvSpPr>
+            <a:spLocks noGrp="1"/>
+          </p:cNvSpPr>
+          <p:nvPr>
+            <p:ph type="title"/>
+          </p:nvPr>
+        </p:nvSpPr>
+        <p:spPr>
+          <a:xfrm>
+            <a:off x="457200" y="162000"/>
+            <a:ext cx="8229600" cy="792088"/>
+          </a:xfrm>
+        </p:spPr>
+        <p:txBody>
+          <a:bodyPr/>
+          <a:lstStyle/>
+          <a:p>
+            <a:r>
+              <a:rPr lang="es-PE" sz="4800" dirty="0" err="1" smtClean="0">
+                <a:solidFill>
+                  <a:srgbClr val="FF0000"/>
+                </a:solidFill>
+              </a:rPr>
+              <a:t>Feedback</a:t>
+            </a:r>
+            <a:endParaRPr lang="es-PE" sz="4800" dirty="0">
+              <a:solidFill>
+                <a:srgbClr val="FF0000"/>
+              </a:solidFill>
+            </a:endParaRPr>
+          </a:p>
+        </p:txBody>
+      </p:sp>
+      <p:sp>
+        <p:nvSpPr>
+          <p:cNvPr id="2" name="1 CuadroTexto"/>
+          <p:cNvSpPr txBox="1"/>
+          <p:nvPr/>
+        </p:nvSpPr>
+        <p:spPr>
+          <a:xfrm>
+            <a:off x="251520" y="1208941"/>
+            <a:ext cx="8640960" cy="4524315"/>
+          </a:xfrm>
+          <a:prstGeom prst="rect">
+            <a:avLst/>
+          </a:prstGeom>
+          <a:noFill/>
+        </p:spPr>
+        <p:txBody>
+          <a:bodyPr wrap="square" rtlCol="0">
+            <a:spAutoFit/>
+          </a:bodyPr>
+          <a:lstStyle/>
+          <a:p>
+            <a:pPr marL="457200" indent="-457200">
+              <a:buFont typeface="Arial" pitchFamily="34" charset="0"/>
+              <a:buChar char="•"/>
+            </a:pPr>
+            <a:r>
+              <a:rPr lang="es-PE" sz="3200" dirty="0" smtClean="0"/>
+              <a:t>Abrir el código inicial en el IDE.</a:t>
+            </a:r>
+          </a:p>
+          <a:p>
+            <a:pPr marL="457200" indent="-457200">
+              <a:buFont typeface="Arial" pitchFamily="34" charset="0"/>
+              <a:buChar char="•"/>
+            </a:pPr>
+            <a:endParaRPr lang="es-PE" sz="3200" dirty="0"/>
+          </a:p>
+          <a:p>
+            <a:pPr marL="457200" indent="-457200">
+              <a:buFont typeface="Arial" pitchFamily="34" charset="0"/>
+              <a:buChar char="•"/>
+            </a:pPr>
+            <a:r>
+              <a:rPr lang="es-PE" sz="3200" dirty="0" smtClean="0"/>
+              <a:t>Asegurarse que compile y todos los test se pasen.</a:t>
+            </a:r>
+          </a:p>
+          <a:p>
+            <a:pPr marL="457200" indent="-457200">
+              <a:buFont typeface="Arial" pitchFamily="34" charset="0"/>
+              <a:buChar char="•"/>
+            </a:pPr>
+            <a:endParaRPr lang="es-PE" sz="3200" dirty="0"/>
+          </a:p>
+          <a:p>
+            <a:pPr marL="457200" indent="-457200">
+              <a:buFont typeface="Arial" pitchFamily="34" charset="0"/>
+              <a:buChar char="•"/>
+            </a:pPr>
+            <a:r>
+              <a:rPr lang="es-PE" sz="3200" dirty="0" smtClean="0"/>
+              <a:t>No se olviden las actividades de cada rol del equipo.</a:t>
+            </a:r>
+          </a:p>
+          <a:p>
+            <a:pPr marL="457200" indent="-457200">
+              <a:buFont typeface="Arial" pitchFamily="34" charset="0"/>
+              <a:buChar char="•"/>
+            </a:pPr>
+            <a:endParaRPr lang="es-PE" sz="3200" dirty="0"/>
+          </a:p>
+          <a:p>
+            <a:pPr marL="457200" indent="-457200">
+              <a:buFont typeface="Arial" pitchFamily="34" charset="0"/>
+              <a:buChar char="•"/>
+            </a:pPr>
+            <a:r>
+              <a:rPr lang="es-PE" sz="3200" dirty="0" smtClean="0"/>
+              <a:t>Tienen 10 minutos por hoyo.</a:t>
+            </a:r>
+          </a:p>
+        </p:txBody>
+      </p:sp>
+    </p:spTree>
+    <p:extLst>
+      <p:ext uri="{BB962C8B-B14F-4D97-AF65-F5344CB8AC3E}">
+        <p14:creationId xmlns:p14="http://schemas.microsoft.com/office/powerpoint/2010/main" val="436303969"/>
       </p:ext>
     </p:extLst>
   </p:cSld>
@@ -6711,7 +9005,7 @@
                   <a:srgbClr val="FF0000"/>
                 </a:solidFill>
               </a:rPr>
-              <a:t>Equipamiento</a:t>
+              <a:t>Campo de Juego</a:t>
             </a:r>
             <a:endParaRPr lang="es-PE" dirty="0">
               <a:solidFill>
@@ -6729,8 +9023,8 @@
         </p:nvSpPr>
         <p:spPr>
           <a:xfrm>
-            <a:off x="3203847" y="1023002"/>
-            <a:ext cx="5472609" cy="5386090"/>
+            <a:off x="3851920" y="1109996"/>
+            <a:ext cx="5040560" cy="5078313"/>
           </a:xfrm>
           <a:prstGeom prst="rect">
             <a:avLst/>
@@ -6745,7 +9039,7 @@
             <a:pPr algn="ctr"/>
             <a:r>
               <a:rPr lang="es-PE" sz="3600" dirty="0" smtClean="0"/>
-              <a:t>El juego se podrá realizar utilizando C# o Java.</a:t>
+              <a:t>Realizaremos 2 juegos diferentes y en cada juego se podrá utilizar C# o Java.</a:t>
             </a:r>
           </a:p>
           <a:p>
@@ -6756,17 +9050,222 @@
             <a:pPr algn="ctr"/>
             <a:r>
               <a:rPr lang="es-PE" sz="3600" dirty="0" smtClean="0"/>
-              <a:t>El código se encuentra en VS2010 y Eclipse pero se puede importar y utilizar el IDE de su preferencia.</a:t>
-            </a:r>
-          </a:p>
-          <a:p>
-            <a:pPr algn="ctr"/>
-            <a:endParaRPr lang="es-PE" sz="3600" dirty="0"/>
-          </a:p>
-          <a:p>
-            <a:pPr algn="ctr"/>
-            <a:r>
-              <a:rPr lang="es-PE" sz="2800" dirty="0" smtClean="0">
+              <a:t>Cada juego tiene un punto de partida (</a:t>
+            </a:r>
+            <a:r>
+              <a:rPr lang="es-PE" sz="3600" dirty="0" err="1" smtClean="0"/>
+              <a:t>Tee</a:t>
+            </a:r>
+            <a:r>
+              <a:rPr lang="es-PE" sz="3600" dirty="0" smtClean="0"/>
+              <a:t>) y el objetivo es llegar al punto final (</a:t>
+            </a:r>
+            <a:r>
+              <a:rPr lang="es-PE" sz="3600" dirty="0" err="1" smtClean="0"/>
+              <a:t>Hole</a:t>
+            </a:r>
+            <a:r>
+              <a:rPr lang="es-PE" sz="3600" dirty="0" smtClean="0"/>
+              <a:t>).</a:t>
+            </a:r>
+          </a:p>
+        </p:txBody>
+      </p:sp>
+      <p:pic>
+        <p:nvPicPr>
+          <p:cNvPr id="1031" name="Picture 7"/>
+          <p:cNvPicPr>
+            <a:picLocks noChangeAspect="1" noChangeArrowheads="1"/>
+          </p:cNvPicPr>
+          <p:nvPr/>
+        </p:nvPicPr>
+        <p:blipFill>
+          <a:blip r:embed="rId3">
+            <a:extLst>
+              <a:ext uri="{28A0092B-C50C-407E-A947-70E740481C1C}">
+                <a14:useLocalDpi xmlns:a14="http://schemas.microsoft.com/office/drawing/2010/main" val="0"/>
+              </a:ext>
+            </a:extLst>
+          </a:blip>
+          <a:srcRect/>
+          <a:stretch>
+            <a:fillRect/>
+          </a:stretch>
+        </p:blipFill>
+        <p:spPr bwMode="auto">
+          <a:xfrm>
+            <a:off x="251520" y="1155264"/>
+            <a:ext cx="3571875" cy="5067300"/>
+          </a:xfrm>
+          <a:prstGeom prst="rect">
+            <a:avLst/>
+          </a:prstGeom>
+          <a:ln>
+            <a:noFill/>
+          </a:ln>
+          <a:effectLst>
+            <a:softEdge rad="112500"/>
+          </a:effectLst>
+          <a:extLst>
+            <a:ext uri="{909E8E84-426E-40DD-AFC4-6F175D3DCCD1}">
+              <a14:hiddenFill xmlns:a14="http://schemas.microsoft.com/office/drawing/2010/main">
+                <a:solidFill>
+                  <a:schemeClr val="accent1"/>
+                </a:solidFill>
+              </a14:hiddenFill>
+            </a:ext>
+            <a:ext uri="{91240B29-F687-4F45-9708-019B960494DF}">
+              <a14:hiddenLine xmlns:a14="http://schemas.microsoft.com/office/drawing/2010/main" w="9525">
+                <a:solidFill>
+                  <a:schemeClr val="tx1"/>
+                </a:solidFill>
+                <a:miter lim="800000"/>
+                <a:headEnd/>
+                <a:tailEnd/>
+              </a14:hiddenLine>
+            </a:ext>
+            <a:ext uri="{AF507438-7753-43E0-B8FC-AC1667EBCBE1}">
+              <a14:hiddenEffects xmlns:a14="http://schemas.microsoft.com/office/drawing/2010/main">
+                <a:effectLst>
+                  <a:outerShdw dist="35921" dir="2700000" algn="ctr" rotWithShape="0">
+                    <a:schemeClr val="bg2"/>
+                  </a:outerShdw>
+                </a:effectLst>
+              </a14:hiddenEffects>
+            </a:ext>
+          </a:extLst>
+        </p:spPr>
+      </p:pic>
+    </p:spTree>
+    <p:extLst>
+      <p:ext uri="{BB962C8B-B14F-4D97-AF65-F5344CB8AC3E}">
+        <p14:creationId xmlns:p14="http://schemas.microsoft.com/office/powerpoint/2010/main" val="2094414178"/>
+      </p:ext>
+    </p:extLst>
+  </p:cSld>
+  <p:clrMapOvr>
+    <a:masterClrMapping/>
+  </p:clrMapOvr>
+  <p:timing>
+    <p:tnLst>
+      <p:par>
+        <p:cTn id="1" dur="indefinite" restart="never" nodeType="tmRoot"/>
+      </p:par>
+    </p:tnLst>
+  </p:timing>
+</p:sld>
+</file>
+
+<file path=ppt/slides/slide7.xml><?xml version="1.0" encoding="utf-8"?>
+<p:sld xmlns:a="http://schemas.openxmlformats.org/drawingml/2006/main" xmlns:r="http://schemas.openxmlformats.org/officeDocument/2006/relationships" xmlns:p="http://schemas.openxmlformats.org/presentationml/2006/main">
+  <p:cSld>
+    <p:spTree>
+      <p:nvGrpSpPr>
+        <p:cNvPr id="1" name=""/>
+        <p:cNvGrpSpPr/>
+        <p:nvPr/>
+      </p:nvGrpSpPr>
+      <p:grpSpPr>
+        <a:xfrm>
+          <a:off x="0" y="0"/>
+          <a:ext cx="0" cy="0"/>
+          <a:chOff x="0" y="0"/>
+          <a:chExt cx="0" cy="0"/>
+        </a:xfrm>
+      </p:grpSpPr>
+      <p:sp>
+        <p:nvSpPr>
+          <p:cNvPr id="18" name="1 Título"/>
+          <p:cNvSpPr>
+            <a:spLocks noGrp="1"/>
+          </p:cNvSpPr>
+          <p:nvPr>
+            <p:ph type="title"/>
+          </p:nvPr>
+        </p:nvSpPr>
+        <p:spPr>
+          <a:xfrm>
+            <a:off x="457200" y="160885"/>
+            <a:ext cx="8229600" cy="792088"/>
+          </a:xfrm>
+        </p:spPr>
+        <p:txBody>
+          <a:bodyPr/>
+          <a:lstStyle/>
+          <a:p>
+            <a:r>
+              <a:rPr lang="es-PE" dirty="0" smtClean="0">
+                <a:solidFill>
+                  <a:srgbClr val="FF0000"/>
+                </a:solidFill>
+              </a:rPr>
+              <a:t>Equipamiento</a:t>
+            </a:r>
+            <a:endParaRPr lang="es-PE" dirty="0">
+              <a:solidFill>
+                <a:srgbClr val="FF0000"/>
+              </a:solidFill>
+            </a:endParaRPr>
+          </a:p>
+        </p:txBody>
+      </p:sp>
+      <p:sp>
+        <p:nvSpPr>
+          <p:cNvPr id="3" name="2 Rectángulo"/>
+          <p:cNvSpPr/>
+          <p:nvPr/>
+        </p:nvSpPr>
+        <p:spPr>
+          <a:xfrm>
+            <a:off x="3203847" y="993506"/>
+            <a:ext cx="5760641" cy="5570756"/>
+          </a:xfrm>
+          <a:prstGeom prst="rect">
+            <a:avLst/>
+          </a:prstGeom>
+        </p:spPr>
+        <p:txBody>
+          <a:bodyPr wrap="square">
+            <a:spAutoFit/>
+          </a:bodyPr>
+          <a:lstStyle/>
+          <a:p>
+            <a:pPr marL="439738" indent="-439738">
+              <a:buFont typeface="Arial" pitchFamily="34" charset="0"/>
+              <a:buChar char="•"/>
+              <a:tabLst>
+                <a:tab pos="442913" algn="l"/>
+              </a:tabLst>
+            </a:pPr>
+            <a:r>
+              <a:rPr lang="es-PE" sz="3600" dirty="0" smtClean="0"/>
+              <a:t>Un IDE de su preferencia. </a:t>
+            </a:r>
+            <a:br>
+              <a:rPr lang="es-PE" sz="3600" dirty="0" smtClean="0"/>
+            </a:br>
+            <a:r>
+              <a:rPr lang="es-PE" sz="2800" dirty="0" smtClean="0"/>
+              <a:t>(El </a:t>
+            </a:r>
+            <a:r>
+              <a:rPr lang="es-PE" sz="2800" dirty="0" smtClean="0"/>
+              <a:t>código se encuentra en VS2010 y Eclipse pero se puede </a:t>
+            </a:r>
+            <a:r>
+              <a:rPr lang="es-PE" sz="2800" dirty="0" smtClean="0"/>
+              <a:t>importar)</a:t>
+            </a:r>
+            <a:endParaRPr lang="es-PE" sz="2800" dirty="0" smtClean="0"/>
+          </a:p>
+          <a:p>
+            <a:pPr marL="439738" indent="-439738" algn="ctr">
+              <a:tabLst>
+                <a:tab pos="442913" algn="l"/>
+              </a:tabLst>
+            </a:pPr>
+            <a:r>
+              <a:rPr lang="es-PE" sz="2800" dirty="0">
                 <a:solidFill>
                   <a:srgbClr val="FFC000"/>
                 </a:solidFill>
@@ -6774,14 +9273,14 @@
               <a:t>*Recomendación*</a:t>
             </a:r>
             <a:br>
-              <a:rPr lang="es-PE" sz="2800" dirty="0" smtClean="0">
+              <a:rPr lang="es-PE" sz="2800" dirty="0">
                 <a:solidFill>
                   <a:srgbClr val="FFC000"/>
                 </a:solidFill>
               </a:rPr>
             </a:br>
             <a:r>
-              <a:rPr lang="es-PE" sz="2800" dirty="0" smtClean="0">
+              <a:rPr lang="es-PE" sz="2800" dirty="0">
                 <a:solidFill>
                   <a:srgbClr val="FFC000"/>
                 </a:solidFill>
@@ -6796,11 +9295,70 @@
               </a:rPr>
               <a:t>Resharper</a:t>
             </a:r>
-            <a:endParaRPr lang="es-PE" sz="2800" dirty="0">
-              <a:solidFill>
-                <a:srgbClr val="FFC000"/>
-              </a:solidFill>
-            </a:endParaRPr>
+            <a:endParaRPr lang="es-PE" sz="2800" dirty="0"/>
+          </a:p>
+          <a:p>
+            <a:pPr marL="439738" indent="-439738">
+              <a:buFont typeface="Arial" pitchFamily="34" charset="0"/>
+              <a:buChar char="•"/>
+              <a:tabLst>
+                <a:tab pos="442913" algn="l"/>
+              </a:tabLst>
+            </a:pPr>
+            <a:endParaRPr lang="es-PE" sz="2800" dirty="0" smtClean="0"/>
+          </a:p>
+          <a:p>
+            <a:pPr marL="439738" indent="-439738">
+              <a:buFont typeface="Arial" pitchFamily="34" charset="0"/>
+              <a:buChar char="•"/>
+              <a:tabLst>
+                <a:tab pos="442913" algn="l"/>
+              </a:tabLst>
+            </a:pPr>
+            <a:r>
+              <a:rPr lang="es-PE" sz="3600" dirty="0"/>
+              <a:t>Una hoja donde anotar los puntajes.</a:t>
+            </a:r>
+          </a:p>
+          <a:p>
+            <a:pPr marL="439738" indent="-439738">
+              <a:buFont typeface="Arial" pitchFamily="34" charset="0"/>
+              <a:buChar char="•"/>
+              <a:tabLst>
+                <a:tab pos="442913" algn="l"/>
+              </a:tabLst>
+            </a:pPr>
+            <a:endParaRPr lang="es-PE" sz="3600" dirty="0"/>
+          </a:p>
+          <a:p>
+            <a:pPr marL="439738" indent="-439738">
+              <a:buFont typeface="Arial" pitchFamily="34" charset="0"/>
+              <a:buChar char="•"/>
+              <a:tabLst>
+                <a:tab pos="442913" algn="l"/>
+              </a:tabLst>
+            </a:pPr>
+            <a:r>
+              <a:rPr lang="es-PE" sz="3600" dirty="0"/>
+              <a:t>El código </a:t>
+            </a:r>
+            <a:r>
+              <a:rPr lang="es-PE" sz="3600" dirty="0" smtClean="0"/>
+              <a:t>final (</a:t>
+            </a:r>
+            <a:r>
+              <a:rPr lang="es-PE" sz="3600" dirty="0" err="1" smtClean="0"/>
+              <a:t>Hole</a:t>
+            </a:r>
+            <a:r>
+              <a:rPr lang="es-PE" sz="3600" dirty="0" smtClean="0"/>
+              <a:t>) </a:t>
+            </a:r>
+            <a:r>
+              <a:rPr lang="es-PE" sz="3600" dirty="0"/>
+              <a:t>de cada juego en papel.</a:t>
+            </a:r>
+            <a:endParaRPr lang="es-PE" sz="3600" dirty="0"/>
           </a:p>
         </p:txBody>
       </p:sp>
@@ -6826,7 +9384,7 @@
         </p:blipFill>
         <p:spPr>
           <a:xfrm>
-            <a:off x="438054" y="971176"/>
+            <a:off x="323528" y="985924"/>
             <a:ext cx="2693786" cy="5580000"/>
           </a:xfrm>
           <a:prstGeom prst="rect">
@@ -6860,249 +9418,6 @@
 </p:sld>
 </file>
 
-<file path=ppt/slides/slide7.xml><?xml version="1.0" encoding="utf-8"?>
-<p:sld xmlns:a="http://schemas.openxmlformats.org/drawingml/2006/main" xmlns:r="http://schemas.openxmlformats.org/officeDocument/2006/relationships" xmlns:p="http://schemas.openxmlformats.org/presentationml/2006/main">
-  <p:cSld>
-    <p:spTree>
-      <p:nvGrpSpPr>
-        <p:cNvPr id="1" name=""/>
-        <p:cNvGrpSpPr/>
-        <p:nvPr/>
-      </p:nvGrpSpPr>
-      <p:grpSpPr>
-        <a:xfrm>
-          <a:off x="0" y="0"/>
-          <a:ext cx="0" cy="0"/>
-          <a:chOff x="0" y="0"/>
-          <a:chExt cx="0" cy="0"/>
-        </a:xfrm>
-      </p:grpSpPr>
-      <p:sp>
-        <p:nvSpPr>
-          <p:cNvPr id="18" name="1 Título"/>
-          <p:cNvSpPr>
-            <a:spLocks noGrp="1"/>
-          </p:cNvSpPr>
-          <p:nvPr>
-            <p:ph type="title"/>
-          </p:nvPr>
-        </p:nvSpPr>
-        <p:spPr>
-          <a:xfrm>
-            <a:off x="457200" y="160885"/>
-            <a:ext cx="8229600" cy="792088"/>
-          </a:xfrm>
-        </p:spPr>
-        <p:txBody>
-          <a:bodyPr/>
-          <a:lstStyle/>
-          <a:p>
-            <a:r>
-              <a:rPr lang="es-PE" dirty="0" smtClean="0">
-                <a:solidFill>
-                  <a:srgbClr val="FF0000"/>
-                </a:solidFill>
-              </a:rPr>
-              <a:t>Puntaje</a:t>
-            </a:r>
-            <a:endParaRPr lang="es-PE" dirty="0">
-              <a:solidFill>
-                <a:srgbClr val="FF0000"/>
-              </a:solidFill>
-            </a:endParaRPr>
-          </a:p>
-        </p:txBody>
-      </p:sp>
-      <p:sp>
-        <p:nvSpPr>
-          <p:cNvPr id="2" name="1 CuadroTexto"/>
-          <p:cNvSpPr txBox="1"/>
-          <p:nvPr/>
-        </p:nvSpPr>
-        <p:spPr>
-          <a:xfrm>
-            <a:off x="634590" y="1025663"/>
-            <a:ext cx="7874820" cy="2862322"/>
-          </a:xfrm>
-          <a:prstGeom prst="rect">
-            <a:avLst/>
-          </a:prstGeom>
-          <a:noFill/>
-        </p:spPr>
-        <p:txBody>
-          <a:bodyPr wrap="square" rtlCol="0">
-            <a:spAutoFit/>
-          </a:bodyPr>
-          <a:lstStyle/>
-          <a:p>
-            <a:pPr algn="ctr"/>
-            <a:r>
-              <a:rPr lang="es-PE" sz="3600" dirty="0" smtClean="0">
-                <a:solidFill>
-                  <a:srgbClr val="FFC000"/>
-                </a:solidFill>
-              </a:rPr>
-              <a:t>General</a:t>
-            </a:r>
-            <a:endParaRPr lang="es-PE" sz="3600" dirty="0" smtClean="0"/>
-          </a:p>
-          <a:p>
-            <a:r>
-              <a:rPr lang="es-PE" sz="3600" dirty="0" smtClean="0"/>
-              <a:t>+</a:t>
-            </a:r>
-            <a:r>
-              <a:rPr lang="es-PE" sz="3600" dirty="0"/>
-              <a:t>1 </a:t>
-            </a:r>
-            <a:r>
-              <a:rPr lang="es-PE" sz="3600" dirty="0" smtClean="0"/>
-              <a:t>Cada refactorización</a:t>
-            </a:r>
-          </a:p>
-          <a:p>
-            <a:r>
-              <a:rPr lang="es-PE" sz="3600" dirty="0" smtClean="0"/>
-              <a:t>+</a:t>
-            </a:r>
-            <a:r>
-              <a:rPr lang="es-PE" sz="3600" dirty="0"/>
-              <a:t>1 </a:t>
-            </a:r>
-            <a:r>
-              <a:rPr lang="es-PE" sz="3600" dirty="0"/>
-              <a:t>Copiar + </a:t>
-            </a:r>
-            <a:r>
-              <a:rPr lang="es-PE" sz="3600" dirty="0" smtClean="0"/>
-              <a:t>Pegar</a:t>
-            </a:r>
-          </a:p>
-          <a:p>
-            <a:r>
-              <a:rPr lang="es-PE" sz="3600" dirty="0"/>
-              <a:t>+1 </a:t>
-            </a:r>
-            <a:r>
-              <a:rPr lang="es-PE" sz="3600" dirty="0" smtClean="0"/>
-              <a:t>Cualquier </a:t>
-            </a:r>
-            <a:r>
-              <a:rPr lang="es-PE" sz="3600" dirty="0" err="1" smtClean="0"/>
-              <a:t>shortcut</a:t>
-            </a:r>
-            <a:r>
-              <a:rPr lang="es-PE" sz="3600" dirty="0" smtClean="0"/>
-              <a:t> </a:t>
-            </a:r>
-            <a:r>
-              <a:rPr lang="es-PE" sz="3600" dirty="0"/>
-              <a:t>de edición </a:t>
-            </a:r>
-            <a:r>
-              <a:rPr lang="es-PE" sz="3600" dirty="0" smtClean="0"/>
-              <a:t>código</a:t>
-            </a:r>
-          </a:p>
-          <a:p>
-            <a:r>
-              <a:rPr lang="es-PE" sz="3600" dirty="0" smtClean="0"/>
-              <a:t>+</a:t>
-            </a:r>
-            <a:r>
-              <a:rPr lang="es-PE" sz="3600" dirty="0"/>
-              <a:t>0 Organizar y dar formato al </a:t>
-            </a:r>
-            <a:r>
-              <a:rPr lang="es-PE" sz="3600" dirty="0" smtClean="0"/>
-              <a:t>código</a:t>
-            </a:r>
-            <a:endParaRPr lang="es-PE" sz="3600" dirty="0" smtClean="0">
-              <a:solidFill>
-                <a:srgbClr val="FFC000"/>
-              </a:solidFill>
-            </a:endParaRPr>
-          </a:p>
-        </p:txBody>
-      </p:sp>
-      <p:sp>
-        <p:nvSpPr>
-          <p:cNvPr id="3" name="2 Rectángulo"/>
-          <p:cNvSpPr/>
-          <p:nvPr/>
-        </p:nvSpPr>
-        <p:spPr>
-          <a:xfrm>
-            <a:off x="634590" y="3928988"/>
-            <a:ext cx="7874820" cy="1754326"/>
-          </a:xfrm>
-          <a:prstGeom prst="rect">
-            <a:avLst/>
-          </a:prstGeom>
-        </p:spPr>
-        <p:txBody>
-          <a:bodyPr wrap="square">
-            <a:spAutoFit/>
-          </a:bodyPr>
-          <a:lstStyle/>
-          <a:p>
-            <a:pPr algn="ctr"/>
-            <a:r>
-              <a:rPr lang="es-PE" sz="3600" dirty="0">
-                <a:solidFill>
-                  <a:srgbClr val="FFC000"/>
-                </a:solidFill>
-              </a:rPr>
-              <a:t>Penalidades</a:t>
-            </a:r>
-          </a:p>
-          <a:p>
-            <a:r>
-              <a:rPr lang="es-PE" sz="3600" dirty="0"/>
-              <a:t>+2 Cada línea modificada </a:t>
-            </a:r>
-            <a:r>
-              <a:rPr lang="es-PE" sz="3600" dirty="0" smtClean="0"/>
-              <a:t>manualmente</a:t>
-            </a:r>
-          </a:p>
-          <a:p>
-            <a:r>
-              <a:rPr lang="es-PE" sz="3600" dirty="0" smtClean="0"/>
-              <a:t>x2 Cada cambio mientras </a:t>
-            </a:r>
-            <a:r>
-              <a:rPr lang="es-PE" sz="3600" dirty="0"/>
-              <a:t>no </a:t>
-            </a:r>
-            <a:r>
-              <a:rPr lang="es-PE" sz="3600" dirty="0" smtClean="0"/>
-              <a:t>compile</a:t>
-            </a:r>
-            <a:endParaRPr lang="es-PE" sz="3600" dirty="0"/>
-          </a:p>
-        </p:txBody>
-      </p:sp>
-    </p:spTree>
-    <p:extLst>
-      <p:ext uri="{BB962C8B-B14F-4D97-AF65-F5344CB8AC3E}">
-        <p14:creationId xmlns:p14="http://schemas.microsoft.com/office/powerpoint/2010/main" val="988592054"/>
-      </p:ext>
-    </p:extLst>
-  </p:cSld>
-  <p:clrMapOvr>
-    <a:masterClrMapping/>
-  </p:clrMapOvr>
-  <p:timing>
-    <p:tnLst>
-      <p:par>
-        <p:cTn id="1" dur="indefinite" restart="never" nodeType="tmRoot"/>
-      </p:par>
-    </p:tnLst>
-  </p:timing>
-</p:sld>
-</file>
-
 <file path=ppt/slides/slide8.xml><?xml version="1.0" encoding="utf-8"?>
 <p:sld xmlns:a="http://schemas.openxmlformats.org/drawingml/2006/main" xmlns:r="http://schemas.openxmlformats.org/officeDocument/2006/relationships" xmlns:p="http://schemas.openxmlformats.org/presentationml/2006/main">
   <p:cSld>
@@ -7146,7 +9461,7 @@
                   <a:srgbClr val="FF0000"/>
                 </a:solidFill>
               </a:rPr>
-              <a:t>Equipo Ganador</a:t>
+              <a:t>Puntaje</a:t>
             </a:r>
             <a:endParaRPr lang="es-PE" dirty="0">
               <a:solidFill>
@@ -7158,14 +9473,122 @@
       </p:sp>
       <p:sp>
         <p:nvSpPr>
+          <p:cNvPr id="2" name="1 CuadroTexto"/>
+          <p:cNvSpPr txBox="1"/>
+          <p:nvPr/>
+        </p:nvSpPr>
+        <p:spPr>
+          <a:xfrm>
+            <a:off x="634590" y="1025663"/>
+            <a:ext cx="7874820" cy="2862322"/>
+          </a:xfrm>
+          <a:prstGeom prst="rect">
+            <a:avLst/>
+          </a:prstGeom>
+          <a:noFill/>
+        </p:spPr>
+        <p:txBody>
+          <a:bodyPr wrap="square" rtlCol="0">
+            <a:spAutoFit/>
+          </a:bodyPr>
+          <a:lstStyle/>
+          <a:p>
+            <a:pPr algn="ctr"/>
+            <a:r>
+              <a:rPr lang="es-PE" sz="3600" dirty="0" smtClean="0">
+                <a:solidFill>
+                  <a:srgbClr val="FFC000"/>
+                </a:solidFill>
+              </a:rPr>
+              <a:t>General</a:t>
+            </a:r>
+            <a:endParaRPr lang="es-PE" sz="3600" dirty="0" smtClean="0"/>
+          </a:p>
+          <a:p>
+            <a:r>
+              <a:rPr lang="es-PE" sz="3600" dirty="0" smtClean="0"/>
+              <a:t>+</a:t>
+            </a:r>
+            <a:r>
+              <a:rPr lang="es-PE" sz="3600" dirty="0"/>
+              <a:t>1 </a:t>
+            </a:r>
+            <a:r>
+              <a:rPr lang="es-PE" sz="3600" dirty="0" smtClean="0"/>
+              <a:t>Cada refactorización</a:t>
+            </a:r>
+          </a:p>
+          <a:p>
+            <a:r>
+              <a:rPr lang="es-PE" sz="3600" dirty="0" smtClean="0"/>
+              <a:t>+</a:t>
+            </a:r>
+            <a:r>
+              <a:rPr lang="es-PE" sz="3600" dirty="0"/>
+              <a:t>1 Copiar + </a:t>
+            </a:r>
+            <a:r>
+              <a:rPr lang="es-PE" sz="3600" dirty="0" smtClean="0"/>
+              <a:t>Pegar</a:t>
+            </a:r>
+          </a:p>
+          <a:p>
+            <a:r>
+              <a:rPr lang="es-PE" sz="3600" dirty="0"/>
+              <a:t>+1 </a:t>
+            </a:r>
+            <a:r>
+              <a:rPr lang="es-PE" sz="3600" dirty="0" smtClean="0"/>
+              <a:t>Cualquier </a:t>
+            </a:r>
+            <a:r>
+              <a:rPr lang="es-PE" sz="3600" dirty="0" err="1" smtClean="0"/>
+              <a:t>shortcut</a:t>
+            </a:r>
+            <a:r>
+              <a:rPr lang="es-PE" sz="3600" dirty="0" smtClean="0"/>
+              <a:t> </a:t>
+            </a:r>
+            <a:r>
+              <a:rPr lang="es-PE" sz="3600" dirty="0"/>
+              <a:t>de edición </a:t>
+            </a:r>
+            <a:r>
+              <a:rPr lang="es-PE" sz="3600" dirty="0" smtClean="0"/>
+              <a:t>código</a:t>
+            </a:r>
+          </a:p>
+          <a:p>
+            <a:r>
+              <a:rPr lang="es-PE" sz="3600" dirty="0" smtClean="0"/>
+              <a:t>+</a:t>
+            </a:r>
+            <a:r>
+              <a:rPr lang="es-PE" sz="3600" dirty="0"/>
+              <a:t>0 Organizar y dar formato al </a:t>
+            </a:r>
+            <a:r>
+              <a:rPr lang="es-PE" sz="3600" dirty="0" smtClean="0"/>
+              <a:t>código</a:t>
+            </a:r>
+            <a:endParaRPr lang="es-PE" sz="3600" dirty="0" smtClean="0">
+              <a:solidFill>
+                <a:srgbClr val="FFC000"/>
+              </a:solidFill>
+            </a:endParaRPr>
+          </a:p>
+        </p:txBody>
+      </p:sp>
+      <p:sp>
+        <p:nvSpPr>
           <p:cNvPr id="3" name="2 Rectángulo"/>
           <p:cNvSpPr/>
           <p:nvPr/>
         </p:nvSpPr>
         <p:spPr>
           <a:xfrm>
-            <a:off x="610315" y="1668864"/>
-            <a:ext cx="7874820" cy="3416320"/>
+            <a:off x="634590" y="3928988"/>
+            <a:ext cx="7874820" cy="1754326"/>
           </a:xfrm>
           <a:prstGeom prst="rect">
             <a:avLst/>
@@ -7179,19 +9602,36 @@
           <a:p>
             <a:pPr algn="ctr"/>
             <a:r>
+              <a:rPr lang="es-PE" sz="3600" dirty="0">
+                <a:solidFill>
+                  <a:srgbClr val="FFC000"/>
+                </a:solidFill>
+              </a:rPr>
+              <a:t>Penalidades</a:t>
+            </a:r>
+          </a:p>
+          <a:p>
+            <a:r>
+              <a:rPr lang="es-PE" sz="3600" dirty="0"/>
+              <a:t>+2 Cada línea modificada </a:t>
+            </a:r>
+            <a:r>
               <a:rPr lang="es-PE" sz="3600" dirty="0" smtClean="0"/>
-              <a:t>El equipo que logre el menor puntaje será el ganador.</a:t>
-            </a:r>
-          </a:p>
-          <a:p>
-            <a:pPr algn="ctr"/>
-            <a:endParaRPr lang="es-PE" sz="3600" dirty="0"/>
-          </a:p>
-          <a:p>
-            <a:pPr algn="ctr"/>
+              <a:t>manualmente</a:t>
+            </a:r>
+          </a:p>
+          <a:p>
             <a:r>
               <a:rPr lang="es-PE" sz="3600" dirty="0" smtClean="0"/>
-              <a:t>Al finalizar el juego, el equipo ganador mostrará como realizó el juego al resto de asistentes.</a:t>
+              <a:t>x2 Cada cambio mientras </a:t>
+            </a:r>
+            <a:r>
+              <a:rPr lang="es-PE" sz="3600" dirty="0"/>
+              <a:t>no </a:t>
+            </a:r>
+            <a:r>
+              <a:rPr lang="es-PE" sz="3600" dirty="0" smtClean="0"/>
+              <a:t>compile</a:t>
             </a:r>
             <a:endParaRPr lang="es-PE" sz="3600" dirty="0"/>
           </a:p>
@@ -7200,7 +9640,7 @@
     </p:spTree>
     <p:extLst>
       <p:ext uri="{BB962C8B-B14F-4D97-AF65-F5344CB8AC3E}">
-        <p14:creationId xmlns:p14="http://schemas.microsoft.com/office/powerpoint/2010/main" val="1762542377"/>
+        <p14:creationId xmlns:p14="http://schemas.microsoft.com/office/powerpoint/2010/main" val="988592054"/>
       </p:ext>
     </p:extLst>
   </p:cSld>
@@ -7260,7 +9700,7 @@
                   <a:srgbClr val="FF0000"/>
                 </a:solidFill>
               </a:rPr>
-              <a:t>Premios</a:t>
+              <a:t>Equipo Ganador</a:t>
             </a:r>
             <a:endParaRPr lang="es-PE" dirty="0">
               <a:solidFill>
@@ -7272,118 +9712,49 @@
       </p:sp>
       <p:sp>
         <p:nvSpPr>
-          <p:cNvPr id="2" name="1 CuadroTexto"/>
-          <p:cNvSpPr txBox="1"/>
+          <p:cNvPr id="3" name="2 Rectángulo"/>
+          <p:cNvSpPr/>
           <p:nvPr/>
         </p:nvSpPr>
         <p:spPr>
           <a:xfrm>
-            <a:off x="3547427" y="1700808"/>
-            <a:ext cx="5256584" cy="3539430"/>
+            <a:off x="610315" y="1668864"/>
+            <a:ext cx="7874820" cy="3416320"/>
           </a:xfrm>
           <a:prstGeom prst="rect">
             <a:avLst/>
           </a:prstGeom>
-          <a:noFill/>
         </p:spPr>
         <p:txBody>
-          <a:bodyPr wrap="square" rtlCol="0">
+          <a:bodyPr wrap="square">
             <a:spAutoFit/>
           </a:bodyPr>
           <a:lstStyle/>
           <a:p>
             <a:pPr algn="ctr"/>
             <a:r>
-              <a:rPr lang="es-PE" sz="3200" dirty="0" smtClean="0"/>
-              <a:t>El equipo ganador de </a:t>
-            </a:r>
-            <a:r>
-              <a:rPr lang="es-PE" sz="3200" dirty="0" smtClean="0"/>
-              <a:t>cada juego se llevará 2 licencias de </a:t>
-            </a:r>
-            <a:r>
-              <a:rPr lang="es-PE" sz="3200" i="1" dirty="0" err="1" smtClean="0"/>
-              <a:t>JetBrains</a:t>
-            </a:r>
-            <a:r>
-              <a:rPr lang="es-PE" sz="3200" i="1" dirty="0" smtClean="0"/>
-              <a:t>.</a:t>
-            </a:r>
-            <a:endParaRPr lang="es-PE" sz="3200" i="1" dirty="0" smtClean="0"/>
+              <a:rPr lang="es-PE" sz="3600" dirty="0" smtClean="0"/>
+              <a:t>El equipo que logre el menor puntaje será el ganador.</a:t>
+            </a:r>
           </a:p>
           <a:p>
             <a:pPr algn="ctr"/>
-            <a:endParaRPr lang="es-PE" sz="3200" dirty="0"/>
+            <a:endParaRPr lang="es-PE" sz="3600" dirty="0"/>
           </a:p>
           <a:p>
             <a:pPr algn="ctr"/>
             <a:r>
-              <a:rPr lang="es-PE" sz="3200" dirty="0" smtClean="0"/>
-              <a:t>Cada licencia será válida para </a:t>
-            </a:r>
-            <a:r>
-              <a:rPr lang="es-PE" sz="3200" i="1" dirty="0" err="1" smtClean="0"/>
-              <a:t>Resharper</a:t>
-            </a:r>
-            <a:r>
-              <a:rPr lang="es-PE" sz="3200" dirty="0" smtClean="0"/>
-              <a:t> o </a:t>
-            </a:r>
-            <a:r>
-              <a:rPr lang="es-PE" sz="3200" i="1" dirty="0" err="1" smtClean="0"/>
-              <a:t>IntelliJ</a:t>
-            </a:r>
-            <a:r>
-              <a:rPr lang="es-PE" sz="3200" dirty="0" smtClean="0"/>
-              <a:t> según </a:t>
-            </a:r>
-            <a:r>
-              <a:rPr lang="es-PE" sz="3200" dirty="0" smtClean="0"/>
-              <a:t>elección.</a:t>
-            </a:r>
-            <a:endParaRPr lang="es-PE" sz="2800" dirty="0"/>
-          </a:p>
-        </p:txBody>
-      </p:sp>
-      <p:pic>
-        <p:nvPicPr>
-          <p:cNvPr id="3" name="2 Imagen"/>
-          <p:cNvPicPr>
-            <a:picLocks noChangeAspect="1"/>
-          </p:cNvPicPr>
-          <p:nvPr/>
-        </p:nvPicPr>
-        <p:blipFill rotWithShape="1">
-          <a:blip r:embed="rId3" cstate="print">
-            <a:extLst>
-              <a:ext uri="{28A0092B-C50C-407E-A947-70E740481C1C}">
-                <a14:useLocalDpi xmlns:a14="http://schemas.microsoft.com/office/drawing/2010/main" val="0"/>
-              </a:ext>
-            </a:extLst>
-          </a:blip>
-          <a:srcRect l="31564" t="5322" r="29719" b="6045"/>
-          <a:stretch/>
-        </p:blipFill>
-        <p:spPr>
-          <a:xfrm>
-            <a:off x="467544" y="836712"/>
-            <a:ext cx="2952328" cy="5748447"/>
-          </a:xfrm>
-          <a:prstGeom prst="rect">
-            <a:avLst/>
-          </a:prstGeom>
-          <a:ln>
-            <a:noFill/>
-          </a:ln>
-          <a:effectLst>
-            <a:softEdge rad="112500"/>
-          </a:effectLst>
-        </p:spPr>
-      </p:pic>
+              <a:rPr lang="es-PE" sz="3600" dirty="0" smtClean="0"/>
+              <a:t>Al finalizar el juego, el equipo ganador mostrará como realizó el juego al resto de asistentes.</a:t>
+            </a:r>
+            <a:endParaRPr lang="es-PE" sz="3600" dirty="0"/>
+          </a:p>
+        </p:txBody>
+      </p:sp>
     </p:spTree>
     <p:extLst>
       <p:ext uri="{BB962C8B-B14F-4D97-AF65-F5344CB8AC3E}">
-        <p14:creationId xmlns:p14="http://schemas.microsoft.com/office/powerpoint/2010/main" val="1123983067"/>
+        <p14:creationId xmlns:p14="http://schemas.microsoft.com/office/powerpoint/2010/main" val="1762542377"/>
       </p:ext>
     </p:extLst>
   </p:cSld>

</xml_diff>

<commit_message>
Se agregó proyecto Demo Diapositivas Feedback
</commit_message>
<xml_diff>
--- a/ppt/Diapositivas.pptx
+++ b/ppt/Diapositivas.pptx
@@ -20,17 +20,17 @@
     <p:sldId id="450" r:id="rId11"/>
     <p:sldId id="447" r:id="rId12"/>
     <p:sldId id="456" r:id="rId13"/>
-    <p:sldId id="469" r:id="rId14"/>
-    <p:sldId id="453" r:id="rId15"/>
-    <p:sldId id="466" r:id="rId16"/>
-    <p:sldId id="465" r:id="rId17"/>
-    <p:sldId id="470" r:id="rId18"/>
-    <p:sldId id="455" r:id="rId19"/>
-    <p:sldId id="457" r:id="rId20"/>
-    <p:sldId id="467" r:id="rId21"/>
-    <p:sldId id="468" r:id="rId22"/>
-    <p:sldId id="471" r:id="rId23"/>
-    <p:sldId id="472" r:id="rId24"/>
+    <p:sldId id="472" r:id="rId14"/>
+    <p:sldId id="469" r:id="rId15"/>
+    <p:sldId id="453" r:id="rId16"/>
+    <p:sldId id="466" r:id="rId17"/>
+    <p:sldId id="465" r:id="rId18"/>
+    <p:sldId id="470" r:id="rId19"/>
+    <p:sldId id="455" r:id="rId20"/>
+    <p:sldId id="457" r:id="rId21"/>
+    <p:sldId id="467" r:id="rId22"/>
+    <p:sldId id="468" r:id="rId23"/>
+    <p:sldId id="471" r:id="rId24"/>
   </p:sldIdLst>
   <p:sldSz cx="9144000" cy="6858000" type="screen4x3"/>
   <p:notesSz cx="6858000" cy="9144000"/>
@@ -214,7 +214,7 @@
           <a:p>
             <a:fld id="{63D5FC4C-9EE1-4746-A368-724F618FC790}" type="datetimeFigureOut">
               <a:rPr lang="es-PE" smtClean="0"/>
-              <a:t>29/09/2011</a:t>
+              <a:t>30/09/2011</a:t>
             </a:fld>
             <a:endParaRPr lang="es-PE"/>
           </a:p>
@@ -862,6 +862,7 @@
           <a:bodyPr/>
           <a:lstStyle/>
           <a:p>
+            <a:pPr algn="l"/>
             <a:endParaRPr lang="es-PE" dirty="0"/>
           </a:p>
         </p:txBody>
@@ -892,7 +893,7 @@
     </p:spTree>
     <p:extLst>
       <p:ext uri="{BB962C8B-B14F-4D97-AF65-F5344CB8AC3E}">
-        <p14:creationId xmlns:p14="http://schemas.microsoft.com/office/powerpoint/2010/main" val="1461112982"/>
+        <p14:creationId xmlns:p14="http://schemas.microsoft.com/office/powerpoint/2010/main" val="3614550747"/>
       </p:ext>
     </p:extLst>
   </p:cSld>
@@ -946,113 +947,6 @@
           <a:bodyPr/>
           <a:lstStyle/>
           <a:p>
-            <a:pPr algn="l"/>
-            <a:r>
-              <a:rPr lang="es-PE" sz="1200" i="1" dirty="0" smtClean="0"/>
-              <a:t>Existe un gran catálogo de </a:t>
-            </a:r>
-            <a:r>
-              <a:rPr lang="es-PE" sz="1200" i="1" dirty="0" err="1" smtClean="0"/>
-              <a:t>refactorings</a:t>
-            </a:r>
-            <a:r>
-              <a:rPr lang="es-PE" sz="1200" i="1" baseline="0" dirty="0" smtClean="0"/>
-              <a:t> y la meta es tratar de practicar la mayor cantidad </a:t>
-            </a:r>
-            <a:endParaRPr lang="es-PE" sz="1200" i="1" dirty="0" smtClean="0"/>
-          </a:p>
-          <a:p>
-            <a:pPr algn="l"/>
-            <a:r>
-              <a:rPr lang="es-PE" sz="1200" i="1" dirty="0" smtClean="0"/>
-              <a:t>(</a:t>
-            </a:r>
-            <a:r>
-              <a:rPr lang="es-PE" sz="1200" i="1" dirty="0" err="1" smtClean="0"/>
-              <a:t>Move</a:t>
-            </a:r>
-            <a:r>
-              <a:rPr lang="es-PE" sz="1200" i="1" dirty="0" smtClean="0"/>
-              <a:t> </a:t>
-            </a:r>
-            <a:r>
-              <a:rPr lang="es-PE" sz="1200" i="1" dirty="0" err="1" smtClean="0"/>
-              <a:t>Method</a:t>
-            </a:r>
-            <a:r>
-              <a:rPr lang="es-PE" sz="1200" i="1" dirty="0" smtClean="0"/>
-              <a:t>, </a:t>
-            </a:r>
-            <a:r>
-              <a:rPr lang="es-PE" sz="1200" i="1" dirty="0" err="1" smtClean="0"/>
-              <a:t>Inline</a:t>
-            </a:r>
-            <a:r>
-              <a:rPr lang="es-PE" sz="1200" i="1" dirty="0" smtClean="0"/>
-              <a:t> </a:t>
-            </a:r>
-            <a:r>
-              <a:rPr lang="es-PE" sz="1200" i="1" dirty="0" err="1" smtClean="0"/>
-              <a:t>Method</a:t>
-            </a:r>
-            <a:r>
-              <a:rPr lang="es-PE" sz="1200" i="1" dirty="0" smtClean="0"/>
-              <a:t>, </a:t>
-            </a:r>
-            <a:r>
-              <a:rPr lang="es-PE" sz="1200" i="1" dirty="0" err="1" smtClean="0"/>
-              <a:t>Extract</a:t>
-            </a:r>
-            <a:r>
-              <a:rPr lang="es-PE" sz="1200" i="1" dirty="0" smtClean="0"/>
-              <a:t> Interface, </a:t>
-            </a:r>
-          </a:p>
-          <a:p>
-            <a:pPr algn="l"/>
-            <a:r>
-              <a:rPr lang="es-PE" sz="1200" i="1" dirty="0" err="1" smtClean="0"/>
-              <a:t>Replace</a:t>
-            </a:r>
-            <a:r>
-              <a:rPr lang="es-PE" sz="1200" i="1" dirty="0" smtClean="0"/>
-              <a:t> </a:t>
-            </a:r>
-            <a:r>
-              <a:rPr lang="es-PE" sz="1200" i="1" dirty="0" err="1" smtClean="0"/>
-              <a:t>Conditional</a:t>
-            </a:r>
-            <a:r>
-              <a:rPr lang="es-PE" sz="1200" i="1" dirty="0" smtClean="0"/>
-              <a:t> </a:t>
-            </a:r>
-            <a:r>
-              <a:rPr lang="es-PE" sz="1200" i="1" dirty="0" err="1" smtClean="0"/>
-              <a:t>with</a:t>
-            </a:r>
-            <a:r>
-              <a:rPr lang="es-PE" sz="1200" i="1" dirty="0" smtClean="0"/>
-              <a:t> </a:t>
-            </a:r>
-            <a:r>
-              <a:rPr lang="es-PE" sz="1200" i="1" dirty="0" err="1" smtClean="0"/>
-              <a:t>Polymorphism</a:t>
-            </a:r>
-            <a:r>
-              <a:rPr lang="es-PE" sz="1200" i="1" dirty="0" smtClean="0"/>
-              <a:t>, </a:t>
-            </a:r>
-            <a:r>
-              <a:rPr lang="es-PE" sz="1200" i="1" dirty="0" err="1" smtClean="0"/>
-              <a:t>etc</a:t>
-            </a:r>
-            <a:r>
-              <a:rPr lang="es-PE" sz="1200" i="1" dirty="0" smtClean="0"/>
-              <a:t>)</a:t>
-            </a:r>
-          </a:p>
-          <a:p>
-            <a:pPr algn="l"/>
             <a:endParaRPr lang="es-PE" dirty="0"/>
           </a:p>
         </p:txBody>
@@ -1083,7 +977,7 @@
     </p:spTree>
     <p:extLst>
       <p:ext uri="{BB962C8B-B14F-4D97-AF65-F5344CB8AC3E}">
-        <p14:creationId xmlns:p14="http://schemas.microsoft.com/office/powerpoint/2010/main" val="3614550747"/>
+        <p14:creationId xmlns:p14="http://schemas.microsoft.com/office/powerpoint/2010/main" val="1461112982"/>
       </p:ext>
     </p:extLst>
   </p:cSld>
@@ -1329,6 +1223,112 @@
           <a:lstStyle/>
           <a:p>
             <a:pPr algn="l"/>
+            <a:r>
+              <a:rPr lang="es-PE" sz="1200" i="1" dirty="0" smtClean="0"/>
+              <a:t>Existe un gran catálogo de </a:t>
+            </a:r>
+            <a:r>
+              <a:rPr lang="es-PE" sz="1200" i="1" dirty="0" err="1" smtClean="0"/>
+              <a:t>refactorings</a:t>
+            </a:r>
+            <a:r>
+              <a:rPr lang="es-PE" sz="1200" i="1" baseline="0" dirty="0" smtClean="0"/>
+              <a:t> y la meta es tratar de practicar la mayor cantidad </a:t>
+            </a:r>
+            <a:endParaRPr lang="es-PE" sz="1200" i="1" dirty="0" smtClean="0"/>
+          </a:p>
+          <a:p>
+            <a:pPr algn="l"/>
+            <a:r>
+              <a:rPr lang="es-PE" sz="1200" i="1" dirty="0" smtClean="0"/>
+              <a:t>(</a:t>
+            </a:r>
+            <a:r>
+              <a:rPr lang="es-PE" sz="1200" i="1" dirty="0" err="1" smtClean="0"/>
+              <a:t>Move</a:t>
+            </a:r>
+            <a:r>
+              <a:rPr lang="es-PE" sz="1200" i="1" dirty="0" smtClean="0"/>
+              <a:t> </a:t>
+            </a:r>
+            <a:r>
+              <a:rPr lang="es-PE" sz="1200" i="1" dirty="0" err="1" smtClean="0"/>
+              <a:t>Method</a:t>
+            </a:r>
+            <a:r>
+              <a:rPr lang="es-PE" sz="1200" i="1" dirty="0" smtClean="0"/>
+              <a:t>, </a:t>
+            </a:r>
+            <a:r>
+              <a:rPr lang="es-PE" sz="1200" i="1" dirty="0" err="1" smtClean="0"/>
+              <a:t>Inline</a:t>
+            </a:r>
+            <a:r>
+              <a:rPr lang="es-PE" sz="1200" i="1" dirty="0" smtClean="0"/>
+              <a:t> </a:t>
+            </a:r>
+            <a:r>
+              <a:rPr lang="es-PE" sz="1200" i="1" dirty="0" err="1" smtClean="0"/>
+              <a:t>Method</a:t>
+            </a:r>
+            <a:r>
+              <a:rPr lang="es-PE" sz="1200" i="1" dirty="0" smtClean="0"/>
+              <a:t>, </a:t>
+            </a:r>
+            <a:r>
+              <a:rPr lang="es-PE" sz="1200" i="1" dirty="0" err="1" smtClean="0"/>
+              <a:t>Extract</a:t>
+            </a:r>
+            <a:r>
+              <a:rPr lang="es-PE" sz="1200" i="1" dirty="0" smtClean="0"/>
+              <a:t> Interface, </a:t>
+            </a:r>
+          </a:p>
+          <a:p>
+            <a:pPr algn="l"/>
+            <a:r>
+              <a:rPr lang="es-PE" sz="1200" i="1" dirty="0" err="1" smtClean="0"/>
+              <a:t>Replace</a:t>
+            </a:r>
+            <a:r>
+              <a:rPr lang="es-PE" sz="1200" i="1" dirty="0" smtClean="0"/>
+              <a:t> </a:t>
+            </a:r>
+            <a:r>
+              <a:rPr lang="es-PE" sz="1200" i="1" dirty="0" err="1" smtClean="0"/>
+              <a:t>Conditional</a:t>
+            </a:r>
+            <a:r>
+              <a:rPr lang="es-PE" sz="1200" i="1" dirty="0" smtClean="0"/>
+              <a:t> </a:t>
+            </a:r>
+            <a:r>
+              <a:rPr lang="es-PE" sz="1200" i="1" dirty="0" err="1" smtClean="0"/>
+              <a:t>with</a:t>
+            </a:r>
+            <a:r>
+              <a:rPr lang="es-PE" sz="1200" i="1" dirty="0" smtClean="0"/>
+              <a:t> </a:t>
+            </a:r>
+            <a:r>
+              <a:rPr lang="es-PE" sz="1200" i="1" dirty="0" err="1" smtClean="0"/>
+              <a:t>Polymorphism</a:t>
+            </a:r>
+            <a:r>
+              <a:rPr lang="es-PE" sz="1200" i="1" dirty="0" smtClean="0"/>
+              <a:t>, </a:t>
+            </a:r>
+            <a:r>
+              <a:rPr lang="es-PE" sz="1200" i="1" dirty="0" err="1" smtClean="0"/>
+              <a:t>etc</a:t>
+            </a:r>
+            <a:r>
+              <a:rPr lang="es-PE" sz="1200" i="1" dirty="0" smtClean="0"/>
+              <a:t>)</a:t>
+            </a:r>
+          </a:p>
+          <a:p>
+            <a:pPr algn="l"/>
             <a:endParaRPr lang="es-PE" dirty="0"/>
           </a:p>
         </p:txBody>
@@ -1498,6 +1498,7 @@
           <a:bodyPr/>
           <a:lstStyle/>
           <a:p>
+            <a:pPr algn="l"/>
             <a:endParaRPr lang="es-PE" dirty="0"/>
           </a:p>
         </p:txBody>
@@ -1528,7 +1529,7 @@
     </p:spTree>
     <p:extLst>
       <p:ext uri="{BB962C8B-B14F-4D97-AF65-F5344CB8AC3E}">
-        <p14:creationId xmlns:p14="http://schemas.microsoft.com/office/powerpoint/2010/main" val="1461112982"/>
+        <p14:creationId xmlns:p14="http://schemas.microsoft.com/office/powerpoint/2010/main" val="3614550747"/>
       </p:ext>
     </p:extLst>
   </p:cSld>
@@ -1582,12 +1583,7 @@
           <a:bodyPr/>
           <a:lstStyle/>
           <a:p>
-            <a:pPr algn="l"/>
-            <a:r>
-              <a:rPr lang="en-US" noProof="0" dirty="0" smtClean="0"/>
-              <a:t>Strategies for larger design changes.</a:t>
-            </a:r>
-            <a:endParaRPr lang="en-US" noProof="0" dirty="0"/>
+            <a:endParaRPr lang="es-PE" dirty="0"/>
           </a:p>
         </p:txBody>
       </p:sp>
@@ -1617,7 +1613,7 @@
     </p:spTree>
     <p:extLst>
       <p:ext uri="{BB962C8B-B14F-4D97-AF65-F5344CB8AC3E}">
-        <p14:creationId xmlns:p14="http://schemas.microsoft.com/office/powerpoint/2010/main" val="3614550747"/>
+        <p14:creationId xmlns:p14="http://schemas.microsoft.com/office/powerpoint/2010/main" val="1461112982"/>
       </p:ext>
     </p:extLst>
   </p:cSld>
@@ -1774,7 +1770,11 @@
           <a:lstStyle/>
           <a:p>
             <a:pPr algn="l"/>
-            <a:endParaRPr lang="es-PE" dirty="0"/>
+            <a:r>
+              <a:rPr lang="en-US" noProof="0" dirty="0" smtClean="0"/>
+              <a:t>Strategies for larger design changes.</a:t>
+            </a:r>
+            <a:endParaRPr lang="en-US" noProof="0" dirty="0"/>
           </a:p>
         </p:txBody>
       </p:sp>
@@ -2918,7 +2918,7 @@
             <a:fld id="{807CB568-C05F-482F-9F26-AA302B8892DF}" type="datetimeFigureOut">
               <a:rPr lang="es-ES" smtClean="0"/>
               <a:pPr/>
-              <a:t>29/09/2011</a:t>
+              <a:t>30/09/2011</a:t>
             </a:fld>
             <a:endParaRPr lang="es-ES"/>
           </a:p>
@@ -3097,7 +3097,7 @@
             <a:fld id="{807CB568-C05F-482F-9F26-AA302B8892DF}" type="datetimeFigureOut">
               <a:rPr lang="es-ES" smtClean="0"/>
               <a:pPr/>
-              <a:t>29/09/2011</a:t>
+              <a:t>30/09/2011</a:t>
             </a:fld>
             <a:endParaRPr lang="es-ES"/>
           </a:p>
@@ -3286,7 +3286,7 @@
             <a:fld id="{807CB568-C05F-482F-9F26-AA302B8892DF}" type="datetimeFigureOut">
               <a:rPr lang="es-ES" smtClean="0"/>
               <a:pPr/>
-              <a:t>29/09/2011</a:t>
+              <a:t>30/09/2011</a:t>
             </a:fld>
             <a:endParaRPr lang="es-ES"/>
           </a:p>
@@ -3465,7 +3465,7 @@
             <a:fld id="{807CB568-C05F-482F-9F26-AA302B8892DF}" type="datetimeFigureOut">
               <a:rPr lang="es-ES" smtClean="0"/>
               <a:pPr/>
-              <a:t>29/09/2011</a:t>
+              <a:t>30/09/2011</a:t>
             </a:fld>
             <a:endParaRPr lang="es-ES"/>
           </a:p>
@@ -3720,7 +3720,7 @@
             <a:fld id="{807CB568-C05F-482F-9F26-AA302B8892DF}" type="datetimeFigureOut">
               <a:rPr lang="es-ES" smtClean="0"/>
               <a:pPr/>
-              <a:t>29/09/2011</a:t>
+              <a:t>30/09/2011</a:t>
             </a:fld>
             <a:endParaRPr lang="es-ES"/>
           </a:p>
@@ -4017,7 +4017,7 @@
             <a:fld id="{807CB568-C05F-482F-9F26-AA302B8892DF}" type="datetimeFigureOut">
               <a:rPr lang="es-ES" smtClean="0"/>
               <a:pPr/>
-              <a:t>29/09/2011</a:t>
+              <a:t>30/09/2011</a:t>
             </a:fld>
             <a:endParaRPr lang="es-ES"/>
           </a:p>
@@ -4448,7 +4448,7 @@
             <a:fld id="{807CB568-C05F-482F-9F26-AA302B8892DF}" type="datetimeFigureOut">
               <a:rPr lang="es-ES" smtClean="0"/>
               <a:pPr/>
-              <a:t>29/09/2011</a:t>
+              <a:t>30/09/2011</a:t>
             </a:fld>
             <a:endParaRPr lang="es-ES"/>
           </a:p>
@@ -4575,7 +4575,7 @@
             <a:fld id="{807CB568-C05F-482F-9F26-AA302B8892DF}" type="datetimeFigureOut">
               <a:rPr lang="es-ES" smtClean="0"/>
               <a:pPr/>
-              <a:t>29/09/2011</a:t>
+              <a:t>30/09/2011</a:t>
             </a:fld>
             <a:endParaRPr lang="es-ES"/>
           </a:p>
@@ -4679,7 +4679,7 @@
             <a:fld id="{807CB568-C05F-482F-9F26-AA302B8892DF}" type="datetimeFigureOut">
               <a:rPr lang="es-ES" smtClean="0"/>
               <a:pPr/>
-              <a:t>29/09/2011</a:t>
+              <a:t>30/09/2011</a:t>
             </a:fld>
             <a:endParaRPr lang="es-ES"/>
           </a:p>
@@ -4965,7 +4965,7 @@
             <a:fld id="{807CB568-C05F-482F-9F26-AA302B8892DF}" type="datetimeFigureOut">
               <a:rPr lang="es-ES" smtClean="0"/>
               <a:pPr/>
-              <a:t>29/09/2011</a:t>
+              <a:t>30/09/2011</a:t>
             </a:fld>
             <a:endParaRPr lang="es-ES"/>
           </a:p>
@@ -5234,7 +5234,7 @@
             <a:fld id="{807CB568-C05F-482F-9F26-AA302B8892DF}" type="datetimeFigureOut">
               <a:rPr lang="es-ES" smtClean="0"/>
               <a:pPr/>
-              <a:t>29/09/2011</a:t>
+              <a:t>30/09/2011</a:t>
             </a:fld>
             <a:endParaRPr lang="es-ES"/>
           </a:p>
@@ -5485,7 +5485,7 @@
             <a:fld id="{807CB568-C05F-482F-9F26-AA302B8892DF}" type="datetimeFigureOut">
               <a:rPr lang="es-ES" smtClean="0"/>
               <a:pPr/>
-              <a:t>29/09/2011</a:t>
+              <a:t>30/09/2011</a:t>
             </a:fld>
             <a:endParaRPr lang="es-ES"/>
           </a:p>
@@ -6723,9 +6723,95 @@
           <a:chExt cx="0" cy="0"/>
         </a:xfrm>
       </p:grpSpPr>
+      <p:sp>
+        <p:nvSpPr>
+          <p:cNvPr id="18" name="1 Título"/>
+          <p:cNvSpPr>
+            <a:spLocks noGrp="1"/>
+          </p:cNvSpPr>
+          <p:nvPr>
+            <p:ph type="title"/>
+          </p:nvPr>
+        </p:nvSpPr>
+        <p:spPr>
+          <a:xfrm>
+            <a:off x="457200" y="162000"/>
+            <a:ext cx="8229600" cy="792088"/>
+          </a:xfrm>
+        </p:spPr>
+        <p:txBody>
+          <a:bodyPr/>
+          <a:lstStyle/>
+          <a:p>
+            <a:r>
+              <a:rPr lang="es-PE" sz="4800" dirty="0" err="1" smtClean="0">
+                <a:solidFill>
+                  <a:srgbClr val="FF0000"/>
+                </a:solidFill>
+              </a:rPr>
+              <a:t>Feedback</a:t>
+            </a:r>
+            <a:endParaRPr lang="es-PE" sz="4800" dirty="0">
+              <a:solidFill>
+                <a:srgbClr val="FF0000"/>
+              </a:solidFill>
+            </a:endParaRPr>
+          </a:p>
+        </p:txBody>
+      </p:sp>
+      <p:sp>
+        <p:nvSpPr>
+          <p:cNvPr id="2" name="1 CuadroTexto"/>
+          <p:cNvSpPr txBox="1"/>
+          <p:nvPr/>
+        </p:nvSpPr>
+        <p:spPr>
+          <a:xfrm>
+            <a:off x="3347864" y="1208941"/>
+            <a:ext cx="5400600" cy="4031873"/>
+          </a:xfrm>
+          <a:prstGeom prst="rect">
+            <a:avLst/>
+          </a:prstGeom>
+          <a:noFill/>
+        </p:spPr>
+        <p:txBody>
+          <a:bodyPr wrap="square" rtlCol="0">
+            <a:spAutoFit/>
+          </a:bodyPr>
+          <a:lstStyle/>
+          <a:p>
+            <a:pPr algn="ctr"/>
+            <a:r>
+              <a:rPr lang="es-PE" sz="3200" dirty="0" smtClean="0"/>
+              <a:t>Nadie puede pasar por la puerta sin dejar algún tipo de idea, comentario o </a:t>
+            </a:r>
+            <a:r>
+              <a:rPr lang="es-PE" sz="3200" dirty="0" err="1" smtClean="0"/>
+              <a:t>feedkback</a:t>
+            </a:r>
+            <a:r>
+              <a:rPr lang="es-PE" sz="3200" dirty="0" smtClean="0"/>
+              <a:t>.</a:t>
+            </a:r>
+          </a:p>
+          <a:p>
+            <a:pPr algn="ctr"/>
+            <a:endParaRPr lang="es-PE" sz="3200" dirty="0"/>
+          </a:p>
+          <a:p>
+            <a:pPr algn="ctr"/>
+            <a:r>
+              <a:rPr lang="es-PE" sz="3200" dirty="0" smtClean="0"/>
+              <a:t>No importa que sea un problema elemental o una carita feliz, deben poner algo en la puerta</a:t>
+            </a:r>
+            <a:endParaRPr lang="es-PE" sz="3200" dirty="0" smtClean="0"/>
+          </a:p>
+        </p:txBody>
+      </p:sp>
       <p:pic>
         <p:nvPicPr>
-          <p:cNvPr id="3" name="2 Imagen"/>
+          <p:cNvPr id="4" name="3 Imagen"/>
           <p:cNvPicPr>
             <a:picLocks noChangeAspect="1"/>
           </p:cNvPicPr>
@@ -6745,50 +6831,18 @@
         </p:blipFill>
         <p:spPr>
           <a:xfrm>
-            <a:off x="-249282" y="-2112"/>
-            <a:ext cx="9717826" cy="6858000"/>
+            <a:off x="591840" y="1556792"/>
+            <a:ext cx="2540000" cy="3390900"/>
           </a:xfrm>
           <a:prstGeom prst="rect">
             <a:avLst/>
           </a:prstGeom>
         </p:spPr>
       </p:pic>
-      <p:sp>
-        <p:nvSpPr>
-          <p:cNvPr id="2" name="1 Título"/>
-          <p:cNvSpPr>
-            <a:spLocks noGrp="1"/>
-          </p:cNvSpPr>
-          <p:nvPr>
-            <p:ph type="ctrTitle"/>
-          </p:nvPr>
-        </p:nvSpPr>
-        <p:spPr>
-          <a:xfrm>
-            <a:off x="704264" y="5517232"/>
-            <a:ext cx="7810734" cy="1093136"/>
-          </a:xfrm>
-        </p:spPr>
-        <p:txBody>
-          <a:bodyPr/>
-          <a:lstStyle/>
-          <a:p>
-            <a:r>
-              <a:rPr lang="es-PE" sz="11500" b="1" spc="300" dirty="0" smtClean="0"/>
-              <a:t>1st </a:t>
-            </a:r>
-            <a:r>
-              <a:rPr lang="es-PE" sz="11500" b="1" spc="300" dirty="0" smtClean="0"/>
-              <a:t>COURSE</a:t>
-            </a:r>
-            <a:endParaRPr lang="es-ES" sz="9600" b="1" spc="300" dirty="0"/>
-          </a:p>
-        </p:txBody>
-      </p:sp>
     </p:spTree>
     <p:extLst>
       <p:ext uri="{BB962C8B-B14F-4D97-AF65-F5344CB8AC3E}">
-        <p14:creationId xmlns:p14="http://schemas.microsoft.com/office/powerpoint/2010/main" val="2661519987"/>
+        <p14:creationId xmlns:p14="http://schemas.microsoft.com/office/powerpoint/2010/main" val="436303969"/>
       </p:ext>
     </p:extLst>
   </p:cSld>
@@ -6822,77 +6876,68 @@
           <a:chExt cx="0" cy="0"/>
         </a:xfrm>
       </p:grpSpPr>
-      <p:sp>
-        <p:nvSpPr>
-          <p:cNvPr id="18" name="1 Título"/>
-          <p:cNvSpPr>
-            <a:spLocks noGrp="1"/>
-          </p:cNvSpPr>
-          <p:nvPr>
-            <p:ph type="title"/>
-          </p:nvPr>
-        </p:nvSpPr>
+      <p:pic>
+        <p:nvPicPr>
+          <p:cNvPr id="3" name="2 Imagen"/>
+          <p:cNvPicPr>
+            <a:picLocks noChangeAspect="1"/>
+          </p:cNvPicPr>
+          <p:nvPr/>
+        </p:nvPicPr>
+        <p:blipFill>
+          <a:blip r:embed="rId3">
+            <a:extLst>
+              <a:ext uri="{28A0092B-C50C-407E-A947-70E740481C1C}">
+                <a14:useLocalDpi xmlns:a14="http://schemas.microsoft.com/office/drawing/2010/main" val="0"/>
+              </a:ext>
+            </a:extLst>
+          </a:blip>
+          <a:stretch>
+            <a:fillRect/>
+          </a:stretch>
+        </p:blipFill>
         <p:spPr>
           <a:xfrm>
-            <a:off x="457200" y="1589389"/>
-            <a:ext cx="8229600" cy="792088"/>
-          </a:xfrm>
-        </p:spPr>
-        <p:txBody>
-          <a:bodyPr/>
-          <a:lstStyle/>
-          <a:p>
-            <a:r>
-              <a:rPr lang="es-PE" sz="4800" dirty="0" smtClean="0">
-                <a:solidFill>
-                  <a:srgbClr val="FF0000"/>
-                </a:solidFill>
-              </a:rPr>
-              <a:t>Objetivo</a:t>
-            </a:r>
-            <a:endParaRPr lang="es-PE" sz="4800" dirty="0">
-              <a:solidFill>
-                <a:srgbClr val="FF0000"/>
-              </a:solidFill>
-            </a:endParaRPr>
-          </a:p>
-        </p:txBody>
-      </p:sp>
-      <p:sp>
-        <p:nvSpPr>
-          <p:cNvPr id="2" name="1 CuadroTexto"/>
-          <p:cNvSpPr txBox="1"/>
-          <p:nvPr/>
-        </p:nvSpPr>
-        <p:spPr>
-          <a:xfrm>
-            <a:off x="611560" y="2507644"/>
-            <a:ext cx="8064896" cy="1938992"/>
+            <a:off x="-249282" y="-2112"/>
+            <a:ext cx="9717826" cy="6858000"/>
           </a:xfrm>
           <a:prstGeom prst="rect">
             <a:avLst/>
           </a:prstGeom>
-          <a:noFill/>
         </p:spPr>
-        <p:txBody>
-          <a:bodyPr wrap="square" rtlCol="0">
-            <a:spAutoFit/>
-          </a:bodyPr>
-          <a:lstStyle/>
-          <a:p>
-            <a:pPr algn="ctr"/>
-            <a:r>
-              <a:rPr lang="es-PE" sz="4000" dirty="0" smtClean="0"/>
-              <a:t>Aprender y practicar diversos refactorizaciones tanto simples como complejos</a:t>
-            </a:r>
-            <a:endParaRPr lang="es-PE" sz="4000" dirty="0"/>
+      </p:pic>
+      <p:sp>
+        <p:nvSpPr>
+          <p:cNvPr id="2" name="1 Título"/>
+          <p:cNvSpPr>
+            <a:spLocks noGrp="1"/>
+          </p:cNvSpPr>
+          <p:nvPr>
+            <p:ph type="ctrTitle"/>
+          </p:nvPr>
+        </p:nvSpPr>
+        <p:spPr>
+          <a:xfrm>
+            <a:off x="704264" y="5517232"/>
+            <a:ext cx="7810734" cy="1093136"/>
+          </a:xfrm>
+        </p:spPr>
+        <p:txBody>
+          <a:bodyPr/>
+          <a:lstStyle/>
+          <a:p>
+            <a:r>
+              <a:rPr lang="es-PE" sz="11500" b="1" spc="300" dirty="0" smtClean="0"/>
+              <a:t>1st COURSE</a:t>
+            </a:r>
+            <a:endParaRPr lang="es-ES" sz="9600" b="1" spc="300" dirty="0"/>
           </a:p>
         </p:txBody>
       </p:sp>
     </p:spTree>
     <p:extLst>
       <p:ext uri="{BB962C8B-B14F-4D97-AF65-F5344CB8AC3E}">
-        <p14:creationId xmlns:p14="http://schemas.microsoft.com/office/powerpoint/2010/main" val="426973170"/>
+        <p14:creationId xmlns:p14="http://schemas.microsoft.com/office/powerpoint/2010/main" val="2661519987"/>
       </p:ext>
     </p:extLst>
   </p:cSld>
@@ -6952,7 +6997,7 @@
                   <a:srgbClr val="FF0000"/>
                 </a:solidFill>
               </a:rPr>
-              <a:t>Descripción</a:t>
+              <a:t>Objetivo</a:t>
             </a:r>
             <a:endParaRPr lang="es-PE" sz="4800" dirty="0">
               <a:solidFill>
@@ -6971,7 +7016,7 @@
         <p:spPr>
           <a:xfrm>
             <a:off x="611560" y="2507644"/>
-            <a:ext cx="8064896" cy="1323439"/>
+            <a:ext cx="8064896" cy="1938992"/>
           </a:xfrm>
           <a:prstGeom prst="rect">
             <a:avLst/>
@@ -6986,16 +7031,8 @@
           <a:p>
             <a:pPr algn="ctr"/>
             <a:r>
-              <a:rPr lang="es-PE" sz="4000" dirty="0"/>
-              <a:t>El código </a:t>
-            </a:r>
-            <a:r>
               <a:rPr lang="es-PE" sz="4000" dirty="0" smtClean="0"/>
-              <a:t>representa el dominio de </a:t>
-            </a:r>
-            <a:r>
-              <a:rPr lang="es-PE" sz="4000" dirty="0"/>
-              <a:t>una tienda online de bicicletas.</a:t>
+              <a:t>Aprender y practicar diversos refactorizaciones tanto simples como complejos</a:t>
             </a:r>
             <a:endParaRPr lang="es-PE" sz="4000" dirty="0"/>
           </a:p>
@@ -7004,7 +7041,7 @@
     </p:spTree>
     <p:extLst>
       <p:ext uri="{BB962C8B-B14F-4D97-AF65-F5344CB8AC3E}">
-        <p14:creationId xmlns:p14="http://schemas.microsoft.com/office/powerpoint/2010/main" val="2864752739"/>
+        <p14:creationId xmlns:p14="http://schemas.microsoft.com/office/powerpoint/2010/main" val="426973170"/>
       </p:ext>
     </p:extLst>
   </p:cSld>
@@ -7050,6 +7087,117 @@
         </p:nvSpPr>
         <p:spPr>
           <a:xfrm>
+            <a:off x="457200" y="1589389"/>
+            <a:ext cx="8229600" cy="792088"/>
+          </a:xfrm>
+        </p:spPr>
+        <p:txBody>
+          <a:bodyPr/>
+          <a:lstStyle/>
+          <a:p>
+            <a:r>
+              <a:rPr lang="es-PE" sz="4800" dirty="0" smtClean="0">
+                <a:solidFill>
+                  <a:srgbClr val="FF0000"/>
+                </a:solidFill>
+              </a:rPr>
+              <a:t>Descripción</a:t>
+            </a:r>
+            <a:endParaRPr lang="es-PE" sz="4800" dirty="0">
+              <a:solidFill>
+                <a:srgbClr val="FF0000"/>
+              </a:solidFill>
+            </a:endParaRPr>
+          </a:p>
+        </p:txBody>
+      </p:sp>
+      <p:sp>
+        <p:nvSpPr>
+          <p:cNvPr id="2" name="1 CuadroTexto"/>
+          <p:cNvSpPr txBox="1"/>
+          <p:nvPr/>
+        </p:nvSpPr>
+        <p:spPr>
+          <a:xfrm>
+            <a:off x="611560" y="2507644"/>
+            <a:ext cx="8064896" cy="1323439"/>
+          </a:xfrm>
+          <a:prstGeom prst="rect">
+            <a:avLst/>
+          </a:prstGeom>
+          <a:noFill/>
+        </p:spPr>
+        <p:txBody>
+          <a:bodyPr wrap="square" rtlCol="0">
+            <a:spAutoFit/>
+          </a:bodyPr>
+          <a:lstStyle/>
+          <a:p>
+            <a:pPr algn="ctr"/>
+            <a:r>
+              <a:rPr lang="es-PE" sz="4000" dirty="0"/>
+              <a:t>El código </a:t>
+            </a:r>
+            <a:r>
+              <a:rPr lang="es-PE" sz="4000" dirty="0" smtClean="0"/>
+              <a:t>representa el dominio de </a:t>
+            </a:r>
+            <a:r>
+              <a:rPr lang="es-PE" sz="4000" dirty="0"/>
+              <a:t>una tienda online de bicicletas.</a:t>
+            </a:r>
+          </a:p>
+        </p:txBody>
+      </p:sp>
+    </p:spTree>
+    <p:extLst>
+      <p:ext uri="{BB962C8B-B14F-4D97-AF65-F5344CB8AC3E}">
+        <p14:creationId xmlns:p14="http://schemas.microsoft.com/office/powerpoint/2010/main" val="2864752739"/>
+      </p:ext>
+    </p:extLst>
+  </p:cSld>
+  <p:clrMapOvr>
+    <a:masterClrMapping/>
+  </p:clrMapOvr>
+  <p:timing>
+    <p:tnLst>
+      <p:par>
+        <p:cTn id="1" dur="indefinite" restart="never" nodeType="tmRoot"/>
+      </p:par>
+    </p:tnLst>
+  </p:timing>
+</p:sld>
+</file>
+
+<file path=ppt/slides/slide17.xml><?xml version="1.0" encoding="utf-8"?>
+<p:sld xmlns:a="http://schemas.openxmlformats.org/drawingml/2006/main" xmlns:r="http://schemas.openxmlformats.org/officeDocument/2006/relationships" xmlns:p="http://schemas.openxmlformats.org/presentationml/2006/main">
+  <p:cSld>
+    <p:spTree>
+      <p:nvGrpSpPr>
+        <p:cNvPr id="1" name=""/>
+        <p:cNvGrpSpPr/>
+        <p:nvPr/>
+      </p:nvGrpSpPr>
+      <p:grpSpPr>
+        <a:xfrm>
+          <a:off x="0" y="0"/>
+          <a:ext cx="0" cy="0"/>
+          <a:chOff x="0" y="0"/>
+          <a:chExt cx="0" cy="0"/>
+        </a:xfrm>
+      </p:grpSpPr>
+      <p:sp>
+        <p:nvSpPr>
+          <p:cNvPr id="18" name="1 Título"/>
+          <p:cNvSpPr>
+            <a:spLocks noGrp="1"/>
+          </p:cNvSpPr>
+          <p:nvPr>
+            <p:ph type="title"/>
+          </p:nvPr>
+        </p:nvSpPr>
+        <p:spPr>
+          <a:xfrm>
             <a:off x="457200" y="162000"/>
             <a:ext cx="8229600" cy="792088"/>
           </a:xfrm>
@@ -7099,15 +7247,7 @@
             <a:pPr algn="ctr"/>
             <a:r>
               <a:rPr lang="es-PE" sz="3200" dirty="0" smtClean="0"/>
-              <a:t>Es </a:t>
-            </a:r>
-            <a:r>
-              <a:rPr lang="es-PE" sz="3200" dirty="0" smtClean="0"/>
-              <a:t>un juego </a:t>
-            </a:r>
-            <a:r>
-              <a:rPr lang="es-PE" sz="3200" dirty="0" smtClean="0"/>
-              <a:t>de 4 hoyos, todos los equipos comenzarán en el </a:t>
+              <a:t>Es un juego de 4 hoyos, todos los equipos comenzarán en el </a:t>
             </a:r>
             <a:r>
               <a:rPr lang="es-PE" sz="3200" dirty="0" err="1" smtClean="0"/>
@@ -7235,7 +7375,7 @@
 </p:sld>
 </file>
 
-<file path=ppt/slides/slide17.xml><?xml version="1.0" encoding="utf-8"?>
+<file path=ppt/slides/slide18.xml><?xml version="1.0" encoding="utf-8"?>
 <p:sld xmlns:a="http://schemas.openxmlformats.org/drawingml/2006/main" xmlns:r="http://schemas.openxmlformats.org/officeDocument/2006/relationships" xmlns:p="http://schemas.openxmlformats.org/presentationml/2006/main">
   <p:cSld>
     <p:spTree>
@@ -7408,7 +7548,7 @@
 </p:sld>
 </file>
 
-<file path=ppt/slides/slide18.xml><?xml version="1.0" encoding="utf-8"?>
+<file path=ppt/slides/slide19.xml><?xml version="1.0" encoding="utf-8"?>
 <p:sld xmlns:a="http://schemas.openxmlformats.org/drawingml/2006/main" xmlns:r="http://schemas.openxmlformats.org/officeDocument/2006/relationships" xmlns:p="http://schemas.openxmlformats.org/presentationml/2006/main">
   <p:cSld>
     <p:spTree>
@@ -7477,11 +7617,7 @@
           <a:p>
             <a:r>
               <a:rPr lang="es-PE" sz="11500" b="1" spc="300" dirty="0" smtClean="0"/>
-              <a:t>2nd </a:t>
-            </a:r>
-            <a:r>
-              <a:rPr lang="es-PE" sz="11500" b="1" spc="300" dirty="0" smtClean="0"/>
-              <a:t>COURSE</a:t>
+              <a:t>2nd COURSE</a:t>
             </a:r>
             <a:endParaRPr lang="es-ES" sz="9600" b="1" spc="300" dirty="0"/>
           </a:p>
@@ -7491,149 +7627,6 @@
     <p:extLst>
       <p:ext uri="{BB962C8B-B14F-4D97-AF65-F5344CB8AC3E}">
         <p14:creationId xmlns:p14="http://schemas.microsoft.com/office/powerpoint/2010/main" val="3991114041"/>
-      </p:ext>
-    </p:extLst>
-  </p:cSld>
-  <p:clrMapOvr>
-    <a:masterClrMapping/>
-  </p:clrMapOvr>
-  <p:timing>
-    <p:tnLst>
-      <p:par>
-        <p:cTn id="1" dur="indefinite" restart="never" nodeType="tmRoot"/>
-      </p:par>
-    </p:tnLst>
-  </p:timing>
-</p:sld>
-</file>
-
-<file path=ppt/slides/slide19.xml><?xml version="1.0" encoding="utf-8"?>
-<p:sld xmlns:a="http://schemas.openxmlformats.org/drawingml/2006/main" xmlns:r="http://schemas.openxmlformats.org/officeDocument/2006/relationships" xmlns:p="http://schemas.openxmlformats.org/presentationml/2006/main">
-  <p:cSld>
-    <p:spTree>
-      <p:nvGrpSpPr>
-        <p:cNvPr id="1" name=""/>
-        <p:cNvGrpSpPr/>
-        <p:nvPr/>
-      </p:nvGrpSpPr>
-      <p:grpSpPr>
-        <a:xfrm>
-          <a:off x="0" y="0"/>
-          <a:ext cx="0" cy="0"/>
-          <a:chOff x="0" y="0"/>
-          <a:chExt cx="0" cy="0"/>
-        </a:xfrm>
-      </p:grpSpPr>
-      <p:sp>
-        <p:nvSpPr>
-          <p:cNvPr id="18" name="1 Título"/>
-          <p:cNvSpPr>
-            <a:spLocks noGrp="1"/>
-          </p:cNvSpPr>
-          <p:nvPr>
-            <p:ph type="title"/>
-          </p:nvPr>
-        </p:nvSpPr>
-        <p:spPr>
-          <a:xfrm>
-            <a:off x="457200" y="1589389"/>
-            <a:ext cx="8229600" cy="792088"/>
-          </a:xfrm>
-        </p:spPr>
-        <p:txBody>
-          <a:bodyPr/>
-          <a:lstStyle/>
-          <a:p>
-            <a:r>
-              <a:rPr lang="es-PE" sz="4800" dirty="0" smtClean="0">
-                <a:solidFill>
-                  <a:srgbClr val="FF0000"/>
-                </a:solidFill>
-              </a:rPr>
-              <a:t>Objetivo</a:t>
-            </a:r>
-            <a:endParaRPr lang="es-PE" sz="4800" dirty="0">
-              <a:solidFill>
-                <a:srgbClr val="FF0000"/>
-              </a:solidFill>
-            </a:endParaRPr>
-          </a:p>
-        </p:txBody>
-      </p:sp>
-      <p:sp>
-        <p:nvSpPr>
-          <p:cNvPr id="2" name="1 CuadroTexto"/>
-          <p:cNvSpPr txBox="1"/>
-          <p:nvPr/>
-        </p:nvSpPr>
-        <p:spPr>
-          <a:xfrm>
-            <a:off x="611560" y="2507644"/>
-            <a:ext cx="8064896" cy="1938992"/>
-          </a:xfrm>
-          <a:prstGeom prst="rect">
-            <a:avLst/>
-          </a:prstGeom>
-          <a:noFill/>
-        </p:spPr>
-        <p:txBody>
-          <a:bodyPr wrap="square" rtlCol="0">
-            <a:spAutoFit/>
-          </a:bodyPr>
-          <a:lstStyle/>
-          <a:p>
-            <a:pPr algn="ctr"/>
-            <a:r>
-              <a:rPr lang="es-PE" sz="4000" dirty="0" smtClean="0"/>
-              <a:t>Aprender y practicar diversas estratégicas de refactorización</a:t>
-            </a:r>
-          </a:p>
-          <a:p>
-            <a:pPr algn="ctr"/>
-            <a:r>
-              <a:rPr lang="es-PE" sz="4000" dirty="0" smtClean="0"/>
-              <a:t>(</a:t>
-            </a:r>
-            <a:r>
-              <a:rPr lang="es-PE" sz="4000" dirty="0" err="1" smtClean="0"/>
-              <a:t>Parallel</a:t>
-            </a:r>
-            <a:r>
-              <a:rPr lang="es-PE" sz="4000" dirty="0" smtClean="0"/>
-              <a:t> </a:t>
-            </a:r>
-            <a:r>
-              <a:rPr lang="es-PE" sz="4000" dirty="0" err="1" smtClean="0"/>
-              <a:t>Change</a:t>
-            </a:r>
-            <a:r>
-              <a:rPr lang="es-PE" sz="4000" dirty="0" smtClean="0"/>
-              <a:t> y </a:t>
-            </a:r>
-            <a:r>
-              <a:rPr lang="es-PE" sz="4000" dirty="0" err="1" smtClean="0"/>
-              <a:t>Narrowed</a:t>
-            </a:r>
-            <a:r>
-              <a:rPr lang="es-PE" sz="4000" dirty="0" smtClean="0"/>
-              <a:t> </a:t>
-            </a:r>
-            <a:r>
-              <a:rPr lang="es-PE" sz="4000" dirty="0" err="1" smtClean="0"/>
-              <a:t>Change</a:t>
-            </a:r>
-            <a:r>
-              <a:rPr lang="es-PE" sz="4000" dirty="0" smtClean="0"/>
-              <a:t>)</a:t>
-            </a:r>
-            <a:endParaRPr lang="es-PE" sz="4000" dirty="0"/>
-          </a:p>
-        </p:txBody>
-      </p:sp>
-    </p:spTree>
-    <p:extLst>
-      <p:ext uri="{BB962C8B-B14F-4D97-AF65-F5344CB8AC3E}">
-        <p14:creationId xmlns:p14="http://schemas.microsoft.com/office/powerpoint/2010/main" val="2293511525"/>
       </p:ext>
     </p:extLst>
   </p:cSld>
@@ -7850,7 +7843,7 @@
                   <a:srgbClr val="FF0000"/>
                 </a:solidFill>
               </a:rPr>
-              <a:t>Descripción</a:t>
+              <a:t>Objetivo</a:t>
             </a:r>
             <a:endParaRPr lang="es-PE" sz="4800" dirty="0">
               <a:solidFill>
@@ -7869,7 +7862,7 @@
         <p:spPr>
           <a:xfrm>
             <a:off x="611560" y="2507644"/>
-            <a:ext cx="8064896" cy="1323439"/>
+            <a:ext cx="8064896" cy="1938992"/>
           </a:xfrm>
           <a:prstGeom prst="rect">
             <a:avLst/>
@@ -7884,20 +7877,47 @@
           <a:p>
             <a:pPr algn="ctr"/>
             <a:r>
-              <a:rPr lang="es-PE" sz="4000" dirty="0"/>
-              <a:t>El código </a:t>
-            </a:r>
-            <a:r>
               <a:rPr lang="es-PE" sz="4000" dirty="0" smtClean="0"/>
-              <a:t>es de una clase que representa a un </a:t>
+              <a:t>Aprender y practicar diversas estratégicas de refactorización</a:t>
+            </a:r>
+          </a:p>
+          <a:p>
+            <a:pPr algn="ctr"/>
+            <a:r>
+              <a:rPr lang="es-PE" sz="4000" dirty="0" smtClean="0"/>
+              <a:t>(</a:t>
             </a:r>
             <a:r>
               <a:rPr lang="es-PE" sz="4000" dirty="0" err="1" smtClean="0"/>
-              <a:t>Stack</a:t>
+              <a:t>Parallel</a:t>
             </a:r>
             <a:r>
               <a:rPr lang="es-PE" sz="4000" dirty="0" smtClean="0"/>
-              <a:t> (Pila) </a:t>
+              <a:t> </a:t>
+            </a:r>
+            <a:r>
+              <a:rPr lang="es-PE" sz="4000" dirty="0" err="1" smtClean="0"/>
+              <a:t>Change</a:t>
+            </a:r>
+            <a:r>
+              <a:rPr lang="es-PE" sz="4000" dirty="0" smtClean="0"/>
+              <a:t> y </a:t>
+            </a:r>
+            <a:r>
+              <a:rPr lang="es-PE" sz="4000" dirty="0" err="1" smtClean="0"/>
+              <a:t>Narrowed</a:t>
+            </a:r>
+            <a:r>
+              <a:rPr lang="es-PE" sz="4000" dirty="0" smtClean="0"/>
+              <a:t> </a:t>
+            </a:r>
+            <a:r>
+              <a:rPr lang="es-PE" sz="4000" dirty="0" err="1" smtClean="0"/>
+              <a:t>Change</a:t>
+            </a:r>
+            <a:r>
+              <a:rPr lang="es-PE" sz="4000" dirty="0" smtClean="0"/>
+              <a:t>)</a:t>
             </a:r>
             <a:endParaRPr lang="es-PE" sz="4000" dirty="0"/>
           </a:p>
@@ -7906,7 +7926,7 @@
     </p:spTree>
     <p:extLst>
       <p:ext uri="{BB962C8B-B14F-4D97-AF65-F5344CB8AC3E}">
-        <p14:creationId xmlns:p14="http://schemas.microsoft.com/office/powerpoint/2010/main" val="997755487"/>
+        <p14:creationId xmlns:p14="http://schemas.microsoft.com/office/powerpoint/2010/main" val="2293511525"/>
       </p:ext>
     </p:extLst>
   </p:cSld>
@@ -7952,6 +7972,122 @@
         </p:nvSpPr>
         <p:spPr>
           <a:xfrm>
+            <a:off x="457200" y="1589389"/>
+            <a:ext cx="8229600" cy="792088"/>
+          </a:xfrm>
+        </p:spPr>
+        <p:txBody>
+          <a:bodyPr/>
+          <a:lstStyle/>
+          <a:p>
+            <a:r>
+              <a:rPr lang="es-PE" sz="4800" dirty="0" smtClean="0">
+                <a:solidFill>
+                  <a:srgbClr val="FF0000"/>
+                </a:solidFill>
+              </a:rPr>
+              <a:t>Descripción</a:t>
+            </a:r>
+            <a:endParaRPr lang="es-PE" sz="4800" dirty="0">
+              <a:solidFill>
+                <a:srgbClr val="FF0000"/>
+              </a:solidFill>
+            </a:endParaRPr>
+          </a:p>
+        </p:txBody>
+      </p:sp>
+      <p:sp>
+        <p:nvSpPr>
+          <p:cNvPr id="2" name="1 CuadroTexto"/>
+          <p:cNvSpPr txBox="1"/>
+          <p:nvPr/>
+        </p:nvSpPr>
+        <p:spPr>
+          <a:xfrm>
+            <a:off x="611560" y="2507644"/>
+            <a:ext cx="8064896" cy="1323439"/>
+          </a:xfrm>
+          <a:prstGeom prst="rect">
+            <a:avLst/>
+          </a:prstGeom>
+          <a:noFill/>
+        </p:spPr>
+        <p:txBody>
+          <a:bodyPr wrap="square" rtlCol="0">
+            <a:spAutoFit/>
+          </a:bodyPr>
+          <a:lstStyle/>
+          <a:p>
+            <a:pPr algn="ctr"/>
+            <a:r>
+              <a:rPr lang="es-PE" sz="4000" dirty="0"/>
+              <a:t>El código </a:t>
+            </a:r>
+            <a:r>
+              <a:rPr lang="es-PE" sz="4000" dirty="0" smtClean="0"/>
+              <a:t>es de una clase que representa a un </a:t>
+            </a:r>
+            <a:r>
+              <a:rPr lang="es-PE" sz="4000" dirty="0" err="1" smtClean="0"/>
+              <a:t>Stack</a:t>
+            </a:r>
+            <a:r>
+              <a:rPr lang="es-PE" sz="4000" dirty="0" smtClean="0"/>
+              <a:t> (Pila) </a:t>
+            </a:r>
+            <a:endParaRPr lang="es-PE" sz="4000" dirty="0"/>
+          </a:p>
+        </p:txBody>
+      </p:sp>
+    </p:spTree>
+    <p:extLst>
+      <p:ext uri="{BB962C8B-B14F-4D97-AF65-F5344CB8AC3E}">
+        <p14:creationId xmlns:p14="http://schemas.microsoft.com/office/powerpoint/2010/main" val="997755487"/>
+      </p:ext>
+    </p:extLst>
+  </p:cSld>
+  <p:clrMapOvr>
+    <a:masterClrMapping/>
+  </p:clrMapOvr>
+  <p:timing>
+    <p:tnLst>
+      <p:par>
+        <p:cTn id="1" dur="indefinite" restart="never" nodeType="tmRoot"/>
+      </p:par>
+    </p:tnLst>
+  </p:timing>
+</p:sld>
+</file>
+
+<file path=ppt/slides/slide22.xml><?xml version="1.0" encoding="utf-8"?>
+<p:sld xmlns:a="http://schemas.openxmlformats.org/drawingml/2006/main" xmlns:r="http://schemas.openxmlformats.org/officeDocument/2006/relationships" xmlns:p="http://schemas.openxmlformats.org/presentationml/2006/main">
+  <p:cSld>
+    <p:spTree>
+      <p:nvGrpSpPr>
+        <p:cNvPr id="1" name=""/>
+        <p:cNvGrpSpPr/>
+        <p:nvPr/>
+      </p:nvGrpSpPr>
+      <p:grpSpPr>
+        <a:xfrm>
+          <a:off x="0" y="0"/>
+          <a:ext cx="0" cy="0"/>
+          <a:chOff x="0" y="0"/>
+          <a:chExt cx="0" cy="0"/>
+        </a:xfrm>
+      </p:grpSpPr>
+      <p:sp>
+        <p:nvSpPr>
+          <p:cNvPr id="18" name="1 Título"/>
+          <p:cNvSpPr>
+            <a:spLocks noGrp="1"/>
+          </p:cNvSpPr>
+          <p:nvPr>
+            <p:ph type="title"/>
+          </p:nvPr>
+        </p:nvSpPr>
+        <p:spPr>
+          <a:xfrm>
             <a:off x="457200" y="162000"/>
             <a:ext cx="8229600" cy="792088"/>
           </a:xfrm>
@@ -8001,13 +8137,8 @@
             <a:pPr algn="ctr"/>
             <a:r>
               <a:rPr lang="es-PE" sz="3200" dirty="0" smtClean="0"/>
-              <a:t>Es </a:t>
-            </a:r>
-            <a:r>
-              <a:rPr lang="es-PE" sz="3200" dirty="0" smtClean="0"/>
-              <a:t>un recorrido de un único hoyo</a:t>
-            </a:r>
-            <a:endParaRPr lang="es-PE" sz="3200" dirty="0" smtClean="0"/>
+              <a:t>Es un recorrido de un único hoyo</a:t>
+            </a:r>
           </a:p>
         </p:txBody>
       </p:sp>
@@ -8126,179 +8257,6 @@
 </p:sld>
 </file>
 
-<file path=ppt/slides/slide22.xml><?xml version="1.0" encoding="utf-8"?>
-<p:sld xmlns:a="http://schemas.openxmlformats.org/drawingml/2006/main" xmlns:r="http://schemas.openxmlformats.org/officeDocument/2006/relationships" xmlns:p="http://schemas.openxmlformats.org/presentationml/2006/main">
-  <p:cSld>
-    <p:spTree>
-      <p:nvGrpSpPr>
-        <p:cNvPr id="1" name=""/>
-        <p:cNvGrpSpPr/>
-        <p:nvPr/>
-      </p:nvGrpSpPr>
-      <p:grpSpPr>
-        <a:xfrm>
-          <a:off x="0" y="0"/>
-          <a:ext cx="0" cy="0"/>
-          <a:chOff x="0" y="0"/>
-          <a:chExt cx="0" cy="0"/>
-        </a:xfrm>
-      </p:grpSpPr>
-      <p:sp>
-        <p:nvSpPr>
-          <p:cNvPr id="18" name="1 Título"/>
-          <p:cNvSpPr>
-            <a:spLocks noGrp="1"/>
-          </p:cNvSpPr>
-          <p:nvPr>
-            <p:ph type="title"/>
-          </p:nvPr>
-        </p:nvSpPr>
-        <p:spPr>
-          <a:xfrm>
-            <a:off x="457200" y="162000"/>
-            <a:ext cx="8229600" cy="792088"/>
-          </a:xfrm>
-        </p:spPr>
-        <p:txBody>
-          <a:bodyPr/>
-          <a:lstStyle/>
-          <a:p>
-            <a:r>
-              <a:rPr lang="es-PE" sz="4800" dirty="0" smtClean="0">
-                <a:solidFill>
-                  <a:srgbClr val="FF0000"/>
-                </a:solidFill>
-              </a:rPr>
-              <a:t>Listos </a:t>
-            </a:r>
-            <a:r>
-              <a:rPr lang="es-PE" sz="4800" dirty="0">
-                <a:solidFill>
-                  <a:srgbClr val="FF0000"/>
-                </a:solidFill>
-              </a:rPr>
-              <a:t>P</a:t>
-            </a:r>
-            <a:r>
-              <a:rPr lang="es-PE" sz="4800" dirty="0" smtClean="0">
-                <a:solidFill>
-                  <a:srgbClr val="FF0000"/>
-                </a:solidFill>
-              </a:rPr>
-              <a:t>ara Comenzar</a:t>
-            </a:r>
-            <a:endParaRPr lang="es-PE" sz="4800" dirty="0">
-              <a:solidFill>
-                <a:srgbClr val="FF0000"/>
-              </a:solidFill>
-            </a:endParaRPr>
-          </a:p>
-        </p:txBody>
-      </p:sp>
-      <p:sp>
-        <p:nvSpPr>
-          <p:cNvPr id="2" name="1 CuadroTexto"/>
-          <p:cNvSpPr txBox="1"/>
-          <p:nvPr/>
-        </p:nvSpPr>
-        <p:spPr>
-          <a:xfrm>
-            <a:off x="251520" y="1208941"/>
-            <a:ext cx="8640960" cy="4524315"/>
-          </a:xfrm>
-          <a:prstGeom prst="rect">
-            <a:avLst/>
-          </a:prstGeom>
-          <a:noFill/>
-        </p:spPr>
-        <p:txBody>
-          <a:bodyPr wrap="square" rtlCol="0">
-            <a:spAutoFit/>
-          </a:bodyPr>
-          <a:lstStyle/>
-          <a:p>
-            <a:pPr marL="457200" indent="-457200">
-              <a:buFont typeface="Arial" pitchFamily="34" charset="0"/>
-              <a:buChar char="•"/>
-            </a:pPr>
-            <a:r>
-              <a:rPr lang="es-PE" sz="3200" dirty="0" smtClean="0"/>
-              <a:t>Abrir el código inicial en el IDE.</a:t>
-            </a:r>
-          </a:p>
-          <a:p>
-            <a:pPr marL="457200" indent="-457200">
-              <a:buFont typeface="Arial" pitchFamily="34" charset="0"/>
-              <a:buChar char="•"/>
-            </a:pPr>
-            <a:endParaRPr lang="es-PE" sz="3200" dirty="0"/>
-          </a:p>
-          <a:p>
-            <a:pPr marL="457200" indent="-457200">
-              <a:buFont typeface="Arial" pitchFamily="34" charset="0"/>
-              <a:buChar char="•"/>
-            </a:pPr>
-            <a:r>
-              <a:rPr lang="es-PE" sz="3200" dirty="0" smtClean="0"/>
-              <a:t>Asegurarse que compile y todos los test se pasen.</a:t>
-            </a:r>
-          </a:p>
-          <a:p>
-            <a:pPr marL="457200" indent="-457200">
-              <a:buFont typeface="Arial" pitchFamily="34" charset="0"/>
-              <a:buChar char="•"/>
-            </a:pPr>
-            <a:endParaRPr lang="es-PE" sz="3200" dirty="0"/>
-          </a:p>
-          <a:p>
-            <a:pPr marL="457200" indent="-457200">
-              <a:buFont typeface="Arial" pitchFamily="34" charset="0"/>
-              <a:buChar char="•"/>
-            </a:pPr>
-            <a:r>
-              <a:rPr lang="es-PE" sz="3200" dirty="0" smtClean="0"/>
-              <a:t>No se olviden las actividades de cada rol del equipo.</a:t>
-            </a:r>
-          </a:p>
-          <a:p>
-            <a:pPr marL="457200" indent="-457200">
-              <a:buFont typeface="Arial" pitchFamily="34" charset="0"/>
-              <a:buChar char="•"/>
-            </a:pPr>
-            <a:endParaRPr lang="es-PE" sz="3200" dirty="0"/>
-          </a:p>
-          <a:p>
-            <a:pPr marL="457200" indent="-457200">
-              <a:buFont typeface="Arial" pitchFamily="34" charset="0"/>
-              <a:buChar char="•"/>
-            </a:pPr>
-            <a:r>
-              <a:rPr lang="es-PE" sz="3200" dirty="0" smtClean="0"/>
-              <a:t>Tienen 15 minutos para todo el recorrido.</a:t>
-            </a:r>
-          </a:p>
-        </p:txBody>
-      </p:sp>
-    </p:spTree>
-    <p:extLst>
-      <p:ext uri="{BB962C8B-B14F-4D97-AF65-F5344CB8AC3E}">
-        <p14:creationId xmlns:p14="http://schemas.microsoft.com/office/powerpoint/2010/main" val="1687246152"/>
-      </p:ext>
-    </p:extLst>
-  </p:cSld>
-  <p:clrMapOvr>
-    <a:masterClrMapping/>
-  </p:clrMapOvr>
-  <p:timing>
-    <p:tnLst>
-      <p:par>
-        <p:cTn id="1" dur="indefinite" restart="never" nodeType="tmRoot"/>
-      </p:par>
-    </p:tnLst>
-  </p:timing>
-</p:sld>
-</file>
-
 <file path=ppt/slides/slide23.xml><?xml version="1.0" encoding="utf-8"?>
 <p:sld xmlns:a="http://schemas.openxmlformats.org/drawingml/2006/main" xmlns:r="http://schemas.openxmlformats.org/officeDocument/2006/relationships" xmlns:p="http://schemas.openxmlformats.org/presentationml/2006/main">
   <p:cSld>
@@ -8337,12 +8295,28 @@
           <a:lstStyle/>
           <a:p>
             <a:r>
-              <a:rPr lang="es-PE" sz="4800" dirty="0" err="1" smtClean="0">
+              <a:rPr lang="es-PE" sz="4800" dirty="0" smtClean="0">
                 <a:solidFill>
                   <a:srgbClr val="FF0000"/>
                 </a:solidFill>
               </a:rPr>
-              <a:t>Feedback</a:t>
+              <a:t>Listos </a:t>
+            </a:r>
+            <a:r>
+              <a:rPr lang="es-PE" sz="4800" dirty="0">
+                <a:solidFill>
+                  <a:srgbClr val="FF0000"/>
+                </a:solidFill>
+              </a:rPr>
+              <a:t>P</a:t>
+            </a:r>
+            <a:r>
+              <a:rPr lang="es-PE" sz="4800" dirty="0" smtClean="0">
+                <a:solidFill>
+                  <a:srgbClr val="FF0000"/>
+                </a:solidFill>
+              </a:rPr>
+              <a:t>ara Comenzar</a:t>
             </a:r>
             <a:endParaRPr lang="es-PE" sz="4800" dirty="0">
               <a:solidFill>
@@ -8431,7 +8405,7 @@
             </a:pPr>
             <a:r>
               <a:rPr lang="es-PE" sz="3200" dirty="0" smtClean="0"/>
-              <a:t>Tienen 10 minutos por hoyo.</a:t>
+              <a:t>Tienen 15 minutos para todo el recorrido.</a:t>
             </a:r>
           </a:p>
         </p:txBody>
@@ -8439,7 +8413,7 @@
     </p:spTree>
     <p:extLst>
       <p:ext uri="{BB962C8B-B14F-4D97-AF65-F5344CB8AC3E}">
-        <p14:creationId xmlns:p14="http://schemas.microsoft.com/office/powerpoint/2010/main" val="436303969"/>
+        <p14:creationId xmlns:p14="http://schemas.microsoft.com/office/powerpoint/2010/main" val="1687246152"/>
       </p:ext>
     </p:extLst>
   </p:cSld>
@@ -9246,17 +9220,8 @@
             </a:br>
             <a:r>
               <a:rPr lang="es-PE" sz="2800" dirty="0" smtClean="0"/>
-              <a:t>(El </a:t>
-            </a:r>
-            <a:r>
-              <a:rPr lang="es-PE" sz="2800" dirty="0" smtClean="0"/>
-              <a:t>código se encuentra en VS2010 y Eclipse pero se puede </a:t>
-            </a:r>
-            <a:r>
-              <a:rPr lang="es-PE" sz="2800" dirty="0" smtClean="0"/>
-              <a:t>importar)</a:t>
-            </a:r>
-            <a:endParaRPr lang="es-PE" sz="2800" dirty="0" smtClean="0"/>
+              <a:t>(El código se encuentra en VS2010 y Eclipse pero se puede importar)</a:t>
+            </a:r>
           </a:p>
           <a:p>
             <a:pPr marL="439738" indent="-439738" algn="ctr">
@@ -9358,7 +9323,6 @@
               <a:rPr lang="es-PE" sz="3600" dirty="0"/>
               <a:t>de cada juego en papel.</a:t>
             </a:r>
-            <a:endParaRPr lang="es-PE" sz="3600" dirty="0"/>
           </a:p>
         </p:txBody>
       </p:sp>

</xml_diff>

<commit_message>
Elimnación First Course Java
</commit_message>
<xml_diff>
--- a/ppt/Diapositivas.pptx
+++ b/ppt/Diapositivas.pptx
@@ -6805,7 +6805,6 @@
               <a:rPr lang="es-PE" sz="3200" dirty="0" smtClean="0"/>
               <a:t>No importa que sea un problema elemental o una carita feliz, deben poner algo en la puerta</a:t>
             </a:r>
-            <a:endParaRPr lang="es-PE" sz="3200" dirty="0" smtClean="0"/>
           </a:p>
         </p:txBody>
       </p:sp>
@@ -9443,8 +9442,8 @@
         </p:nvSpPr>
         <p:spPr>
           <a:xfrm>
-            <a:off x="634590" y="1025663"/>
-            <a:ext cx="7874820" cy="2862322"/>
+            <a:off x="251520" y="879224"/>
+            <a:ext cx="8712968" cy="3970318"/>
           </a:xfrm>
           <a:prstGeom prst="rect">
             <a:avLst/>
@@ -9459,87 +9458,99 @@
           <a:p>
             <a:pPr algn="ctr"/>
             <a:r>
-              <a:rPr lang="es-PE" sz="3600" dirty="0" smtClean="0">
+              <a:rPr lang="es-PE" sz="3500" dirty="0" smtClean="0">
                 <a:solidFill>
                   <a:srgbClr val="FFC000"/>
                 </a:solidFill>
               </a:rPr>
               <a:t>General</a:t>
             </a:r>
-            <a:endParaRPr lang="es-PE" sz="3600" dirty="0" smtClean="0"/>
-          </a:p>
-          <a:p>
-            <a:r>
-              <a:rPr lang="es-PE" sz="3600" dirty="0" smtClean="0"/>
+            <a:endParaRPr lang="es-PE" sz="3500" dirty="0" smtClean="0"/>
+          </a:p>
+          <a:p>
+            <a:r>
+              <a:rPr lang="es-PE" sz="3500" dirty="0" smtClean="0"/>
               <a:t>+</a:t>
             </a:r>
             <a:r>
-              <a:rPr lang="es-PE" sz="3600" dirty="0"/>
+              <a:rPr lang="es-PE" sz="3500" dirty="0"/>
               <a:t>1 </a:t>
             </a:r>
             <a:r>
-              <a:rPr lang="es-PE" sz="3600" dirty="0" smtClean="0"/>
+              <a:rPr lang="es-PE" sz="3500" dirty="0" smtClean="0"/>
               <a:t>Cada refactorización</a:t>
             </a:r>
           </a:p>
           <a:p>
             <a:r>
-              <a:rPr lang="es-PE" sz="3600" dirty="0" smtClean="0"/>
+              <a:rPr lang="es-PE" sz="3500" dirty="0" smtClean="0"/>
               <a:t>+</a:t>
             </a:r>
             <a:r>
-              <a:rPr lang="es-PE" sz="3600" dirty="0"/>
+              <a:rPr lang="es-PE" sz="3500" dirty="0"/>
               <a:t>1 Copiar + </a:t>
             </a:r>
             <a:r>
-              <a:rPr lang="es-PE" sz="3600" dirty="0" smtClean="0"/>
+              <a:rPr lang="es-PE" sz="3500" dirty="0" smtClean="0"/>
               <a:t>Pegar</a:t>
             </a:r>
           </a:p>
           <a:p>
             <a:r>
-              <a:rPr lang="es-PE" sz="3600" dirty="0"/>
+              <a:rPr lang="es-PE" sz="3500" dirty="0"/>
               <a:t>+1 </a:t>
             </a:r>
             <a:r>
-              <a:rPr lang="es-PE" sz="3600" dirty="0" smtClean="0"/>
+              <a:rPr lang="es-PE" sz="3500" dirty="0" smtClean="0"/>
               <a:t>Cualquier </a:t>
             </a:r>
             <a:r>
-              <a:rPr lang="es-PE" sz="3600" dirty="0" err="1" smtClean="0"/>
+              <a:rPr lang="es-PE" sz="3500" dirty="0" err="1" smtClean="0"/>
               <a:t>shortcut</a:t>
             </a:r>
             <a:r>
-              <a:rPr lang="es-PE" sz="3600" dirty="0" smtClean="0"/>
+              <a:rPr lang="es-PE" sz="3500" dirty="0" smtClean="0"/>
               <a:t> </a:t>
             </a:r>
             <a:r>
-              <a:rPr lang="es-PE" sz="3600" dirty="0"/>
+              <a:rPr lang="es-PE" sz="3500" dirty="0"/>
               <a:t>de edición </a:t>
             </a:r>
             <a:r>
-              <a:rPr lang="es-PE" sz="3600" dirty="0" smtClean="0"/>
+              <a:rPr lang="es-PE" sz="3500" dirty="0" smtClean="0"/>
               <a:t>código</a:t>
             </a:r>
           </a:p>
           <a:p>
-            <a:r>
-              <a:rPr lang="es-PE" sz="3600" dirty="0" smtClean="0"/>
+            <a:pPr marL="633413" indent="-633413"/>
+            <a:r>
+              <a:rPr lang="es-PE" sz="3500" dirty="0" smtClean="0"/>
               <a:t>+</a:t>
             </a:r>
             <a:r>
-              <a:rPr lang="es-PE" sz="3600" dirty="0"/>
-              <a:t>0 Organizar y dar formato al </a:t>
-            </a:r>
-            <a:r>
-              <a:rPr lang="es-PE" sz="3600" dirty="0" smtClean="0"/>
-              <a:t>código</a:t>
-            </a:r>
-            <a:endParaRPr lang="es-PE" sz="3600" dirty="0" smtClean="0">
-              <a:solidFill>
-                <a:srgbClr val="FFC000"/>
-              </a:solidFill>
-            </a:endParaRPr>
+              <a:rPr lang="es-PE" sz="3500" dirty="0"/>
+              <a:t>0 </a:t>
+            </a:r>
+            <a:r>
+              <a:rPr lang="es-PE" sz="3500" dirty="0" smtClean="0"/>
+              <a:t>Organizar, dar </a:t>
+            </a:r>
+            <a:r>
+              <a:rPr lang="es-PE" sz="3500" dirty="0"/>
+              <a:t>formato al </a:t>
+            </a:r>
+            <a:r>
+              <a:rPr lang="es-PE" sz="3500" dirty="0" smtClean="0"/>
+              <a:t>código o eliminar líneas en blanco</a:t>
+            </a:r>
+          </a:p>
+          <a:p>
+            <a:pPr marL="633413" indent="-633413"/>
+            <a:r>
+              <a:rPr lang="es-PE" sz="3500" dirty="0" smtClean="0"/>
+              <a:t>+0 Cambiar el acceso de los métodos o clases</a:t>
+            </a:r>
+            <a:endParaRPr lang="es-PE" sz="3500" dirty="0" smtClean="0"/>
           </a:p>
         </p:txBody>
       </p:sp>
@@ -9551,8 +9562,8 @@
         </p:nvSpPr>
         <p:spPr>
           <a:xfrm>
-            <a:off x="634590" y="3928988"/>
-            <a:ext cx="7874820" cy="1754326"/>
+            <a:off x="251520" y="4680900"/>
+            <a:ext cx="8712968" cy="1754326"/>
           </a:xfrm>
           <a:prstGeom prst="rect">
             <a:avLst/>
@@ -9566,7 +9577,7 @@
           <a:p>
             <a:pPr algn="ctr"/>
             <a:r>
-              <a:rPr lang="es-PE" sz="3600" dirty="0">
+              <a:rPr lang="es-PE" sz="3500" dirty="0">
                 <a:solidFill>
                   <a:srgbClr val="FFC000"/>
                 </a:solidFill>
@@ -9576,28 +9587,28 @@
           </a:p>
           <a:p>
             <a:r>
-              <a:rPr lang="es-PE" sz="3600" dirty="0"/>
+              <a:rPr lang="es-PE" sz="3500" dirty="0"/>
               <a:t>+2 Cada línea modificada </a:t>
             </a:r>
             <a:r>
-              <a:rPr lang="es-PE" sz="3600" dirty="0" smtClean="0"/>
+              <a:rPr lang="es-PE" sz="3500" dirty="0" smtClean="0"/>
               <a:t>manualmente</a:t>
             </a:r>
           </a:p>
           <a:p>
             <a:r>
-              <a:rPr lang="es-PE" sz="3600" dirty="0" smtClean="0"/>
+              <a:rPr lang="es-PE" sz="3500" dirty="0" smtClean="0"/>
               <a:t>x2 Cada cambio mientras </a:t>
             </a:r>
             <a:r>
-              <a:rPr lang="es-PE" sz="3600" dirty="0"/>
+              <a:rPr lang="es-PE" sz="3500" dirty="0"/>
               <a:t>no </a:t>
             </a:r>
             <a:r>
-              <a:rPr lang="es-PE" sz="3600" dirty="0" smtClean="0"/>
+              <a:rPr lang="es-PE" sz="3500" dirty="0" smtClean="0"/>
               <a:t>compile</a:t>
             </a:r>
-            <a:endParaRPr lang="es-PE" sz="3600" dirty="0"/>
+            <a:endParaRPr lang="es-PE" sz="3500" dirty="0"/>
           </a:p>
         </p:txBody>
       </p:sp>

</xml_diff>

<commit_message>
Se eliminó una categoría de los productos.
</commit_message>
<xml_diff>
--- a/ppt/Diapositivas.pptx
+++ b/ppt/Diapositivas.pptx
@@ -15,12 +15,12 @@
     <p:sldId id="449" r:id="rId6"/>
     <p:sldId id="464" r:id="rId7"/>
     <p:sldId id="463" r:id="rId8"/>
-    <p:sldId id="459" r:id="rId9"/>
+    <p:sldId id="473" r:id="rId9"/>
     <p:sldId id="462" r:id="rId10"/>
     <p:sldId id="450" r:id="rId11"/>
     <p:sldId id="447" r:id="rId12"/>
-    <p:sldId id="456" r:id="rId13"/>
-    <p:sldId id="472" r:id="rId14"/>
+    <p:sldId id="472" r:id="rId13"/>
+    <p:sldId id="456" r:id="rId14"/>
     <p:sldId id="469" r:id="rId15"/>
     <p:sldId id="453" r:id="rId16"/>
     <p:sldId id="466" r:id="rId17"/>
@@ -214,7 +214,7 @@
           <a:p>
             <a:fld id="{63D5FC4C-9EE1-4746-A368-724F618FC790}" type="datetimeFigureOut">
               <a:rPr lang="es-PE" smtClean="0"/>
-              <a:t>30/09/2011</a:t>
+              <a:t>02/10/2011</a:t>
             </a:fld>
             <a:endParaRPr lang="es-PE"/>
           </a:p>
@@ -778,6 +778,7 @@
           <a:bodyPr/>
           <a:lstStyle/>
           <a:p>
+            <a:pPr algn="l"/>
             <a:endParaRPr lang="es-PE" dirty="0"/>
           </a:p>
         </p:txBody>
@@ -808,7 +809,7 @@
     </p:spTree>
     <p:extLst>
       <p:ext uri="{BB962C8B-B14F-4D97-AF65-F5344CB8AC3E}">
-        <p14:creationId xmlns:p14="http://schemas.microsoft.com/office/powerpoint/2010/main" val="1461112982"/>
+        <p14:creationId xmlns:p14="http://schemas.microsoft.com/office/powerpoint/2010/main" val="3614550747"/>
       </p:ext>
     </p:extLst>
   </p:cSld>
@@ -862,7 +863,6 @@
           <a:bodyPr/>
           <a:lstStyle/>
           <a:p>
-            <a:pPr algn="l"/>
             <a:endParaRPr lang="es-PE" dirty="0"/>
           </a:p>
         </p:txBody>
@@ -893,7 +893,7 @@
     </p:spTree>
     <p:extLst>
       <p:ext uri="{BB962C8B-B14F-4D97-AF65-F5344CB8AC3E}">
-        <p14:creationId xmlns:p14="http://schemas.microsoft.com/office/powerpoint/2010/main" val="3614550747"/>
+        <p14:creationId xmlns:p14="http://schemas.microsoft.com/office/powerpoint/2010/main" val="1461112982"/>
       </p:ext>
     </p:extLst>
   </p:cSld>
@@ -2350,13 +2350,8 @@
             </a:pPr>
             <a:r>
               <a:rPr lang="es-PE" baseline="0" dirty="0" smtClean="0"/>
-              <a:t>Asegurarse que las reglas y roles se </a:t>
-            </a:r>
-            <a:r>
-              <a:rPr lang="es-PE" baseline="0" smtClean="0"/>
-              <a:t>están cumpliendo.</a:t>
-            </a:r>
-            <a:endParaRPr lang="es-PE" baseline="0" dirty="0" smtClean="0"/>
+              <a:t>Asegurarse que las reglas y roles se están cumpliendo.</a:t>
+            </a:r>
           </a:p>
         </p:txBody>
       </p:sp>
@@ -2918,7 +2913,7 @@
             <a:fld id="{807CB568-C05F-482F-9F26-AA302B8892DF}" type="datetimeFigureOut">
               <a:rPr lang="es-ES" smtClean="0"/>
               <a:pPr/>
-              <a:t>30/09/2011</a:t>
+              <a:t>02/10/2011</a:t>
             </a:fld>
             <a:endParaRPr lang="es-ES"/>
           </a:p>
@@ -3097,7 +3092,7 @@
             <a:fld id="{807CB568-C05F-482F-9F26-AA302B8892DF}" type="datetimeFigureOut">
               <a:rPr lang="es-ES" smtClean="0"/>
               <a:pPr/>
-              <a:t>30/09/2011</a:t>
+              <a:t>02/10/2011</a:t>
             </a:fld>
             <a:endParaRPr lang="es-ES"/>
           </a:p>
@@ -3286,7 +3281,7 @@
             <a:fld id="{807CB568-C05F-482F-9F26-AA302B8892DF}" type="datetimeFigureOut">
               <a:rPr lang="es-ES" smtClean="0"/>
               <a:pPr/>
-              <a:t>30/09/2011</a:t>
+              <a:t>02/10/2011</a:t>
             </a:fld>
             <a:endParaRPr lang="es-ES"/>
           </a:p>
@@ -3465,7 +3460,7 @@
             <a:fld id="{807CB568-C05F-482F-9F26-AA302B8892DF}" type="datetimeFigureOut">
               <a:rPr lang="es-ES" smtClean="0"/>
               <a:pPr/>
-              <a:t>30/09/2011</a:t>
+              <a:t>02/10/2011</a:t>
             </a:fld>
             <a:endParaRPr lang="es-ES"/>
           </a:p>
@@ -3720,7 +3715,7 @@
             <a:fld id="{807CB568-C05F-482F-9F26-AA302B8892DF}" type="datetimeFigureOut">
               <a:rPr lang="es-ES" smtClean="0"/>
               <a:pPr/>
-              <a:t>30/09/2011</a:t>
+              <a:t>02/10/2011</a:t>
             </a:fld>
             <a:endParaRPr lang="es-ES"/>
           </a:p>
@@ -4017,7 +4012,7 @@
             <a:fld id="{807CB568-C05F-482F-9F26-AA302B8892DF}" type="datetimeFigureOut">
               <a:rPr lang="es-ES" smtClean="0"/>
               <a:pPr/>
-              <a:t>30/09/2011</a:t>
+              <a:t>02/10/2011</a:t>
             </a:fld>
             <a:endParaRPr lang="es-ES"/>
           </a:p>
@@ -4448,7 +4443,7 @@
             <a:fld id="{807CB568-C05F-482F-9F26-AA302B8892DF}" type="datetimeFigureOut">
               <a:rPr lang="es-ES" smtClean="0"/>
               <a:pPr/>
-              <a:t>30/09/2011</a:t>
+              <a:t>02/10/2011</a:t>
             </a:fld>
             <a:endParaRPr lang="es-ES"/>
           </a:p>
@@ -4575,7 +4570,7 @@
             <a:fld id="{807CB568-C05F-482F-9F26-AA302B8892DF}" type="datetimeFigureOut">
               <a:rPr lang="es-ES" smtClean="0"/>
               <a:pPr/>
-              <a:t>30/09/2011</a:t>
+              <a:t>02/10/2011</a:t>
             </a:fld>
             <a:endParaRPr lang="es-ES"/>
           </a:p>
@@ -4679,7 +4674,7 @@
             <a:fld id="{807CB568-C05F-482F-9F26-AA302B8892DF}" type="datetimeFigureOut">
               <a:rPr lang="es-ES" smtClean="0"/>
               <a:pPr/>
-              <a:t>30/09/2011</a:t>
+              <a:t>02/10/2011</a:t>
             </a:fld>
             <a:endParaRPr lang="es-ES"/>
           </a:p>
@@ -4965,7 +4960,7 @@
             <a:fld id="{807CB568-C05F-482F-9F26-AA302B8892DF}" type="datetimeFigureOut">
               <a:rPr lang="es-ES" smtClean="0"/>
               <a:pPr/>
-              <a:t>30/09/2011</a:t>
+              <a:t>02/10/2011</a:t>
             </a:fld>
             <a:endParaRPr lang="es-ES"/>
           </a:p>
@@ -5234,7 +5229,7 @@
             <a:fld id="{807CB568-C05F-482F-9F26-AA302B8892DF}" type="datetimeFigureOut">
               <a:rPr lang="es-ES" smtClean="0"/>
               <a:pPr/>
-              <a:t>30/09/2011</a:t>
+              <a:t>02/10/2011</a:t>
             </a:fld>
             <a:endParaRPr lang="es-ES"/>
           </a:p>
@@ -5485,7 +5480,7 @@
             <a:fld id="{807CB568-C05F-482F-9F26-AA302B8892DF}" type="datetimeFigureOut">
               <a:rPr lang="es-ES" smtClean="0"/>
               <a:pPr/>
-              <a:t>30/09/2011</a:t>
+              <a:t>02/10/2011</a:t>
             </a:fld>
             <a:endParaRPr lang="es-ES"/>
           </a:p>
@@ -6628,101 +6623,6 @@
           <a:chExt cx="0" cy="0"/>
         </a:xfrm>
       </p:grpSpPr>
-      <p:pic>
-        <p:nvPicPr>
-          <p:cNvPr id="4" name="3 Imagen"/>
-          <p:cNvPicPr>
-            <a:picLocks noChangeAspect="1"/>
-          </p:cNvPicPr>
-          <p:nvPr/>
-        </p:nvPicPr>
-        <p:blipFill>
-          <a:blip r:embed="rId3" cstate="print">
-            <a:extLst>
-              <a:ext uri="{28A0092B-C50C-407E-A947-70E740481C1C}">
-                <a14:useLocalDpi xmlns:a14="http://schemas.microsoft.com/office/drawing/2010/main" val="0"/>
-              </a:ext>
-            </a:extLst>
-          </a:blip>
-          <a:stretch>
-            <a:fillRect/>
-          </a:stretch>
-        </p:blipFill>
-        <p:spPr>
-          <a:xfrm>
-            <a:off x="-381804" y="13016"/>
-            <a:ext cx="9913822" cy="7173416"/>
-          </a:xfrm>
-          <a:prstGeom prst="rect">
-            <a:avLst/>
-          </a:prstGeom>
-        </p:spPr>
-      </p:pic>
-      <p:sp>
-        <p:nvSpPr>
-          <p:cNvPr id="2" name="1 Título"/>
-          <p:cNvSpPr>
-            <a:spLocks noGrp="1"/>
-          </p:cNvSpPr>
-          <p:nvPr>
-            <p:ph type="ctrTitle"/>
-          </p:nvPr>
-        </p:nvSpPr>
-        <p:spPr>
-          <a:xfrm>
-            <a:off x="-20748" y="87136"/>
-            <a:ext cx="9144000" cy="1093136"/>
-          </a:xfrm>
-        </p:spPr>
-        <p:txBody>
-          <a:bodyPr/>
-          <a:lstStyle/>
-          <a:p>
-            <a:r>
-              <a:rPr lang="es-PE" sz="11500" b="1" spc="300" dirty="0" smtClean="0"/>
-              <a:t>DEMO</a:t>
-            </a:r>
-            <a:endParaRPr lang="es-ES" sz="9600" b="1" spc="300" dirty="0"/>
-          </a:p>
-        </p:txBody>
-      </p:sp>
-    </p:spTree>
-    <p:extLst>
-      <p:ext uri="{BB962C8B-B14F-4D97-AF65-F5344CB8AC3E}">
-        <p14:creationId xmlns:p14="http://schemas.microsoft.com/office/powerpoint/2010/main" val="3149365002"/>
-      </p:ext>
-    </p:extLst>
-  </p:cSld>
-  <p:clrMapOvr>
-    <a:masterClrMapping/>
-  </p:clrMapOvr>
-  <p:timing>
-    <p:tnLst>
-      <p:par>
-        <p:cTn id="1" dur="indefinite" restart="never" nodeType="tmRoot"/>
-      </p:par>
-    </p:tnLst>
-  </p:timing>
-</p:sld>
-</file>
-
-<file path=ppt/slides/slide13.xml><?xml version="1.0" encoding="utf-8"?>
-<p:sld xmlns:a="http://schemas.openxmlformats.org/drawingml/2006/main" xmlns:r="http://schemas.openxmlformats.org/officeDocument/2006/relationships" xmlns:p="http://schemas.openxmlformats.org/presentationml/2006/main">
-  <p:cSld>
-    <p:spTree>
-      <p:nvGrpSpPr>
-        <p:cNvPr id="1" name=""/>
-        <p:cNvGrpSpPr/>
-        <p:nvPr/>
-      </p:nvGrpSpPr>
-      <p:grpSpPr>
-        <a:xfrm>
-          <a:off x="0" y="0"/>
-          <a:ext cx="0" cy="0"/>
-          <a:chOff x="0" y="0"/>
-          <a:chExt cx="0" cy="0"/>
-        </a:xfrm>
-      </p:grpSpPr>
       <p:sp>
         <p:nvSpPr>
           <p:cNvPr id="18" name="1 Título"/>
@@ -6842,6 +6742,101 @@
     <p:extLst>
       <p:ext uri="{BB962C8B-B14F-4D97-AF65-F5344CB8AC3E}">
         <p14:creationId xmlns:p14="http://schemas.microsoft.com/office/powerpoint/2010/main" val="436303969"/>
+      </p:ext>
+    </p:extLst>
+  </p:cSld>
+  <p:clrMapOvr>
+    <a:masterClrMapping/>
+  </p:clrMapOvr>
+  <p:timing>
+    <p:tnLst>
+      <p:par>
+        <p:cTn id="1" dur="indefinite" restart="never" nodeType="tmRoot"/>
+      </p:par>
+    </p:tnLst>
+  </p:timing>
+</p:sld>
+</file>
+
+<file path=ppt/slides/slide13.xml><?xml version="1.0" encoding="utf-8"?>
+<p:sld xmlns:a="http://schemas.openxmlformats.org/drawingml/2006/main" xmlns:r="http://schemas.openxmlformats.org/officeDocument/2006/relationships" xmlns:p="http://schemas.openxmlformats.org/presentationml/2006/main">
+  <p:cSld>
+    <p:spTree>
+      <p:nvGrpSpPr>
+        <p:cNvPr id="1" name=""/>
+        <p:cNvGrpSpPr/>
+        <p:nvPr/>
+      </p:nvGrpSpPr>
+      <p:grpSpPr>
+        <a:xfrm>
+          <a:off x="0" y="0"/>
+          <a:ext cx="0" cy="0"/>
+          <a:chOff x="0" y="0"/>
+          <a:chExt cx="0" cy="0"/>
+        </a:xfrm>
+      </p:grpSpPr>
+      <p:pic>
+        <p:nvPicPr>
+          <p:cNvPr id="4" name="3 Imagen"/>
+          <p:cNvPicPr>
+            <a:picLocks noChangeAspect="1"/>
+          </p:cNvPicPr>
+          <p:nvPr/>
+        </p:nvPicPr>
+        <p:blipFill>
+          <a:blip r:embed="rId3" cstate="print">
+            <a:extLst>
+              <a:ext uri="{28A0092B-C50C-407E-A947-70E740481C1C}">
+                <a14:useLocalDpi xmlns:a14="http://schemas.microsoft.com/office/drawing/2010/main" val="0"/>
+              </a:ext>
+            </a:extLst>
+          </a:blip>
+          <a:stretch>
+            <a:fillRect/>
+          </a:stretch>
+        </p:blipFill>
+        <p:spPr>
+          <a:xfrm>
+            <a:off x="-381804" y="13016"/>
+            <a:ext cx="9913822" cy="7173416"/>
+          </a:xfrm>
+          <a:prstGeom prst="rect">
+            <a:avLst/>
+          </a:prstGeom>
+        </p:spPr>
+      </p:pic>
+      <p:sp>
+        <p:nvSpPr>
+          <p:cNvPr id="2" name="1 Título"/>
+          <p:cNvSpPr>
+            <a:spLocks noGrp="1"/>
+          </p:cNvSpPr>
+          <p:nvPr>
+            <p:ph type="ctrTitle"/>
+          </p:nvPr>
+        </p:nvSpPr>
+        <p:spPr>
+          <a:xfrm>
+            <a:off x="-20748" y="87136"/>
+            <a:ext cx="9144000" cy="1093136"/>
+          </a:xfrm>
+        </p:spPr>
+        <p:txBody>
+          <a:bodyPr/>
+          <a:lstStyle/>
+          <a:p>
+            <a:r>
+              <a:rPr lang="es-PE" sz="11500" b="1" spc="300" dirty="0" smtClean="0"/>
+              <a:t>DEMO</a:t>
+            </a:r>
+            <a:endParaRPr lang="es-ES" sz="9600" b="1" spc="300" dirty="0"/>
+          </a:p>
+        </p:txBody>
+      </p:sp>
+    </p:spTree>
+    <p:extLst>
+      <p:ext uri="{BB962C8B-B14F-4D97-AF65-F5344CB8AC3E}">
+        <p14:creationId xmlns:p14="http://schemas.microsoft.com/office/powerpoint/2010/main" val="3149365002"/>
       </p:ext>
     </p:extLst>
   </p:cSld>
@@ -7246,15 +7241,7 @@
             <a:pPr algn="ctr"/>
             <a:r>
               <a:rPr lang="es-PE" sz="3200" dirty="0" smtClean="0"/>
-              <a:t>Es un juego de </a:t>
-            </a:r>
-            <a:r>
-              <a:rPr lang="es-PE" sz="3200" dirty="0" smtClean="0"/>
-              <a:t>3 </a:t>
-            </a:r>
-            <a:r>
-              <a:rPr lang="es-PE" sz="3200" dirty="0" smtClean="0"/>
-              <a:t>hoyos, todos los equipos comenzarán en el </a:t>
+              <a:t>Es un juego de 3 hoyos, todos los equipos comenzarán en el </a:t>
             </a:r>
             <a:r>
               <a:rPr lang="es-PE" sz="3200" dirty="0" err="1" smtClean="0"/>
@@ -7291,15 +7278,7 @@
             <a:pPr algn="ctr"/>
             <a:r>
               <a:rPr lang="es-PE" sz="3200" dirty="0" smtClean="0"/>
-              <a:t>El tiempo por hoyo es </a:t>
-            </a:r>
-            <a:r>
-              <a:rPr lang="es-PE" sz="3200" dirty="0" smtClean="0"/>
-              <a:t>12 </a:t>
-            </a:r>
-            <a:r>
-              <a:rPr lang="es-PE" sz="3200" dirty="0" smtClean="0"/>
-              <a:t>minutos, al finalizar cada hoyo el mejor equipo mostrará sus resultados.</a:t>
+              <a:t>El tiempo por hoyo es 12 minutos, al finalizar cada hoyo el mejor equipo mostrará sus resultados.</a:t>
             </a:r>
             <a:endParaRPr lang="es-PE" sz="3200" dirty="0"/>
           </a:p>
@@ -7519,7 +7498,15 @@
             </a:pPr>
             <a:r>
               <a:rPr lang="es-PE" sz="3200" dirty="0" smtClean="0"/>
-              <a:t>No se olviden las actividades de cada rol del equipo.</a:t>
+              <a:t>No </a:t>
+            </a:r>
+            <a:r>
+              <a:rPr lang="es-PE" sz="3200" dirty="0" smtClean="0"/>
+              <a:t>olvidar las </a:t>
+            </a:r>
+            <a:r>
+              <a:rPr lang="es-PE" sz="3200" dirty="0" smtClean="0"/>
+              <a:t>actividades de cada rol del equipo.</a:t>
             </a:r>
           </a:p>
           <a:p>
@@ -7536,7 +7523,15 @@
             </a:pPr>
             <a:r>
               <a:rPr lang="es-PE" sz="3200" dirty="0" smtClean="0"/>
-              <a:t>Tienen 10 minutos por hoyo.</a:t>
+              <a:t>Tienen </a:t>
+            </a:r>
+            <a:r>
+              <a:rPr lang="es-PE" sz="3200" dirty="0" smtClean="0"/>
+              <a:t>12 </a:t>
+            </a:r>
+            <a:r>
+              <a:rPr lang="es-PE" sz="3200" dirty="0" smtClean="0"/>
+              <a:t>minutos por hoyo.</a:t>
             </a:r>
           </a:p>
         </p:txBody>
@@ -8418,7 +8413,15 @@
             </a:pPr>
             <a:r>
               <a:rPr lang="es-PE" sz="3200" dirty="0" smtClean="0"/>
-              <a:t>Tienen 15 minutos para todo el recorrido.</a:t>
+              <a:t>Tienen </a:t>
+            </a:r>
+            <a:r>
+              <a:rPr lang="es-PE" sz="3200" dirty="0" smtClean="0"/>
+              <a:t>18 </a:t>
+            </a:r>
+            <a:r>
+              <a:rPr lang="es-PE" sz="3200" dirty="0" smtClean="0"/>
+              <a:t>minutos para todo el recorrido.</a:t>
             </a:r>
           </a:p>
         </p:txBody>
@@ -8791,6 +8794,56 @@
           </a:effectLst>
         </p:spPr>
       </p:pic>
+      <p:sp>
+        <p:nvSpPr>
+          <p:cNvPr id="3" name="2 Rectángulo"/>
+          <p:cNvSpPr/>
+          <p:nvPr/>
+        </p:nvSpPr>
+        <p:spPr>
+          <a:xfrm>
+            <a:off x="4194212" y="5067181"/>
+            <a:ext cx="4572000" cy="954107"/>
+          </a:xfrm>
+          <a:prstGeom prst="rect">
+            <a:avLst/>
+          </a:prstGeom>
+        </p:spPr>
+        <p:txBody>
+          <a:bodyPr>
+            <a:spAutoFit/>
+          </a:bodyPr>
+          <a:lstStyle/>
+          <a:p>
+            <a:pPr algn="ctr"/>
+            <a:r>
+              <a:rPr lang="es-PE" sz="2800" dirty="0" smtClean="0">
+                <a:solidFill>
+                  <a:srgbClr val="FFC000"/>
+                </a:solidFill>
+              </a:rPr>
+              <a:t>Además ser el </a:t>
+            </a:r>
+            <a:r>
+              <a:rPr lang="es-PE" sz="2800" i="1" dirty="0" smtClean="0">
+                <a:solidFill>
+                  <a:srgbClr val="FFC000"/>
+                </a:solidFill>
+              </a:rPr>
+              <a:t>DRIVER</a:t>
+            </a:r>
+            <a:r>
+              <a:rPr lang="es-PE" sz="2800" dirty="0" smtClean="0">
+                <a:solidFill>
+                  <a:srgbClr val="FFC000"/>
+                </a:solidFill>
+              </a:rPr>
+              <a:t> del equipo</a:t>
+            </a:r>
+            <a:endParaRPr lang="es-PE" sz="2800" dirty="0"/>
+          </a:p>
+        </p:txBody>
+      </p:sp>
     </p:spTree>
     <p:extLst>
       <p:ext uri="{BB962C8B-B14F-4D97-AF65-F5344CB8AC3E}">
@@ -8872,8 +8925,8 @@
         </p:nvSpPr>
         <p:spPr>
           <a:xfrm>
-            <a:off x="3923928" y="2322746"/>
-            <a:ext cx="4824536" cy="1754326"/>
+            <a:off x="3953424" y="1052736"/>
+            <a:ext cx="4824536" cy="3970318"/>
           </a:xfrm>
           <a:prstGeom prst="rect">
             <a:avLst/>
@@ -8889,8 +8942,32 @@
             <a:pPr algn="ctr"/>
             <a:r>
               <a:rPr lang="es-PE" sz="3600" dirty="0" smtClean="0"/>
-              <a:t>Registrar el número de movimientos y penalidades cometidas</a:t>
-            </a:r>
+              <a:t>Registrar el número de movimientos y penalidades </a:t>
+            </a:r>
+            <a:r>
+              <a:rPr lang="es-PE" sz="3600" dirty="0" smtClean="0"/>
+              <a:t>cometidas</a:t>
+            </a:r>
+          </a:p>
+          <a:p>
+            <a:pPr algn="ctr"/>
+            <a:endParaRPr lang="es-PE" sz="3600" dirty="0"/>
+          </a:p>
+          <a:p>
+            <a:pPr algn="ctr"/>
+            <a:r>
+              <a:rPr lang="es-PE" sz="3600" dirty="0" smtClean="0"/>
+              <a:t>Asegurarse que los </a:t>
+            </a:r>
+            <a:r>
+              <a:rPr lang="es-PE" sz="3600" dirty="0" err="1" smtClean="0"/>
+              <a:t>tests</a:t>
+            </a:r>
+            <a:r>
+              <a:rPr lang="es-PE" sz="3600" dirty="0" smtClean="0"/>
+              <a:t> se ejecuten constantemente</a:t>
+            </a:r>
+            <a:endParaRPr lang="es-PE" sz="3600" dirty="0" smtClean="0"/>
           </a:p>
         </p:txBody>
       </p:sp>
@@ -8929,6 +9006,56 @@
           </a:effectLst>
         </p:spPr>
       </p:pic>
+      <p:sp>
+        <p:nvSpPr>
+          <p:cNvPr id="5" name="4 Rectángulo"/>
+          <p:cNvSpPr/>
+          <p:nvPr/>
+        </p:nvSpPr>
+        <p:spPr>
+          <a:xfrm>
+            <a:off x="4079692" y="5243948"/>
+            <a:ext cx="4572000" cy="954107"/>
+          </a:xfrm>
+          <a:prstGeom prst="rect">
+            <a:avLst/>
+          </a:prstGeom>
+        </p:spPr>
+        <p:txBody>
+          <a:bodyPr>
+            <a:spAutoFit/>
+          </a:bodyPr>
+          <a:lstStyle/>
+          <a:p>
+            <a:pPr algn="ctr"/>
+            <a:r>
+              <a:rPr lang="es-PE" sz="2800" dirty="0" smtClean="0">
+                <a:solidFill>
+                  <a:srgbClr val="FFC000"/>
+                </a:solidFill>
+              </a:rPr>
+              <a:t>Además ser el </a:t>
+            </a:r>
+            <a:r>
+              <a:rPr lang="es-PE" sz="2800" i="1" dirty="0" smtClean="0">
+                <a:solidFill>
+                  <a:srgbClr val="FFC000"/>
+                </a:solidFill>
+              </a:rPr>
+              <a:t>NAVIGATOR </a:t>
+            </a:r>
+            <a:r>
+              <a:rPr lang="es-PE" sz="2800" dirty="0" smtClean="0">
+                <a:solidFill>
+                  <a:srgbClr val="FFC000"/>
+                </a:solidFill>
+              </a:rPr>
+              <a:t>del equipo</a:t>
+            </a:r>
+            <a:endParaRPr lang="es-PE" sz="2800" dirty="0"/>
+          </a:p>
+        </p:txBody>
+      </p:sp>
     </p:spTree>
     <p:extLst>
       <p:ext uri="{BB962C8B-B14F-4D97-AF65-F5344CB8AC3E}">
@@ -9457,7 +9584,7 @@
         <p:spPr>
           <a:xfrm>
             <a:off x="251520" y="879224"/>
-            <a:ext cx="8712968" cy="3970318"/>
+            <a:ext cx="8712968" cy="3323987"/>
           </a:xfrm>
           <a:prstGeom prst="rect">
             <a:avLst/>
@@ -9547,15 +9674,11 @@
             </a:r>
             <a:r>
               <a:rPr lang="es-PE" sz="3500" dirty="0" smtClean="0"/>
-              <a:t>Organizar, dar </a:t>
-            </a:r>
-            <a:r>
-              <a:rPr lang="es-PE" sz="3500" dirty="0"/>
-              <a:t>formato al </a:t>
+              <a:t>Dar formato o </a:t>
             </a:r>
             <a:r>
               <a:rPr lang="es-PE" sz="3500" dirty="0" smtClean="0"/>
-              <a:t>código o eliminar líneas en blanco</a:t>
+              <a:t>eliminar líneas en blanco</a:t>
             </a:r>
           </a:p>
           <a:p>
@@ -9575,8 +9698,8 @@
         </p:nvSpPr>
         <p:spPr>
           <a:xfrm>
-            <a:off x="251520" y="4680900"/>
-            <a:ext cx="8712968" cy="1754326"/>
+            <a:off x="251520" y="4221088"/>
+            <a:ext cx="8712968" cy="1708160"/>
           </a:xfrm>
           <a:prstGeom prst="rect">
             <a:avLst/>
@@ -9621,14 +9744,13 @@
               <a:rPr lang="es-PE" sz="3500" dirty="0" smtClean="0"/>
               <a:t>compile</a:t>
             </a:r>
-            <a:endParaRPr lang="es-PE" sz="3500" dirty="0"/>
           </a:p>
         </p:txBody>
       </p:sp>
     </p:spTree>
     <p:extLst>
       <p:ext uri="{BB962C8B-B14F-4D97-AF65-F5344CB8AC3E}">
-        <p14:creationId xmlns:p14="http://schemas.microsoft.com/office/powerpoint/2010/main" val="988592054"/>
+        <p14:creationId xmlns:p14="http://schemas.microsoft.com/office/powerpoint/2010/main" val="1848309971"/>
       </p:ext>
     </p:extLst>
   </p:cSld>

</xml_diff>

<commit_message>
Cambio de nombre directorios Last Hole
</commit_message>
<xml_diff>
--- a/ppt/Diapositivas.pptx
+++ b/ppt/Diapositivas.pptx
@@ -29,7 +29,7 @@
     <p:sldId id="457" r:id="rId20"/>
     <p:sldId id="467" r:id="rId21"/>
     <p:sldId id="468" r:id="rId22"/>
-    <p:sldId id="471" r:id="rId23"/>
+    <p:sldId id="474" r:id="rId23"/>
   </p:sldIdLst>
   <p:sldSz cx="9144000" cy="6858000" type="screen4x3"/>
   <p:notesSz cx="6858000" cy="9144000"/>
@@ -213,7 +213,7 @@
           <a:p>
             <a:fld id="{63D5FC4C-9EE1-4746-A368-724F618FC790}" type="datetimeFigureOut">
               <a:rPr lang="es-PE" smtClean="0"/>
-              <a:t>09/10/2011</a:t>
+              <a:t>10/10/2011</a:t>
             </a:fld>
             <a:endParaRPr lang="es-PE"/>
           </a:p>
@@ -2134,10 +2134,7 @@
               <a:buFontTx/>
               <a:buNone/>
             </a:pPr>
-            <a:r>
-              <a:rPr lang="es-PE" baseline="0" dirty="0" smtClean="0"/>
-              <a:t>- Explicar todos los movimientos realizados</a:t>
-            </a:r>
+            <a:endParaRPr lang="es-PE" baseline="0" dirty="0" smtClean="0"/>
           </a:p>
         </p:txBody>
       </p:sp>
@@ -2828,7 +2825,7 @@
             <a:fld id="{807CB568-C05F-482F-9F26-AA302B8892DF}" type="datetimeFigureOut">
               <a:rPr lang="es-ES" smtClean="0"/>
               <a:pPr/>
-              <a:t>09/10/2011</a:t>
+              <a:t>10/10/2011</a:t>
             </a:fld>
             <a:endParaRPr lang="es-ES"/>
           </a:p>
@@ -3007,7 +3004,7 @@
             <a:fld id="{807CB568-C05F-482F-9F26-AA302B8892DF}" type="datetimeFigureOut">
               <a:rPr lang="es-ES" smtClean="0"/>
               <a:pPr/>
-              <a:t>09/10/2011</a:t>
+              <a:t>10/10/2011</a:t>
             </a:fld>
             <a:endParaRPr lang="es-ES"/>
           </a:p>
@@ -3196,7 +3193,7 @@
             <a:fld id="{807CB568-C05F-482F-9F26-AA302B8892DF}" type="datetimeFigureOut">
               <a:rPr lang="es-ES" smtClean="0"/>
               <a:pPr/>
-              <a:t>09/10/2011</a:t>
+              <a:t>10/10/2011</a:t>
             </a:fld>
             <a:endParaRPr lang="es-ES"/>
           </a:p>
@@ -3375,7 +3372,7 @@
             <a:fld id="{807CB568-C05F-482F-9F26-AA302B8892DF}" type="datetimeFigureOut">
               <a:rPr lang="es-ES" smtClean="0"/>
               <a:pPr/>
-              <a:t>09/10/2011</a:t>
+              <a:t>10/10/2011</a:t>
             </a:fld>
             <a:endParaRPr lang="es-ES"/>
           </a:p>
@@ -3630,7 +3627,7 @@
             <a:fld id="{807CB568-C05F-482F-9F26-AA302B8892DF}" type="datetimeFigureOut">
               <a:rPr lang="es-ES" smtClean="0"/>
               <a:pPr/>
-              <a:t>09/10/2011</a:t>
+              <a:t>10/10/2011</a:t>
             </a:fld>
             <a:endParaRPr lang="es-ES"/>
           </a:p>
@@ -3927,7 +3924,7 @@
             <a:fld id="{807CB568-C05F-482F-9F26-AA302B8892DF}" type="datetimeFigureOut">
               <a:rPr lang="es-ES" smtClean="0"/>
               <a:pPr/>
-              <a:t>09/10/2011</a:t>
+              <a:t>10/10/2011</a:t>
             </a:fld>
             <a:endParaRPr lang="es-ES"/>
           </a:p>
@@ -4358,7 +4355,7 @@
             <a:fld id="{807CB568-C05F-482F-9F26-AA302B8892DF}" type="datetimeFigureOut">
               <a:rPr lang="es-ES" smtClean="0"/>
               <a:pPr/>
-              <a:t>09/10/2011</a:t>
+              <a:t>10/10/2011</a:t>
             </a:fld>
             <a:endParaRPr lang="es-ES"/>
           </a:p>
@@ -4485,7 +4482,7 @@
             <a:fld id="{807CB568-C05F-482F-9F26-AA302B8892DF}" type="datetimeFigureOut">
               <a:rPr lang="es-ES" smtClean="0"/>
               <a:pPr/>
-              <a:t>09/10/2011</a:t>
+              <a:t>10/10/2011</a:t>
             </a:fld>
             <a:endParaRPr lang="es-ES"/>
           </a:p>
@@ -4589,7 +4586,7 @@
             <a:fld id="{807CB568-C05F-482F-9F26-AA302B8892DF}" type="datetimeFigureOut">
               <a:rPr lang="es-ES" smtClean="0"/>
               <a:pPr/>
-              <a:t>09/10/2011</a:t>
+              <a:t>10/10/2011</a:t>
             </a:fld>
             <a:endParaRPr lang="es-ES"/>
           </a:p>
@@ -4875,7 +4872,7 @@
             <a:fld id="{807CB568-C05F-482F-9F26-AA302B8892DF}" type="datetimeFigureOut">
               <a:rPr lang="es-ES" smtClean="0"/>
               <a:pPr/>
-              <a:t>09/10/2011</a:t>
+              <a:t>10/10/2011</a:t>
             </a:fld>
             <a:endParaRPr lang="es-ES"/>
           </a:p>
@@ -5144,7 +5141,7 @@
             <a:fld id="{807CB568-C05F-482F-9F26-AA302B8892DF}" type="datetimeFigureOut">
               <a:rPr lang="es-ES" smtClean="0"/>
               <a:pPr/>
-              <a:t>09/10/2011</a:t>
+              <a:t>10/10/2011</a:t>
             </a:fld>
             <a:endParaRPr lang="es-ES"/>
           </a:p>
@@ -5395,7 +5392,7 @@
             <a:fld id="{807CB568-C05F-482F-9F26-AA302B8892DF}" type="datetimeFigureOut">
               <a:rPr lang="es-ES" smtClean="0"/>
               <a:pPr/>
-              <a:t>09/10/2011</a:t>
+              <a:t>10/10/2011</a:t>
             </a:fld>
             <a:endParaRPr lang="es-ES"/>
           </a:p>
@@ -6478,8 +6475,13 @@
             <a:pPr algn="ctr"/>
             <a:r>
               <a:rPr lang="es-PE" sz="3200" dirty="0" smtClean="0"/>
-              <a:t>No importa que sea un problema elemental o una carita feliz, deben poner algo en la puerta</a:t>
-            </a:r>
+              <a:t>No importa que sea un problema elemental o una carita feliz, deben poner algo en la </a:t>
+            </a:r>
+            <a:r>
+              <a:rPr lang="es-PE" sz="3200" dirty="0" smtClean="0"/>
+              <a:t>puerta.</a:t>
+            </a:r>
+            <a:endParaRPr lang="es-PE" sz="3200" dirty="0" smtClean="0"/>
           </a:p>
         </p:txBody>
       </p:sp>
@@ -7037,7 +7039,7 @@
         </p:nvSpPr>
         <p:spPr>
           <a:xfrm>
-            <a:off x="251520" y="5373216"/>
+            <a:off x="251520" y="5229200"/>
             <a:ext cx="8640960" cy="1077218"/>
           </a:xfrm>
           <a:prstGeom prst="rect">
@@ -7061,13 +7063,13 @@
       </p:sp>
       <p:pic>
         <p:nvPicPr>
-          <p:cNvPr id="4" name="Picture 2"/>
+          <p:cNvPr id="1027" name="Picture 3"/>
           <p:cNvPicPr>
             <a:picLocks noChangeAspect="1" noChangeArrowheads="1"/>
           </p:cNvPicPr>
           <p:nvPr/>
         </p:nvPicPr>
-        <p:blipFill rotWithShape="1">
+        <p:blipFill>
           <a:blip r:embed="rId3">
             <a:extLst>
               <a:ext uri="{28A0092B-C50C-407E-A947-70E740481C1C}">
@@ -7075,13 +7077,15 @@
               </a:ext>
             </a:extLst>
           </a:blip>
-          <a:srcRect t="2104"/>
-          <a:stretch/>
+          <a:srcRect/>
+          <a:stretch>
+            <a:fillRect/>
+          </a:stretch>
         </p:blipFill>
         <p:spPr bwMode="auto">
           <a:xfrm>
-            <a:off x="3081612" y="2535260"/>
-            <a:ext cx="2980775" cy="2723436"/>
+            <a:off x="3137609" y="2564904"/>
+            <a:ext cx="3306599" cy="2576714"/>
           </a:xfrm>
           <a:prstGeom prst="rect">
             <a:avLst/>
@@ -7220,7 +7224,7 @@
         <p:spPr>
           <a:xfrm>
             <a:off x="251520" y="1208941"/>
-            <a:ext cx="8640960" cy="4524315"/>
+            <a:ext cx="8640960" cy="5016758"/>
           </a:xfrm>
           <a:prstGeom prst="rect">
             <a:avLst/>
@@ -7239,7 +7243,37 @@
             </a:pPr>
             <a:r>
               <a:rPr lang="es-PE" sz="3200" dirty="0" smtClean="0"/>
-              <a:t>Abrir el código inicial en el IDE.</a:t>
+              <a:t>Abrir el código inicial en el </a:t>
+            </a:r>
+            <a:r>
+              <a:rPr lang="es-PE" sz="3200" dirty="0" smtClean="0"/>
+              <a:t>IDE, asegurarse que compile y todos los </a:t>
+            </a:r>
+            <a:r>
+              <a:rPr lang="es-PE" sz="3200" dirty="0" err="1" smtClean="0"/>
+              <a:t>tests</a:t>
+            </a:r>
+            <a:r>
+              <a:rPr lang="es-PE" sz="3200" dirty="0" smtClean="0"/>
+              <a:t> pasen.</a:t>
+            </a:r>
+            <a:endParaRPr lang="es-PE" sz="3200" dirty="0" smtClean="0"/>
+          </a:p>
+          <a:p>
+            <a:endParaRPr lang="es-PE" sz="3200" dirty="0"/>
+          </a:p>
+          <a:p>
+            <a:pPr marL="457200" indent="-457200">
+              <a:buFont typeface="Arial" pitchFamily="34" charset="0"/>
+              <a:buChar char="•"/>
+            </a:pPr>
+            <a:r>
+              <a:rPr lang="es-PE" sz="3200" dirty="0" smtClean="0"/>
+              <a:t>No olvidar las actividades de cada rol del equipo</a:t>
+            </a:r>
+            <a:r>
+              <a:rPr lang="es-PE" sz="3200" dirty="0" smtClean="0"/>
+              <a:t>.</a:t>
             </a:r>
           </a:p>
           <a:p>
@@ -7256,25 +7290,9 @@
             </a:pPr>
             <a:r>
               <a:rPr lang="es-PE" sz="3200" dirty="0" smtClean="0"/>
-              <a:t>Asegurarse que compile y todos los test se pasen.</a:t>
-            </a:r>
-          </a:p>
-          <a:p>
-            <a:pPr marL="457200" indent="-457200">
-              <a:buFont typeface="Arial" pitchFamily="34" charset="0"/>
-              <a:buChar char="•"/>
-            </a:pPr>
-            <a:endParaRPr lang="es-PE" sz="3200" dirty="0"/>
-          </a:p>
-          <a:p>
-            <a:pPr marL="457200" indent="-457200">
-              <a:buFont typeface="Arial" pitchFamily="34" charset="0"/>
-              <a:buChar char="•"/>
-            </a:pPr>
-            <a:r>
-              <a:rPr lang="es-PE" sz="3200" dirty="0" smtClean="0"/>
-              <a:t>No olvidar las actividades de cada rol del equipo.</a:t>
-            </a:r>
+              <a:t>El primer equipo en terminar debe levantar la mano.</a:t>
+            </a:r>
+            <a:endParaRPr lang="es-PE" sz="3200" dirty="0" smtClean="0"/>
           </a:p>
           <a:p>
             <a:pPr marL="457200" indent="-457200">
@@ -7739,7 +7757,7 @@
         </p:nvSpPr>
         <p:spPr>
           <a:xfrm>
-            <a:off x="457200" y="1589389"/>
+            <a:off x="457200" y="692696"/>
             <a:ext cx="8229600" cy="792088"/>
           </a:xfrm>
         </p:spPr>
@@ -7771,8 +7789,8 @@
         </p:nvSpPr>
         <p:spPr>
           <a:xfrm>
-            <a:off x="611560" y="2507644"/>
-            <a:ext cx="8064896" cy="1323439"/>
+            <a:off x="611560" y="1610951"/>
+            <a:ext cx="8064896" cy="3785652"/>
           </a:xfrm>
           <a:prstGeom prst="rect">
             <a:avLst/>
@@ -7801,6 +7819,26 @@
             <a:r>
               <a:rPr lang="es-PE" sz="4000" dirty="0" smtClean="0"/>
               <a:t> (Pila) </a:t>
+            </a:r>
+            <a:endParaRPr lang="es-PE" sz="4000" dirty="0" smtClean="0"/>
+          </a:p>
+          <a:p>
+            <a:pPr algn="ctr"/>
+            <a:endParaRPr lang="es-PE" sz="4000" dirty="0"/>
+          </a:p>
+          <a:p>
+            <a:pPr algn="ctr"/>
+            <a:r>
+              <a:rPr lang="es-PE" sz="4000" dirty="0" smtClean="0"/>
+              <a:t>La meta es reemplazar el </a:t>
+            </a:r>
+            <a:r>
+              <a:rPr lang="es-PE" sz="4000" dirty="0" err="1" smtClean="0"/>
+              <a:t>array</a:t>
+            </a:r>
+            <a:r>
+              <a:rPr lang="es-PE" sz="4000" dirty="0" smtClean="0"/>
+              <a:t> simple por una clase especializada en el manejo de colecciones.</a:t>
             </a:r>
             <a:endParaRPr lang="es-PE" sz="4000" dirty="0"/>
           </a:p>
@@ -7933,7 +7971,15 @@
             <a:pPr algn="ctr"/>
             <a:r>
               <a:rPr lang="es-PE" sz="3200" dirty="0" smtClean="0"/>
-              <a:t>El tiempo de todo el recorrido es de 15 minutos, al finalizar el tiempo el mejor equipo mostrará sus resultados.</a:t>
+              <a:t>El tiempo de todo el recorrido es de </a:t>
+            </a:r>
+            <a:r>
+              <a:rPr lang="es-PE" sz="3200" dirty="0" smtClean="0"/>
+              <a:t>18 </a:t>
+            </a:r>
+            <a:r>
+              <a:rPr lang="es-PE" sz="3200" dirty="0" smtClean="0"/>
+              <a:t>minutos, al finalizar el tiempo el mejor equipo mostrará sus resultados.</a:t>
             </a:r>
             <a:endParaRPr lang="es-PE" sz="3200" dirty="0"/>
           </a:p>
@@ -8102,7 +8148,7 @@
         <p:spPr>
           <a:xfrm>
             <a:off x="251520" y="1208941"/>
-            <a:ext cx="8640960" cy="4524315"/>
+            <a:ext cx="8640960" cy="5016758"/>
           </a:xfrm>
           <a:prstGeom prst="rect">
             <a:avLst/>
@@ -8121,7 +8167,37 @@
             </a:pPr>
             <a:r>
               <a:rPr lang="es-PE" sz="3200" dirty="0" smtClean="0"/>
-              <a:t>Abrir el código inicial en el IDE.</a:t>
+              <a:t>Abrir el código inicial en el </a:t>
+            </a:r>
+            <a:r>
+              <a:rPr lang="es-PE" sz="3200" dirty="0" smtClean="0"/>
+              <a:t>IDE, asegurarse que compile y todos los </a:t>
+            </a:r>
+            <a:r>
+              <a:rPr lang="es-PE" sz="3200" dirty="0" err="1" smtClean="0"/>
+              <a:t>tests</a:t>
+            </a:r>
+            <a:r>
+              <a:rPr lang="es-PE" sz="3200" dirty="0" smtClean="0"/>
+              <a:t> pasen.</a:t>
+            </a:r>
+            <a:endParaRPr lang="es-PE" sz="3200" dirty="0" smtClean="0"/>
+          </a:p>
+          <a:p>
+            <a:endParaRPr lang="es-PE" sz="3200" dirty="0"/>
+          </a:p>
+          <a:p>
+            <a:pPr marL="457200" indent="-457200">
+              <a:buFont typeface="Arial" pitchFamily="34" charset="0"/>
+              <a:buChar char="•"/>
+            </a:pPr>
+            <a:r>
+              <a:rPr lang="es-PE" sz="3200" dirty="0" smtClean="0"/>
+              <a:t>No olvidar las actividades de cada rol del equipo</a:t>
+            </a:r>
+            <a:r>
+              <a:rPr lang="es-PE" sz="3200" dirty="0" smtClean="0"/>
+              <a:t>.</a:t>
             </a:r>
           </a:p>
           <a:p>
@@ -8138,8 +8214,9 @@
             </a:pPr>
             <a:r>
               <a:rPr lang="es-PE" sz="3200" dirty="0" smtClean="0"/>
-              <a:t>Asegurarse que compile y todos los test se pasen.</a:t>
-            </a:r>
+              <a:t>El primer equipo en terminar debe levantar la mano.</a:t>
+            </a:r>
+            <a:endParaRPr lang="es-PE" sz="3200" dirty="0" smtClean="0"/>
           </a:p>
           <a:p>
             <a:pPr marL="457200" indent="-457200">
@@ -8155,32 +8232,20 @@
             </a:pPr>
             <a:r>
               <a:rPr lang="es-PE" sz="3200" dirty="0" smtClean="0"/>
-              <a:t>No se olviden las actividades de cada rol del equipo.</a:t>
-            </a:r>
-          </a:p>
-          <a:p>
-            <a:pPr marL="457200" indent="-457200">
-              <a:buFont typeface="Arial" pitchFamily="34" charset="0"/>
-              <a:buChar char="•"/>
-            </a:pPr>
-            <a:endParaRPr lang="es-PE" sz="3200" dirty="0"/>
-          </a:p>
-          <a:p>
-            <a:pPr marL="457200" indent="-457200">
-              <a:buFont typeface="Arial" pitchFamily="34" charset="0"/>
-              <a:buChar char="•"/>
-            </a:pPr>
+              <a:t>Tienen </a:t>
+            </a:r>
             <a:r>
               <a:rPr lang="es-PE" sz="3200" dirty="0" smtClean="0"/>
-              <a:t>Tienen 18 minutos para todo el recorrido.</a:t>
-            </a:r>
+              <a:t>18 minutos para todo el recorrido.</a:t>
+            </a:r>
+            <a:endParaRPr lang="es-PE" sz="3200" dirty="0" smtClean="0"/>
           </a:p>
         </p:txBody>
       </p:sp>
     </p:spTree>
     <p:extLst>
       <p:ext uri="{BB962C8B-B14F-4D97-AF65-F5344CB8AC3E}">
-        <p14:creationId xmlns:p14="http://schemas.microsoft.com/office/powerpoint/2010/main" val="1687246152"/>
+        <p14:creationId xmlns:p14="http://schemas.microsoft.com/office/powerpoint/2010/main" val="2575741392"/>
       </p:ext>
     </p:extLst>
   </p:cSld>
@@ -9195,19 +9260,11 @@
             </a:r>
             <a:r>
               <a:rPr lang="es-PE" sz="3600" dirty="0" smtClean="0"/>
-              <a:t>final (</a:t>
-            </a:r>
-            <a:r>
-              <a:rPr lang="es-PE" sz="3600" dirty="0" err="1" smtClean="0"/>
-              <a:t>Hole</a:t>
-            </a:r>
-            <a:r>
-              <a:rPr lang="es-PE" sz="3600" dirty="0" smtClean="0"/>
-              <a:t>) </a:t>
+              <a:t>de </a:t>
             </a:r>
             <a:r>
               <a:rPr lang="es-PE" sz="3600" dirty="0"/>
-              <a:t>de cada juego en papel.</a:t>
+              <a:t>cada juego en papel.</a:t>
             </a:r>
           </a:p>
         </p:txBody>

</xml_diff>

<commit_message>
Mejor Diapositiva de Presentación
</commit_message>
<xml_diff>
--- a/ppt/Diapositivas.pptx
+++ b/ppt/Diapositivas.pptx
@@ -3033,7 +3033,7 @@
           <a:p>
             <a:fld id="{63D5FC4C-9EE1-4746-A368-724F618FC790}" type="datetimeFigureOut">
               <a:rPr lang="es-PE" smtClean="0"/>
-              <a:t>10/24/14</a:t>
+              <a:t>10/31/14</a:t>
             </a:fld>
             <a:endParaRPr lang="es-PE"/>
           </a:p>
@@ -5709,7 +5709,7 @@
             <a:fld id="{807CB568-C05F-482F-9F26-AA302B8892DF}" type="datetimeFigureOut">
               <a:rPr lang="es-ES" smtClean="0"/>
               <a:pPr/>
-              <a:t>10/24/14</a:t>
+              <a:t>10/31/14</a:t>
             </a:fld>
             <a:endParaRPr lang="es-ES"/>
           </a:p>
@@ -5881,7 +5881,7 @@
             <a:fld id="{807CB568-C05F-482F-9F26-AA302B8892DF}" type="datetimeFigureOut">
               <a:rPr lang="es-ES" smtClean="0"/>
               <a:pPr/>
-              <a:t>10/24/14</a:t>
+              <a:t>10/31/14</a:t>
             </a:fld>
             <a:endParaRPr lang="es-ES"/>
           </a:p>
@@ -6063,7 +6063,7 @@
             <a:fld id="{807CB568-C05F-482F-9F26-AA302B8892DF}" type="datetimeFigureOut">
               <a:rPr lang="es-ES" smtClean="0"/>
               <a:pPr/>
-              <a:t>10/24/14</a:t>
+              <a:t>10/31/14</a:t>
             </a:fld>
             <a:endParaRPr lang="es-ES"/>
           </a:p>
@@ -6235,7 +6235,7 @@
             <a:fld id="{807CB568-C05F-482F-9F26-AA302B8892DF}" type="datetimeFigureOut">
               <a:rPr lang="es-ES" smtClean="0"/>
               <a:pPr/>
-              <a:t>10/24/14</a:t>
+              <a:t>10/31/14</a:t>
             </a:fld>
             <a:endParaRPr lang="es-ES"/>
           </a:p>
@@ -6483,7 +6483,7 @@
             <a:fld id="{807CB568-C05F-482F-9F26-AA302B8892DF}" type="datetimeFigureOut">
               <a:rPr lang="es-ES" smtClean="0"/>
               <a:pPr/>
-              <a:t>10/24/14</a:t>
+              <a:t>10/31/14</a:t>
             </a:fld>
             <a:endParaRPr lang="es-ES"/>
           </a:p>
@@ -6773,7 +6773,7 @@
             <a:fld id="{807CB568-C05F-482F-9F26-AA302B8892DF}" type="datetimeFigureOut">
               <a:rPr lang="es-ES" smtClean="0"/>
               <a:pPr/>
-              <a:t>10/24/14</a:t>
+              <a:t>10/31/14</a:t>
             </a:fld>
             <a:endParaRPr lang="es-ES"/>
           </a:p>
@@ -7197,7 +7197,7 @@
             <a:fld id="{807CB568-C05F-482F-9F26-AA302B8892DF}" type="datetimeFigureOut">
               <a:rPr lang="es-ES" smtClean="0"/>
               <a:pPr/>
-              <a:t>10/24/14</a:t>
+              <a:t>10/31/14</a:t>
             </a:fld>
             <a:endParaRPr lang="es-ES"/>
           </a:p>
@@ -7317,7 +7317,7 @@
             <a:fld id="{807CB568-C05F-482F-9F26-AA302B8892DF}" type="datetimeFigureOut">
               <a:rPr lang="es-ES" smtClean="0"/>
               <a:pPr/>
-              <a:t>10/24/14</a:t>
+              <a:t>10/31/14</a:t>
             </a:fld>
             <a:endParaRPr lang="es-ES"/>
           </a:p>
@@ -7414,7 +7414,7 @@
             <a:fld id="{807CB568-C05F-482F-9F26-AA302B8892DF}" type="datetimeFigureOut">
               <a:rPr lang="es-ES" smtClean="0"/>
               <a:pPr/>
-              <a:t>10/24/14</a:t>
+              <a:t>10/31/14</a:t>
             </a:fld>
             <a:endParaRPr lang="es-ES"/>
           </a:p>
@@ -7693,7 +7693,7 @@
             <a:fld id="{807CB568-C05F-482F-9F26-AA302B8892DF}" type="datetimeFigureOut">
               <a:rPr lang="es-ES" smtClean="0"/>
               <a:pPr/>
-              <a:t>10/24/14</a:t>
+              <a:t>10/31/14</a:t>
             </a:fld>
             <a:endParaRPr lang="es-ES"/>
           </a:p>
@@ -7948,7 +7948,7 @@
             <a:fld id="{807CB568-C05F-482F-9F26-AA302B8892DF}" type="datetimeFigureOut">
               <a:rPr lang="es-ES" smtClean="0"/>
               <a:pPr/>
-              <a:t>10/24/14</a:t>
+              <a:t>10/31/14</a:t>
             </a:fld>
             <a:endParaRPr lang="es-ES"/>
           </a:p>
@@ -8163,7 +8163,7 @@
             <a:fld id="{807CB568-C05F-482F-9F26-AA302B8892DF}" type="datetimeFigureOut">
               <a:rPr lang="es-ES" smtClean="0"/>
               <a:pPr/>
-              <a:t>10/24/14</a:t>
+              <a:t>10/31/14</a:t>
             </a:fld>
             <a:endParaRPr lang="es-ES"/>
           </a:p>
@@ -8598,7 +8598,7 @@
         </p:nvSpPr>
         <p:spPr bwMode="auto">
           <a:xfrm>
-            <a:off x="493195" y="5841534"/>
+            <a:off x="395536" y="5877272"/>
             <a:ext cx="3214709" cy="515717"/>
           </a:xfrm>
           <a:prstGeom prst="rect">
@@ -8669,8 +8669,8 @@
         </p:nvSpPr>
         <p:spPr bwMode="auto">
           <a:xfrm>
-            <a:off x="3715072" y="5745450"/>
-            <a:ext cx="5105400" cy="707886"/>
+            <a:off x="3715072" y="5683895"/>
+            <a:ext cx="5105400" cy="830997"/>
           </a:xfrm>
           <a:prstGeom prst="rect">
             <a:avLst/>
@@ -8702,40 +8702,26 @@
               </a:spcAft>
             </a:pPr>
             <a:r>
-              <a:rPr lang="en-US" sz="2000" dirty="0" smtClean="0">
-                <a:latin typeface="Trebuchet MS" pitchFamily="34" charset="0"/>
+              <a:rPr lang="en-US" sz="2400" dirty="0" smtClean="0">
                 <a:ea typeface="Calibri" pitchFamily="34" charset="0"/>
                 <a:cs typeface="Arial" pitchFamily="34" charset="0"/>
               </a:rPr>
               <a:t>Email: </a:t>
             </a:r>
             <a:r>
-              <a:rPr lang="en-US" sz="2000" dirty="0" err="1" smtClean="0">
+              <a:rPr lang="en-US" sz="2400" dirty="0" err="1" smtClean="0">
                 <a:solidFill>
                   <a:srgbClr val="00823B"/>
                 </a:solidFill>
-                <a:latin typeface="Trebuchet MS" pitchFamily="34" charset="0"/>
                 <a:ea typeface="Calibri" pitchFamily="34" charset="0"/>
                 <a:cs typeface="Arial" pitchFamily="34" charset="0"/>
               </a:rPr>
-              <a:t>angel.nunez</a:t>
-            </a:r>
-            <a:r>
-              <a:rPr lang="en-US" sz="2000" dirty="0" err="1" smtClean="0">
-                <a:solidFill>
-                  <a:srgbClr val="00823B"/>
-                </a:solidFill>
-                <a:latin typeface="Trebuchet MS" pitchFamily="34" charset="0"/>
-                <a:ea typeface="Calibri" pitchFamily="34" charset="0"/>
-                <a:cs typeface="Arial" pitchFamily="34" charset="0"/>
-              </a:rPr>
-              <a:t>@kleer.la</a:t>
-            </a:r>
-            <a:endParaRPr lang="en-US" sz="2000" dirty="0">
+              <a:t>angel.nunez@kleer.la</a:t>
+            </a:r>
+            <a:endParaRPr lang="en-US" sz="2400" dirty="0">
               <a:solidFill>
                 <a:srgbClr val="00823B"/>
               </a:solidFill>
-              <a:latin typeface="Trebuchet MS" pitchFamily="34" charset="0"/>
               <a:ea typeface="Calibri" pitchFamily="34" charset="0"/>
               <a:cs typeface="Arial" pitchFamily="34" charset="0"/>
             </a:endParaRPr>
@@ -8750,41 +8736,37 @@
               </a:spcAft>
             </a:pPr>
             <a:r>
-              <a:rPr lang="en-US" sz="2000" dirty="0" smtClean="0">
-                <a:latin typeface="Trebuchet MS" pitchFamily="34" charset="0"/>
+              <a:rPr lang="en-US" sz="2400" dirty="0" smtClean="0">
                 <a:ea typeface="Calibri" pitchFamily="34" charset="0"/>
                 <a:cs typeface="Arial" pitchFamily="34" charset="0"/>
               </a:rPr>
               <a:t>Twitter: </a:t>
             </a:r>
             <a:r>
-              <a:rPr lang="en-US" sz="2000" dirty="0" smtClean="0">
+              <a:rPr lang="en-US" sz="2400" dirty="0" smtClean="0">
                 <a:solidFill>
                   <a:srgbClr val="00823B"/>
                 </a:solidFill>
-                <a:latin typeface="Trebuchet MS" pitchFamily="34" charset="0"/>
                 <a:ea typeface="Calibri" pitchFamily="34" charset="0"/>
                 <a:cs typeface="Arial" pitchFamily="34" charset="0"/>
               </a:rPr>
               <a:t>@</a:t>
             </a:r>
             <a:r>
-              <a:rPr lang="en-US" sz="2000" dirty="0" err="1" smtClean="0">
+              <a:rPr lang="en-US" sz="2400" dirty="0" err="1" smtClean="0">
                 <a:solidFill>
                   <a:srgbClr val="00823B"/>
                 </a:solidFill>
-                <a:latin typeface="Trebuchet MS" pitchFamily="34" charset="0"/>
                 <a:ea typeface="Calibri" pitchFamily="34" charset="0"/>
                 <a:cs typeface="Arial" pitchFamily="34" charset="0"/>
               </a:rPr>
               <a:t>snahider</a:t>
             </a:r>
             <a:r>
-              <a:rPr lang="en-US" sz="2000" dirty="0" smtClean="0">
+              <a:rPr lang="en-US" sz="2400" dirty="0" smtClean="0">
                 <a:solidFill>
                   <a:srgbClr val="00823B"/>
                 </a:solidFill>
-                <a:latin typeface="Trebuchet MS" pitchFamily="34" charset="0"/>
                 <a:cs typeface="Arial" pitchFamily="34" charset="0"/>
               </a:rPr>
               <a:t> </a:t>
@@ -8860,17 +8842,6 @@
               </a:rPr>
               <a:t>#RefactoringGolf</a:t>
             </a:r>
-            <a:endParaRPr kumimoji="0" lang="es-PE" sz="3600" b="1" i="0" u="none" strike="noStrike" kern="1200" cap="none" spc="0" normalizeH="0" baseline="0" noProof="0" dirty="0" smtClean="0">
-              <a:ln>
-                <a:noFill/>
-              </a:ln>
-              <a:solidFill>
-                <a:schemeClr val="accent6"/>
-              </a:solidFill>
-              <a:effectLst/>
-              <a:uLnTx/>
-              <a:uFillTx/>
-            </a:endParaRPr>
           </a:p>
         </p:txBody>
       </p:sp>

</xml_diff>